<commit_message>
added in slides for level - josh
</commit_message>
<xml_diff>
--- a/docs/Debugger.pptx
+++ b/docs/Debugger.pptx
@@ -6,6 +6,10 @@
   </p:sldMasterIdLst>
   <p:sldIdLst>
     <p:sldId id="256" r:id="rId2"/>
+    <p:sldId id="259" r:id="rId3"/>
+    <p:sldId id="260" r:id="rId4"/>
+    <p:sldId id="257" r:id="rId5"/>
+    <p:sldId id="258" r:id="rId6"/>
   </p:sldIdLst>
   <p:sldSz cx="12192000" cy="6858000"/>
   <p:notesSz cx="6858000" cy="9144000"/>
@@ -104,6 +108,11 @@
       </a:defRPr>
     </a:lvl9pPr>
   </p:defaultTextStyle>
+  <p:extLst>
+    <p:ext uri="{EFAFB233-063F-42B5-8137-9DF3F51BA10A}">
+      <p15:sldGuideLst xmlns:p15="http://schemas.microsoft.com/office/powerpoint/2012/main"/>
+    </p:ext>
+  </p:extLst>
 </p:presentation>
 </file>
 
@@ -3908,6 +3917,552 @@
 </p:sld>
 </file>
 
+<file path=ppt/slides/slide2.xml><?xml version="1.0" encoding="utf-8"?>
+<p:sld xmlns:a="http://schemas.openxmlformats.org/drawingml/2006/main" xmlns:r="http://schemas.openxmlformats.org/officeDocument/2006/relationships" xmlns:p="http://schemas.openxmlformats.org/presentationml/2006/main">
+  <p:cSld>
+    <p:spTree>
+      <p:nvGrpSpPr>
+        <p:cNvPr id="1" name=""/>
+        <p:cNvGrpSpPr/>
+        <p:nvPr/>
+      </p:nvGrpSpPr>
+      <p:grpSpPr>
+        <a:xfrm>
+          <a:off x="0" y="0"/>
+          <a:ext cx="0" cy="0"/>
+          <a:chOff x="0" y="0"/>
+          <a:chExt cx="0" cy="0"/>
+        </a:xfrm>
+      </p:grpSpPr>
+      <p:sp>
+        <p:nvSpPr>
+          <p:cNvPr id="2" name="Title 1">
+            <a:extLst>
+              <a:ext uri="{FF2B5EF4-FFF2-40B4-BE49-F238E27FC236}">
+                <a16:creationId xmlns:a16="http://schemas.microsoft.com/office/drawing/2014/main" id="{9796D689-71C2-42D1-9A62-53700A84FDF8}"/>
+              </a:ext>
+            </a:extLst>
+          </p:cNvPr>
+          <p:cNvSpPr>
+            <a:spLocks noGrp="1"/>
+          </p:cNvSpPr>
+          <p:nvPr>
+            <p:ph type="title"/>
+          </p:nvPr>
+        </p:nvSpPr>
+        <p:spPr/>
+        <p:txBody>
+          <a:bodyPr/>
+          <a:lstStyle/>
+          <a:p>
+            <a:endParaRPr lang="en-US"/>
+          </a:p>
+        </p:txBody>
+      </p:sp>
+      <p:sp>
+        <p:nvSpPr>
+          <p:cNvPr id="3" name="Content Placeholder 2">
+            <a:extLst>
+              <a:ext uri="{FF2B5EF4-FFF2-40B4-BE49-F238E27FC236}">
+                <a16:creationId xmlns:a16="http://schemas.microsoft.com/office/drawing/2014/main" id="{5F4BDAFF-9A61-43B1-AB47-BB2852EB9BF2}"/>
+              </a:ext>
+            </a:extLst>
+          </p:cNvPr>
+          <p:cNvSpPr>
+            <a:spLocks noGrp="1"/>
+          </p:cNvSpPr>
+          <p:nvPr>
+            <p:ph idx="1"/>
+          </p:nvPr>
+        </p:nvSpPr>
+        <p:spPr/>
+        <p:txBody>
+          <a:bodyPr/>
+          <a:lstStyle/>
+          <a:p>
+            <a:endParaRPr lang="en-US"/>
+          </a:p>
+        </p:txBody>
+      </p:sp>
+      <p:pic>
+        <p:nvPicPr>
+          <p:cNvPr id="4" name="Picture 3">
+            <a:extLst>
+              <a:ext uri="{FF2B5EF4-FFF2-40B4-BE49-F238E27FC236}">
+                <a16:creationId xmlns:a16="http://schemas.microsoft.com/office/drawing/2014/main" id="{B5E13391-4727-4B31-9D58-51A7EEEE0029}"/>
+              </a:ext>
+            </a:extLst>
+          </p:cNvPr>
+          <p:cNvPicPr>
+            <a:picLocks noChangeAspect="1"/>
+          </p:cNvPicPr>
+          <p:nvPr/>
+        </p:nvPicPr>
+        <p:blipFill rotWithShape="1">
+          <a:blip r:embed="rId2">
+            <a:extLst>
+              <a:ext uri="{28A0092B-C50C-407E-A947-70E740481C1C}">
+                <a14:useLocalDpi xmlns:a14="http://schemas.microsoft.com/office/drawing/2010/main" val="0"/>
+              </a:ext>
+            </a:extLst>
+          </a:blip>
+          <a:srcRect b="4854"/>
+          <a:stretch/>
+        </p:blipFill>
+        <p:spPr>
+          <a:xfrm>
+            <a:off x="10668000" y="274206"/>
+            <a:ext cx="1165961" cy="1261632"/>
+          </a:xfrm>
+          <a:prstGeom prst="rect">
+            <a:avLst/>
+          </a:prstGeom>
+        </p:spPr>
+      </p:pic>
+    </p:spTree>
+    <p:extLst>
+      <p:ext uri="{BB962C8B-B14F-4D97-AF65-F5344CB8AC3E}">
+        <p14:creationId xmlns:p14="http://schemas.microsoft.com/office/powerpoint/2010/main" val="493954844"/>
+      </p:ext>
+    </p:extLst>
+  </p:cSld>
+  <p:clrMapOvr>
+    <a:masterClrMapping/>
+  </p:clrMapOvr>
+</p:sld>
+</file>
+
+<file path=ppt/slides/slide3.xml><?xml version="1.0" encoding="utf-8"?>
+<p:sld xmlns:a="http://schemas.openxmlformats.org/drawingml/2006/main" xmlns:r="http://schemas.openxmlformats.org/officeDocument/2006/relationships" xmlns:p="http://schemas.openxmlformats.org/presentationml/2006/main">
+  <p:cSld>
+    <p:spTree>
+      <p:nvGrpSpPr>
+        <p:cNvPr id="1" name=""/>
+        <p:cNvGrpSpPr/>
+        <p:nvPr/>
+      </p:nvGrpSpPr>
+      <p:grpSpPr>
+        <a:xfrm>
+          <a:off x="0" y="0"/>
+          <a:ext cx="0" cy="0"/>
+          <a:chOff x="0" y="0"/>
+          <a:chExt cx="0" cy="0"/>
+        </a:xfrm>
+      </p:grpSpPr>
+      <p:sp>
+        <p:nvSpPr>
+          <p:cNvPr id="2" name="Title 1">
+            <a:extLst>
+              <a:ext uri="{FF2B5EF4-FFF2-40B4-BE49-F238E27FC236}">
+                <a16:creationId xmlns:a16="http://schemas.microsoft.com/office/drawing/2014/main" id="{EC527E12-5ABB-46AE-B42F-5AD39130599C}"/>
+              </a:ext>
+            </a:extLst>
+          </p:cNvPr>
+          <p:cNvSpPr>
+            <a:spLocks noGrp="1"/>
+          </p:cNvSpPr>
+          <p:nvPr>
+            <p:ph type="title"/>
+          </p:nvPr>
+        </p:nvSpPr>
+        <p:spPr/>
+        <p:txBody>
+          <a:bodyPr/>
+          <a:lstStyle/>
+          <a:p>
+            <a:endParaRPr lang="en-US" dirty="0"/>
+          </a:p>
+        </p:txBody>
+      </p:sp>
+      <p:sp>
+        <p:nvSpPr>
+          <p:cNvPr id="3" name="Content Placeholder 2">
+            <a:extLst>
+              <a:ext uri="{FF2B5EF4-FFF2-40B4-BE49-F238E27FC236}">
+                <a16:creationId xmlns:a16="http://schemas.microsoft.com/office/drawing/2014/main" id="{BF94A29D-BF3A-433D-A91F-466B674AEC2D}"/>
+              </a:ext>
+            </a:extLst>
+          </p:cNvPr>
+          <p:cNvSpPr>
+            <a:spLocks noGrp="1"/>
+          </p:cNvSpPr>
+          <p:nvPr>
+            <p:ph idx="1"/>
+          </p:nvPr>
+        </p:nvSpPr>
+        <p:spPr/>
+        <p:txBody>
+          <a:bodyPr/>
+          <a:lstStyle/>
+          <a:p>
+            <a:endParaRPr lang="en-US"/>
+          </a:p>
+        </p:txBody>
+      </p:sp>
+      <p:pic>
+        <p:nvPicPr>
+          <p:cNvPr id="4" name="Picture 3">
+            <a:extLst>
+              <a:ext uri="{FF2B5EF4-FFF2-40B4-BE49-F238E27FC236}">
+                <a16:creationId xmlns:a16="http://schemas.microsoft.com/office/drawing/2014/main" id="{BFD91C59-593D-47B3-B3E5-62B335B09ED1}"/>
+              </a:ext>
+            </a:extLst>
+          </p:cNvPr>
+          <p:cNvPicPr>
+            <a:picLocks noChangeAspect="1"/>
+          </p:cNvPicPr>
+          <p:nvPr/>
+        </p:nvPicPr>
+        <p:blipFill rotWithShape="1">
+          <a:blip r:embed="rId2">
+            <a:extLst>
+              <a:ext uri="{28A0092B-C50C-407E-A947-70E740481C1C}">
+                <a14:useLocalDpi xmlns:a14="http://schemas.microsoft.com/office/drawing/2010/main" val="0"/>
+              </a:ext>
+            </a:extLst>
+          </a:blip>
+          <a:srcRect b="4854"/>
+          <a:stretch/>
+        </p:blipFill>
+        <p:spPr>
+          <a:xfrm>
+            <a:off x="10668000" y="274206"/>
+            <a:ext cx="1165961" cy="1261632"/>
+          </a:xfrm>
+          <a:prstGeom prst="rect">
+            <a:avLst/>
+          </a:prstGeom>
+        </p:spPr>
+      </p:pic>
+    </p:spTree>
+    <p:extLst>
+      <p:ext uri="{BB962C8B-B14F-4D97-AF65-F5344CB8AC3E}">
+        <p14:creationId xmlns:p14="http://schemas.microsoft.com/office/powerpoint/2010/main" val="2656280033"/>
+      </p:ext>
+    </p:extLst>
+  </p:cSld>
+  <p:clrMapOvr>
+    <a:masterClrMapping/>
+  </p:clrMapOvr>
+</p:sld>
+</file>
+
+<file path=ppt/slides/slide4.xml><?xml version="1.0" encoding="utf-8"?>
+<p:sld xmlns:a="http://schemas.openxmlformats.org/drawingml/2006/main" xmlns:r="http://schemas.openxmlformats.org/officeDocument/2006/relationships" xmlns:p="http://schemas.openxmlformats.org/presentationml/2006/main">
+  <p:cSld>
+    <p:spTree>
+      <p:nvGrpSpPr>
+        <p:cNvPr id="1" name=""/>
+        <p:cNvGrpSpPr/>
+        <p:nvPr/>
+      </p:nvGrpSpPr>
+      <p:grpSpPr>
+        <a:xfrm>
+          <a:off x="0" y="0"/>
+          <a:ext cx="0" cy="0"/>
+          <a:chOff x="0" y="0"/>
+          <a:chExt cx="0" cy="0"/>
+        </a:xfrm>
+      </p:grpSpPr>
+      <p:sp>
+        <p:nvSpPr>
+          <p:cNvPr id="2" name="Title 1">
+            <a:extLst>
+              <a:ext uri="{FF2B5EF4-FFF2-40B4-BE49-F238E27FC236}">
+                <a16:creationId xmlns:a16="http://schemas.microsoft.com/office/drawing/2014/main" id="{E4F6A585-3595-47A4-9A67-CFC820CE4051}"/>
+              </a:ext>
+            </a:extLst>
+          </p:cNvPr>
+          <p:cNvSpPr>
+            <a:spLocks noGrp="1"/>
+          </p:cNvSpPr>
+          <p:nvPr>
+            <p:ph type="title"/>
+          </p:nvPr>
+        </p:nvSpPr>
+        <p:spPr/>
+        <p:txBody>
+          <a:bodyPr/>
+          <a:lstStyle/>
+          <a:p>
+            <a:r>
+              <a:rPr lang="en-US" dirty="0"/>
+              <a:t>Josh – Level Design</a:t>
+            </a:r>
+          </a:p>
+        </p:txBody>
+      </p:sp>
+      <p:sp>
+        <p:nvSpPr>
+          <p:cNvPr id="3" name="Content Placeholder 2">
+            <a:extLst>
+              <a:ext uri="{FF2B5EF4-FFF2-40B4-BE49-F238E27FC236}">
+                <a16:creationId xmlns:a16="http://schemas.microsoft.com/office/drawing/2014/main" id="{107B3ED8-95F4-48B3-8066-BAB0763C42D6}"/>
+              </a:ext>
+            </a:extLst>
+          </p:cNvPr>
+          <p:cNvSpPr>
+            <a:spLocks noGrp="1"/>
+          </p:cNvSpPr>
+          <p:nvPr>
+            <p:ph idx="1"/>
+          </p:nvPr>
+        </p:nvSpPr>
+        <p:spPr/>
+        <p:txBody>
+          <a:bodyPr>
+            <a:normAutofit/>
+          </a:bodyPr>
+          <a:lstStyle/>
+          <a:p>
+            <a:pPr>
+              <a:buFont typeface="Arial" panose="020B0604020202020204" pitchFamily="34" charset="0"/>
+              <a:buChar char="•"/>
+            </a:pPr>
+            <a:r>
+              <a:rPr lang="en-US" sz="2400" dirty="0"/>
+              <a:t>Creating graphics of stage and objects</a:t>
+            </a:r>
+          </a:p>
+          <a:p>
+            <a:pPr>
+              <a:buFont typeface="Arial" panose="020B0604020202020204" pitchFamily="34" charset="0"/>
+              <a:buChar char="•"/>
+            </a:pPr>
+            <a:r>
+              <a:rPr lang="en-US" sz="2400" dirty="0"/>
+              <a:t>Coordinate with Luis for player character</a:t>
+            </a:r>
+          </a:p>
+          <a:p>
+            <a:pPr>
+              <a:buFont typeface="Arial" panose="020B0604020202020204" pitchFamily="34" charset="0"/>
+              <a:buChar char="•"/>
+            </a:pPr>
+            <a:r>
+              <a:rPr lang="en-US" sz="2400" dirty="0"/>
+              <a:t>Coordinate with Ben for enemy spawn</a:t>
+            </a:r>
+          </a:p>
+          <a:p>
+            <a:pPr>
+              <a:buFont typeface="Arial" panose="020B0604020202020204" pitchFamily="34" charset="0"/>
+              <a:buChar char="•"/>
+            </a:pPr>
+            <a:r>
+              <a:rPr lang="en-US" sz="2400" dirty="0"/>
+              <a:t>Ensuring all objects interact as intended</a:t>
+            </a:r>
+          </a:p>
+          <a:p>
+            <a:pPr>
+              <a:buFont typeface="Arial" panose="020B0604020202020204" pitchFamily="34" charset="0"/>
+              <a:buChar char="•"/>
+            </a:pPr>
+            <a:endParaRPr lang="en-US" sz="2400" dirty="0"/>
+          </a:p>
+          <a:p>
+            <a:pPr>
+              <a:buFont typeface="Arial" panose="020B0604020202020204" pitchFamily="34" charset="0"/>
+              <a:buChar char="•"/>
+            </a:pPr>
+            <a:endParaRPr lang="en-US" sz="2400" dirty="0"/>
+          </a:p>
+          <a:p>
+            <a:pPr>
+              <a:buFont typeface="Arial" panose="020B0604020202020204" pitchFamily="34" charset="0"/>
+              <a:buChar char="•"/>
+            </a:pPr>
+            <a:r>
+              <a:rPr lang="en-US" sz="2400" dirty="0"/>
+              <a:t>Priority level: 1 </a:t>
+            </a:r>
+          </a:p>
+          <a:p>
+            <a:pPr>
+              <a:buFont typeface="Arial" panose="020B0604020202020204" pitchFamily="34" charset="0"/>
+              <a:buChar char="•"/>
+            </a:pPr>
+            <a:r>
+              <a:rPr lang="en-US" sz="2400" dirty="0"/>
+              <a:t>Complexity: Moderate</a:t>
+            </a:r>
+          </a:p>
+        </p:txBody>
+      </p:sp>
+      <p:pic>
+        <p:nvPicPr>
+          <p:cNvPr id="4" name="Picture 3">
+            <a:extLst>
+              <a:ext uri="{FF2B5EF4-FFF2-40B4-BE49-F238E27FC236}">
+                <a16:creationId xmlns:a16="http://schemas.microsoft.com/office/drawing/2014/main" id="{D3D001C3-2F1C-4902-93EC-2F7CED96B72C}"/>
+              </a:ext>
+            </a:extLst>
+          </p:cNvPr>
+          <p:cNvPicPr>
+            <a:picLocks noChangeAspect="1"/>
+          </p:cNvPicPr>
+          <p:nvPr/>
+        </p:nvPicPr>
+        <p:blipFill rotWithShape="1">
+          <a:blip r:embed="rId2">
+            <a:extLst>
+              <a:ext uri="{28A0092B-C50C-407E-A947-70E740481C1C}">
+                <a14:useLocalDpi xmlns:a14="http://schemas.microsoft.com/office/drawing/2010/main" val="0"/>
+              </a:ext>
+            </a:extLst>
+          </a:blip>
+          <a:srcRect b="4854"/>
+          <a:stretch/>
+        </p:blipFill>
+        <p:spPr>
+          <a:xfrm>
+            <a:off x="10668000" y="274206"/>
+            <a:ext cx="1165961" cy="1261632"/>
+          </a:xfrm>
+          <a:prstGeom prst="rect">
+            <a:avLst/>
+          </a:prstGeom>
+        </p:spPr>
+      </p:pic>
+    </p:spTree>
+    <p:extLst>
+      <p:ext uri="{BB962C8B-B14F-4D97-AF65-F5344CB8AC3E}">
+        <p14:creationId xmlns:p14="http://schemas.microsoft.com/office/powerpoint/2010/main" val="1773527019"/>
+      </p:ext>
+    </p:extLst>
+  </p:cSld>
+  <p:clrMapOvr>
+    <a:masterClrMapping/>
+  </p:clrMapOvr>
+</p:sld>
+</file>
+
+<file path=ppt/slides/slide5.xml><?xml version="1.0" encoding="utf-8"?>
+<p:sld xmlns:a="http://schemas.openxmlformats.org/drawingml/2006/main" xmlns:r="http://schemas.openxmlformats.org/officeDocument/2006/relationships" xmlns:p="http://schemas.openxmlformats.org/presentationml/2006/main">
+  <p:cSld>
+    <p:spTree>
+      <p:nvGrpSpPr>
+        <p:cNvPr id="1" name=""/>
+        <p:cNvGrpSpPr/>
+        <p:nvPr/>
+      </p:nvGrpSpPr>
+      <p:grpSpPr>
+        <a:xfrm>
+          <a:off x="0" y="0"/>
+          <a:ext cx="0" cy="0"/>
+          <a:chOff x="0" y="0"/>
+          <a:chExt cx="0" cy="0"/>
+        </a:xfrm>
+      </p:grpSpPr>
+      <p:sp>
+        <p:nvSpPr>
+          <p:cNvPr id="2" name="Title 1">
+            <a:extLst>
+              <a:ext uri="{FF2B5EF4-FFF2-40B4-BE49-F238E27FC236}">
+                <a16:creationId xmlns:a16="http://schemas.microsoft.com/office/drawing/2014/main" id="{C18A8D9F-AA4C-44EA-8182-C698AA82993C}"/>
+              </a:ext>
+            </a:extLst>
+          </p:cNvPr>
+          <p:cNvSpPr>
+            <a:spLocks noGrp="1"/>
+          </p:cNvSpPr>
+          <p:nvPr>
+            <p:ph type="title"/>
+          </p:nvPr>
+        </p:nvSpPr>
+        <p:spPr/>
+        <p:txBody>
+          <a:bodyPr/>
+          <a:lstStyle/>
+          <a:p>
+            <a:r>
+              <a:rPr lang="en-US" dirty="0"/>
+              <a:t>Level Design – Use Case Diagram</a:t>
+            </a:r>
+          </a:p>
+        </p:txBody>
+      </p:sp>
+      <p:pic>
+        <p:nvPicPr>
+          <p:cNvPr id="4" name="Content Placeholder 3">
+            <a:extLst>
+              <a:ext uri="{FF2B5EF4-FFF2-40B4-BE49-F238E27FC236}">
+                <a16:creationId xmlns:a16="http://schemas.microsoft.com/office/drawing/2014/main" id="{841A67F4-B523-4EE5-BFDF-BE34201F77AF}"/>
+              </a:ext>
+            </a:extLst>
+          </p:cNvPr>
+          <p:cNvPicPr>
+            <a:picLocks noGrp="1"/>
+          </p:cNvPicPr>
+          <p:nvPr>
+            <p:ph idx="1"/>
+          </p:nvPr>
+        </p:nvPicPr>
+        <p:blipFill>
+          <a:blip r:embed="rId2"/>
+          <a:stretch>
+            <a:fillRect/>
+          </a:stretch>
+        </p:blipFill>
+        <p:spPr>
+          <a:xfrm>
+            <a:off x="2045368" y="1830221"/>
+            <a:ext cx="7729817" cy="4498390"/>
+          </a:xfrm>
+          <a:prstGeom prst="rect">
+            <a:avLst/>
+          </a:prstGeom>
+        </p:spPr>
+      </p:pic>
+      <p:pic>
+        <p:nvPicPr>
+          <p:cNvPr id="5" name="Picture 4">
+            <a:extLst>
+              <a:ext uri="{FF2B5EF4-FFF2-40B4-BE49-F238E27FC236}">
+                <a16:creationId xmlns:a16="http://schemas.microsoft.com/office/drawing/2014/main" id="{CF5644A5-92DD-450E-9100-37642F765205}"/>
+              </a:ext>
+            </a:extLst>
+          </p:cNvPr>
+          <p:cNvPicPr>
+            <a:picLocks noChangeAspect="1"/>
+          </p:cNvPicPr>
+          <p:nvPr/>
+        </p:nvPicPr>
+        <p:blipFill rotWithShape="1">
+          <a:blip r:embed="rId3">
+            <a:extLst>
+              <a:ext uri="{28A0092B-C50C-407E-A947-70E740481C1C}">
+                <a14:useLocalDpi xmlns:a14="http://schemas.microsoft.com/office/drawing/2010/main" val="0"/>
+              </a:ext>
+            </a:extLst>
+          </a:blip>
+          <a:srcRect b="4854"/>
+          <a:stretch/>
+        </p:blipFill>
+        <p:spPr>
+          <a:xfrm>
+            <a:off x="10668000" y="274206"/>
+            <a:ext cx="1165961" cy="1261632"/>
+          </a:xfrm>
+          <a:prstGeom prst="rect">
+            <a:avLst/>
+          </a:prstGeom>
+        </p:spPr>
+      </p:pic>
+    </p:spTree>
+    <p:extLst>
+      <p:ext uri="{BB962C8B-B14F-4D97-AF65-F5344CB8AC3E}">
+        <p14:creationId xmlns:p14="http://schemas.microsoft.com/office/powerpoint/2010/main" val="2521533170"/>
+      </p:ext>
+    </p:extLst>
+  </p:cSld>
+  <p:clrMapOvr>
+    <a:masterClrMapping/>
+  </p:clrMapOvr>
+</p:sld>
+</file>
+
 <file path=ppt/theme/theme1.xml><?xml version="1.0" encoding="utf-8"?>
 <a:theme xmlns:a="http://schemas.openxmlformats.org/drawingml/2006/main" name="Retrospect">
   <a:themeElements>

</xml_diff>

<commit_message>
Added presentation slides & champion
</commit_message>
<xml_diff>
--- a/docs/Debugger.pptx
+++ b/docs/Debugger.pptx
@@ -1,28 +1,130 @@
 
 <file path=ppt/presentation.xml><?xml version="1.0" encoding="utf-8"?>
-<p:presentation xmlns:a="http://schemas.openxmlformats.org/drawingml/2006/main" xmlns:p="http://schemas.openxmlformats.org/presentationml/2006/main" xmlns:r="http://schemas.openxmlformats.org/officeDocument/2006/relationships" xmlns:p14="http://schemas.microsoft.com/office/powerpoint/2010/main" xmlns:p15="http://schemas.microsoft.com/office/powerpoint/2012/main" xmlns:mc="http://schemas.openxmlformats.org/markup-compatibility/2006">
+<p:presentation xmlns:a="http://schemas.openxmlformats.org/drawingml/2006/main" xmlns:r="http://schemas.openxmlformats.org/officeDocument/2006/relationships" xmlns:p="http://schemas.openxmlformats.org/presentationml/2006/main">
   <p:sldMasterIdLst>
-    <p:sldMasterId id="2147483648" r:id="rId2"/>
-    <p:sldMasterId id="2147483661" r:id="rId3"/>
+    <p:sldMasterId id="2147483648" r:id="rId1"/>
+    <p:sldMasterId id="2147483661" r:id="rId2"/>
   </p:sldMasterIdLst>
   <p:sldIdLst>
-    <p:sldId id="256" r:id="rId4"/>
-    <p:sldId id="257" r:id="rId5"/>
-    <p:sldId id="258" r:id="rId6"/>
-    <p:sldId id="259" r:id="rId7"/>
-    <p:sldId id="260" r:id="rId8"/>
-    <p:sldId id="261" r:id="rId9"/>
-    <p:sldId id="262" r:id="rId10"/>
-    <p:sldId id="263" r:id="rId11"/>
-    <p:sldId id="264" r:id="rId12"/>
+    <p:sldId id="256" r:id="rId3"/>
+    <p:sldId id="257" r:id="rId4"/>
+    <p:sldId id="258" r:id="rId5"/>
+    <p:sldId id="259" r:id="rId6"/>
+    <p:sldId id="260" r:id="rId7"/>
+    <p:sldId id="261" r:id="rId8"/>
+    <p:sldId id="262" r:id="rId9"/>
+    <p:sldId id="263" r:id="rId10"/>
+    <p:sldId id="264" r:id="rId11"/>
+    <p:sldId id="265" r:id="rId12"/>
+    <p:sldId id="266" r:id="rId13"/>
   </p:sldIdLst>
   <p:sldSz cx="12192000" cy="6858000"/>
   <p:notesSz cx="7772400" cy="10058400"/>
+  <p:defaultTextStyle>
+    <a:defPPr>
+      <a:defRPr lang="en-US"/>
+    </a:defPPr>
+    <a:lvl1pPr marL="0" algn="l" defTabSz="914400" rtl="0" eaLnBrk="1" latinLnBrk="0" hangingPunct="1">
+      <a:defRPr sz="1800" kern="1200">
+        <a:solidFill>
+          <a:schemeClr val="tx1"/>
+        </a:solidFill>
+        <a:latin typeface="+mn-lt"/>
+        <a:ea typeface="+mn-ea"/>
+        <a:cs typeface="+mn-cs"/>
+      </a:defRPr>
+    </a:lvl1pPr>
+    <a:lvl2pPr marL="457200" algn="l" defTabSz="914400" rtl="0" eaLnBrk="1" latinLnBrk="0" hangingPunct="1">
+      <a:defRPr sz="1800" kern="1200">
+        <a:solidFill>
+          <a:schemeClr val="tx1"/>
+        </a:solidFill>
+        <a:latin typeface="+mn-lt"/>
+        <a:ea typeface="+mn-ea"/>
+        <a:cs typeface="+mn-cs"/>
+      </a:defRPr>
+    </a:lvl2pPr>
+    <a:lvl3pPr marL="914400" algn="l" defTabSz="914400" rtl="0" eaLnBrk="1" latinLnBrk="0" hangingPunct="1">
+      <a:defRPr sz="1800" kern="1200">
+        <a:solidFill>
+          <a:schemeClr val="tx1"/>
+        </a:solidFill>
+        <a:latin typeface="+mn-lt"/>
+        <a:ea typeface="+mn-ea"/>
+        <a:cs typeface="+mn-cs"/>
+      </a:defRPr>
+    </a:lvl3pPr>
+    <a:lvl4pPr marL="1371600" algn="l" defTabSz="914400" rtl="0" eaLnBrk="1" latinLnBrk="0" hangingPunct="1">
+      <a:defRPr sz="1800" kern="1200">
+        <a:solidFill>
+          <a:schemeClr val="tx1"/>
+        </a:solidFill>
+        <a:latin typeface="+mn-lt"/>
+        <a:ea typeface="+mn-ea"/>
+        <a:cs typeface="+mn-cs"/>
+      </a:defRPr>
+    </a:lvl4pPr>
+    <a:lvl5pPr marL="1828800" algn="l" defTabSz="914400" rtl="0" eaLnBrk="1" latinLnBrk="0" hangingPunct="1">
+      <a:defRPr sz="1800" kern="1200">
+        <a:solidFill>
+          <a:schemeClr val="tx1"/>
+        </a:solidFill>
+        <a:latin typeface="+mn-lt"/>
+        <a:ea typeface="+mn-ea"/>
+        <a:cs typeface="+mn-cs"/>
+      </a:defRPr>
+    </a:lvl5pPr>
+    <a:lvl6pPr marL="2286000" algn="l" defTabSz="914400" rtl="0" eaLnBrk="1" latinLnBrk="0" hangingPunct="1">
+      <a:defRPr sz="1800" kern="1200">
+        <a:solidFill>
+          <a:schemeClr val="tx1"/>
+        </a:solidFill>
+        <a:latin typeface="+mn-lt"/>
+        <a:ea typeface="+mn-ea"/>
+        <a:cs typeface="+mn-cs"/>
+      </a:defRPr>
+    </a:lvl6pPr>
+    <a:lvl7pPr marL="2743200" algn="l" defTabSz="914400" rtl="0" eaLnBrk="1" latinLnBrk="0" hangingPunct="1">
+      <a:defRPr sz="1800" kern="1200">
+        <a:solidFill>
+          <a:schemeClr val="tx1"/>
+        </a:solidFill>
+        <a:latin typeface="+mn-lt"/>
+        <a:ea typeface="+mn-ea"/>
+        <a:cs typeface="+mn-cs"/>
+      </a:defRPr>
+    </a:lvl7pPr>
+    <a:lvl8pPr marL="3200400" algn="l" defTabSz="914400" rtl="0" eaLnBrk="1" latinLnBrk="0" hangingPunct="1">
+      <a:defRPr sz="1800" kern="1200">
+        <a:solidFill>
+          <a:schemeClr val="tx1"/>
+        </a:solidFill>
+        <a:latin typeface="+mn-lt"/>
+        <a:ea typeface="+mn-ea"/>
+        <a:cs typeface="+mn-cs"/>
+      </a:defRPr>
+    </a:lvl8pPr>
+    <a:lvl9pPr marL="3657600" algn="l" defTabSz="914400" rtl="0" eaLnBrk="1" latinLnBrk="0" hangingPunct="1">
+      <a:defRPr sz="1800" kern="1200">
+        <a:solidFill>
+          <a:schemeClr val="tx1"/>
+        </a:solidFill>
+        <a:latin typeface="+mn-lt"/>
+        <a:ea typeface="+mn-ea"/>
+        <a:cs typeface="+mn-cs"/>
+      </a:defRPr>
+    </a:lvl9pPr>
+  </p:defaultTextStyle>
+  <p:extLst>
+    <p:ext uri="{EFAFB233-063F-42B5-8137-9DF3F51BA10A}">
+      <p15:sldGuideLst xmlns:p15="http://schemas.microsoft.com/office/powerpoint/2012/main"/>
+    </p:ext>
+  </p:extLst>
 </p:presentation>
 </file>
 
 <file path=ppt/slideLayouts/slideLayout1.xml><?xml version="1.0" encoding="utf-8"?>
-<p:sldLayout xmlns:a="http://schemas.openxmlformats.org/drawingml/2006/main" xmlns:p="http://schemas.openxmlformats.org/presentationml/2006/main" xmlns:r="http://schemas.openxmlformats.org/officeDocument/2006/relationships" xmlns:p14="http://schemas.microsoft.com/office/powerpoint/2010/main" xmlns:p15="http://schemas.microsoft.com/office/powerpoint/2012/main" xmlns:mc="http://schemas.openxmlformats.org/markup-compatibility/2006" type="blank" preserve="1">
+<p:sldLayout xmlns:a="http://schemas.openxmlformats.org/drawingml/2006/main" xmlns:r="http://schemas.openxmlformats.org/officeDocument/2006/relationships" xmlns:p="http://schemas.openxmlformats.org/presentationml/2006/main" type="blank" preserve="1">
   <p:cSld name="Blank Slide">
     <p:spTree>
       <p:nvGrpSpPr>
@@ -40,11 +142,14 @@
       </p:grpSpPr>
     </p:spTree>
   </p:cSld>
+  <p:clrMapOvr>
+    <a:masterClrMapping/>
+  </p:clrMapOvr>
 </p:sldLayout>
 </file>
 
 <file path=ppt/slideLayouts/slideLayout10.xml><?xml version="1.0" encoding="utf-8"?>
-<p:sldLayout xmlns:a="http://schemas.openxmlformats.org/drawingml/2006/main" xmlns:p="http://schemas.openxmlformats.org/presentationml/2006/main" xmlns:r="http://schemas.openxmlformats.org/officeDocument/2006/relationships" xmlns:p14="http://schemas.microsoft.com/office/powerpoint/2010/main" xmlns:p15="http://schemas.microsoft.com/office/powerpoint/2012/main" xmlns:mc="http://schemas.openxmlformats.org/markup-compatibility/2006" type="objOverTx" preserve="1">
+<p:sldLayout xmlns:a="http://schemas.openxmlformats.org/drawingml/2006/main" xmlns:r="http://schemas.openxmlformats.org/officeDocument/2006/relationships" xmlns:p="http://schemas.openxmlformats.org/presentationml/2006/main" type="objOverTx" preserve="1">
   <p:cSld name="Title, Content over Content">
     <p:spTree>
       <p:nvGrpSpPr>
@@ -80,9 +185,10 @@
           </a:prstGeom>
         </p:spPr>
         <p:txBody>
-          <a:bodyPr lIns="0" rIns="0" tIns="0" bIns="0" anchor="ctr"/>
-          <a:p>
-            <a:endParaRPr b="0" lang="en-US" sz="1800" spc="-1" strike="noStrike">
+          <a:bodyPr lIns="0" tIns="0" rIns="0" bIns="0" anchor="ctr"/>
+          <a:lstStyle/>
+          <a:p>
+            <a:endParaRPr lang="en-US" sz="1800" b="0" strike="noStrike" spc="-1">
               <a:solidFill>
                 <a:srgbClr val="000000"/>
               </a:solidFill>
@@ -111,11 +217,12 @@
           </a:prstGeom>
         </p:spPr>
         <p:txBody>
-          <a:bodyPr lIns="0" rIns="0" tIns="0" bIns="0">
+          <a:bodyPr lIns="0" tIns="0" rIns="0" bIns="0">
             <a:normAutofit/>
           </a:bodyPr>
-          <a:p>
-            <a:endParaRPr b="0" lang="en-US" sz="2000" spc="-1" strike="noStrike">
+          <a:lstStyle/>
+          <a:p>
+            <a:endParaRPr lang="en-US" sz="2000" b="0" strike="noStrike" spc="-1">
               <a:solidFill>
                 <a:srgbClr val="404040"/>
               </a:solidFill>
@@ -144,11 +251,12 @@
           </a:prstGeom>
         </p:spPr>
         <p:txBody>
-          <a:bodyPr lIns="0" rIns="0" tIns="0" bIns="0">
+          <a:bodyPr lIns="0" tIns="0" rIns="0" bIns="0">
             <a:normAutofit/>
           </a:bodyPr>
-          <a:p>
-            <a:endParaRPr b="0" lang="en-US" sz="2000" spc="-1" strike="noStrike">
+          <a:lstStyle/>
+          <a:p>
+            <a:endParaRPr lang="en-US" sz="2000" b="0" strike="noStrike" spc="-1">
               <a:solidFill>
                 <a:srgbClr val="404040"/>
               </a:solidFill>
@@ -159,11 +267,14 @@
       </p:sp>
     </p:spTree>
   </p:cSld>
+  <p:clrMapOvr>
+    <a:masterClrMapping/>
+  </p:clrMapOvr>
 </p:sldLayout>
 </file>
 
 <file path=ppt/slideLayouts/slideLayout11.xml><?xml version="1.0" encoding="utf-8"?>
-<p:sldLayout xmlns:a="http://schemas.openxmlformats.org/drawingml/2006/main" xmlns:p="http://schemas.openxmlformats.org/presentationml/2006/main" xmlns:r="http://schemas.openxmlformats.org/officeDocument/2006/relationships" xmlns:p14="http://schemas.microsoft.com/office/powerpoint/2010/main" xmlns:p15="http://schemas.microsoft.com/office/powerpoint/2012/main" xmlns:mc="http://schemas.openxmlformats.org/markup-compatibility/2006" type="fourObj" preserve="1">
+<p:sldLayout xmlns:a="http://schemas.openxmlformats.org/drawingml/2006/main" xmlns:r="http://schemas.openxmlformats.org/officeDocument/2006/relationships" xmlns:p="http://schemas.openxmlformats.org/presentationml/2006/main" type="fourObj" preserve="1">
   <p:cSld name="Title, 4 Content">
     <p:spTree>
       <p:nvGrpSpPr>
@@ -199,9 +310,10 @@
           </a:prstGeom>
         </p:spPr>
         <p:txBody>
-          <a:bodyPr lIns="0" rIns="0" tIns="0" bIns="0" anchor="ctr"/>
-          <a:p>
-            <a:endParaRPr b="0" lang="en-US" sz="1800" spc="-1" strike="noStrike">
+          <a:bodyPr lIns="0" tIns="0" rIns="0" bIns="0" anchor="ctr"/>
+          <a:lstStyle/>
+          <a:p>
+            <a:endParaRPr lang="en-US" sz="1800" b="0" strike="noStrike" spc="-1">
               <a:solidFill>
                 <a:srgbClr val="000000"/>
               </a:solidFill>
@@ -230,11 +342,12 @@
           </a:prstGeom>
         </p:spPr>
         <p:txBody>
-          <a:bodyPr lIns="0" rIns="0" tIns="0" bIns="0">
+          <a:bodyPr lIns="0" tIns="0" rIns="0" bIns="0">
             <a:normAutofit/>
           </a:bodyPr>
-          <a:p>
-            <a:endParaRPr b="0" lang="en-US" sz="2000" spc="-1" strike="noStrike">
+          <a:lstStyle/>
+          <a:p>
+            <a:endParaRPr lang="en-US" sz="2000" b="0" strike="noStrike" spc="-1">
               <a:solidFill>
                 <a:srgbClr val="404040"/>
               </a:solidFill>
@@ -263,11 +376,12 @@
           </a:prstGeom>
         </p:spPr>
         <p:txBody>
-          <a:bodyPr lIns="0" rIns="0" tIns="0" bIns="0">
+          <a:bodyPr lIns="0" tIns="0" rIns="0" bIns="0">
             <a:normAutofit/>
           </a:bodyPr>
-          <a:p>
-            <a:endParaRPr b="0" lang="en-US" sz="2000" spc="-1" strike="noStrike">
+          <a:lstStyle/>
+          <a:p>
+            <a:endParaRPr lang="en-US" sz="2000" b="0" strike="noStrike" spc="-1">
               <a:solidFill>
                 <a:srgbClr val="404040"/>
               </a:solidFill>
@@ -296,11 +410,12 @@
           </a:prstGeom>
         </p:spPr>
         <p:txBody>
-          <a:bodyPr lIns="0" rIns="0" tIns="0" bIns="0">
+          <a:bodyPr lIns="0" tIns="0" rIns="0" bIns="0">
             <a:normAutofit/>
           </a:bodyPr>
-          <a:p>
-            <a:endParaRPr b="0" lang="en-US" sz="2000" spc="-1" strike="noStrike">
+          <a:lstStyle/>
+          <a:p>
+            <a:endParaRPr lang="en-US" sz="2000" b="0" strike="noStrike" spc="-1">
               <a:solidFill>
                 <a:srgbClr val="404040"/>
               </a:solidFill>
@@ -329,11 +444,12 @@
           </a:prstGeom>
         </p:spPr>
         <p:txBody>
-          <a:bodyPr lIns="0" rIns="0" tIns="0" bIns="0">
+          <a:bodyPr lIns="0" tIns="0" rIns="0" bIns="0">
             <a:normAutofit/>
           </a:bodyPr>
-          <a:p>
-            <a:endParaRPr b="0" lang="en-US" sz="2000" spc="-1" strike="noStrike">
+          <a:lstStyle/>
+          <a:p>
+            <a:endParaRPr lang="en-US" sz="2000" b="0" strike="noStrike" spc="-1">
               <a:solidFill>
                 <a:srgbClr val="404040"/>
               </a:solidFill>
@@ -344,11 +460,14 @@
       </p:sp>
     </p:spTree>
   </p:cSld>
+  <p:clrMapOvr>
+    <a:masterClrMapping/>
+  </p:clrMapOvr>
 </p:sldLayout>
 </file>
 
 <file path=ppt/slideLayouts/slideLayout12.xml><?xml version="1.0" encoding="utf-8"?>
-<p:sldLayout xmlns:a="http://schemas.openxmlformats.org/drawingml/2006/main" xmlns:p="http://schemas.openxmlformats.org/presentationml/2006/main" xmlns:r="http://schemas.openxmlformats.org/officeDocument/2006/relationships" xmlns:p14="http://schemas.microsoft.com/office/powerpoint/2010/main" xmlns:p15="http://schemas.microsoft.com/office/powerpoint/2012/main" xmlns:mc="http://schemas.openxmlformats.org/markup-compatibility/2006" type="blank" preserve="1">
+<p:sldLayout xmlns:a="http://schemas.openxmlformats.org/drawingml/2006/main" xmlns:r="http://schemas.openxmlformats.org/officeDocument/2006/relationships" xmlns:p="http://schemas.openxmlformats.org/presentationml/2006/main" type="blank" preserve="1">
   <p:cSld name="Title, 6 Content">
     <p:spTree>
       <p:nvGrpSpPr>
@@ -384,9 +503,10 @@
           </a:prstGeom>
         </p:spPr>
         <p:txBody>
-          <a:bodyPr lIns="0" rIns="0" tIns="0" bIns="0" anchor="ctr"/>
-          <a:p>
-            <a:endParaRPr b="0" lang="en-US" sz="1800" spc="-1" strike="noStrike">
+          <a:bodyPr lIns="0" tIns="0" rIns="0" bIns="0" anchor="ctr"/>
+          <a:lstStyle/>
+          <a:p>
+            <a:endParaRPr lang="en-US" sz="1800" b="0" strike="noStrike" spc="-1">
               <a:solidFill>
                 <a:srgbClr val="000000"/>
               </a:solidFill>
@@ -415,11 +535,12 @@
           </a:prstGeom>
         </p:spPr>
         <p:txBody>
-          <a:bodyPr lIns="0" rIns="0" tIns="0" bIns="0">
+          <a:bodyPr lIns="0" tIns="0" rIns="0" bIns="0">
             <a:normAutofit/>
           </a:bodyPr>
-          <a:p>
-            <a:endParaRPr b="0" lang="en-US" sz="2000" spc="-1" strike="noStrike">
+          <a:lstStyle/>
+          <a:p>
+            <a:endParaRPr lang="en-US" sz="2000" b="0" strike="noStrike" spc="-1">
               <a:solidFill>
                 <a:srgbClr val="404040"/>
               </a:solidFill>
@@ -448,11 +569,12 @@
           </a:prstGeom>
         </p:spPr>
         <p:txBody>
-          <a:bodyPr lIns="0" rIns="0" tIns="0" bIns="0">
+          <a:bodyPr lIns="0" tIns="0" rIns="0" bIns="0">
             <a:normAutofit/>
           </a:bodyPr>
-          <a:p>
-            <a:endParaRPr b="0" lang="en-US" sz="2000" spc="-1" strike="noStrike">
+          <a:lstStyle/>
+          <a:p>
+            <a:endParaRPr lang="en-US" sz="2000" b="0" strike="noStrike" spc="-1">
               <a:solidFill>
                 <a:srgbClr val="404040"/>
               </a:solidFill>
@@ -481,11 +603,12 @@
           </a:prstGeom>
         </p:spPr>
         <p:txBody>
-          <a:bodyPr lIns="0" rIns="0" tIns="0" bIns="0">
+          <a:bodyPr lIns="0" tIns="0" rIns="0" bIns="0">
             <a:normAutofit/>
           </a:bodyPr>
-          <a:p>
-            <a:endParaRPr b="0" lang="en-US" sz="2000" spc="-1" strike="noStrike">
+          <a:lstStyle/>
+          <a:p>
+            <a:endParaRPr lang="en-US" sz="2000" b="0" strike="noStrike" spc="-1">
               <a:solidFill>
                 <a:srgbClr val="404040"/>
               </a:solidFill>
@@ -514,11 +637,12 @@
           </a:prstGeom>
         </p:spPr>
         <p:txBody>
-          <a:bodyPr lIns="0" rIns="0" tIns="0" bIns="0">
+          <a:bodyPr lIns="0" tIns="0" rIns="0" bIns="0">
             <a:normAutofit/>
           </a:bodyPr>
-          <a:p>
-            <a:endParaRPr b="0" lang="en-US" sz="2000" spc="-1" strike="noStrike">
+          <a:lstStyle/>
+          <a:p>
+            <a:endParaRPr lang="en-US" sz="2000" b="0" strike="noStrike" spc="-1">
               <a:solidFill>
                 <a:srgbClr val="404040"/>
               </a:solidFill>
@@ -547,11 +671,12 @@
           </a:prstGeom>
         </p:spPr>
         <p:txBody>
-          <a:bodyPr lIns="0" rIns="0" tIns="0" bIns="0">
+          <a:bodyPr lIns="0" tIns="0" rIns="0" bIns="0">
             <a:normAutofit/>
           </a:bodyPr>
-          <a:p>
-            <a:endParaRPr b="0" lang="en-US" sz="2000" spc="-1" strike="noStrike">
+          <a:lstStyle/>
+          <a:p>
+            <a:endParaRPr lang="en-US" sz="2000" b="0" strike="noStrike" spc="-1">
               <a:solidFill>
                 <a:srgbClr val="404040"/>
               </a:solidFill>
@@ -580,11 +705,12 @@
           </a:prstGeom>
         </p:spPr>
         <p:txBody>
-          <a:bodyPr lIns="0" rIns="0" tIns="0" bIns="0">
+          <a:bodyPr lIns="0" tIns="0" rIns="0" bIns="0">
             <a:normAutofit/>
           </a:bodyPr>
-          <a:p>
-            <a:endParaRPr b="0" lang="en-US" sz="2000" spc="-1" strike="noStrike">
+          <a:lstStyle/>
+          <a:p>
+            <a:endParaRPr lang="en-US" sz="2000" b="0" strike="noStrike" spc="-1">
               <a:solidFill>
                 <a:srgbClr val="404040"/>
               </a:solidFill>
@@ -595,11 +721,14 @@
       </p:sp>
     </p:spTree>
   </p:cSld>
+  <p:clrMapOvr>
+    <a:masterClrMapping/>
+  </p:clrMapOvr>
 </p:sldLayout>
 </file>
 
 <file path=ppt/slideLayouts/slideLayout13.xml><?xml version="1.0" encoding="utf-8"?>
-<p:sldLayout xmlns:a="http://schemas.openxmlformats.org/drawingml/2006/main" xmlns:p="http://schemas.openxmlformats.org/presentationml/2006/main" xmlns:r="http://schemas.openxmlformats.org/officeDocument/2006/relationships" xmlns:p14="http://schemas.microsoft.com/office/powerpoint/2010/main" xmlns:p15="http://schemas.microsoft.com/office/powerpoint/2012/main" xmlns:mc="http://schemas.openxmlformats.org/markup-compatibility/2006" type="blank" preserve="1">
+<p:sldLayout xmlns:a="http://schemas.openxmlformats.org/drawingml/2006/main" xmlns:r="http://schemas.openxmlformats.org/officeDocument/2006/relationships" xmlns:p="http://schemas.openxmlformats.org/presentationml/2006/main" type="blank" preserve="1">
   <p:cSld name="Blank Slide">
     <p:spTree>
       <p:nvGrpSpPr>
@@ -617,11 +746,14 @@
       </p:grpSpPr>
     </p:spTree>
   </p:cSld>
+  <p:clrMapOvr>
+    <a:masterClrMapping/>
+  </p:clrMapOvr>
 </p:sldLayout>
 </file>
 
 <file path=ppt/slideLayouts/slideLayout14.xml><?xml version="1.0" encoding="utf-8"?>
-<p:sldLayout xmlns:a="http://schemas.openxmlformats.org/drawingml/2006/main" xmlns:p="http://schemas.openxmlformats.org/presentationml/2006/main" xmlns:r="http://schemas.openxmlformats.org/officeDocument/2006/relationships" xmlns:p14="http://schemas.microsoft.com/office/powerpoint/2010/main" xmlns:p15="http://schemas.microsoft.com/office/powerpoint/2012/main" xmlns:mc="http://schemas.openxmlformats.org/markup-compatibility/2006" type="tx" preserve="1">
+<p:sldLayout xmlns:a="http://schemas.openxmlformats.org/drawingml/2006/main" xmlns:r="http://schemas.openxmlformats.org/officeDocument/2006/relationships" xmlns:p="http://schemas.openxmlformats.org/presentationml/2006/main" type="tx" preserve="1">
   <p:cSld name="Title Slide">
     <p:spTree>
       <p:nvGrpSpPr>
@@ -657,9 +789,10 @@
           </a:prstGeom>
         </p:spPr>
         <p:txBody>
-          <a:bodyPr lIns="0" rIns="0" tIns="0" bIns="0" anchor="ctr"/>
-          <a:p>
-            <a:endParaRPr b="0" lang="en-US" sz="1800" spc="-1" strike="noStrike">
+          <a:bodyPr lIns="0" tIns="0" rIns="0" bIns="0" anchor="ctr"/>
+          <a:lstStyle/>
+          <a:p>
+            <a:endParaRPr lang="en-US" sz="1800" b="0" strike="noStrike" spc="-1">
               <a:solidFill>
                 <a:srgbClr val="000000"/>
               </a:solidFill>
@@ -688,10 +821,11 @@
           </a:prstGeom>
         </p:spPr>
         <p:txBody>
-          <a:bodyPr lIns="0" rIns="0" tIns="0" bIns="0" anchor="ctr"/>
+          <a:bodyPr lIns="0" tIns="0" rIns="0" bIns="0" anchor="ctr"/>
+          <a:lstStyle/>
           <a:p>
             <a:pPr algn="ctr"/>
-            <a:endParaRPr b="0" lang="en-US" sz="3200" spc="-1" strike="noStrike">
+            <a:endParaRPr lang="en-US" sz="3200" b="0" strike="noStrike" spc="-1">
               <a:latin typeface="Arial"/>
             </a:endParaRPr>
           </a:p>
@@ -699,11 +833,14 @@
       </p:sp>
     </p:spTree>
   </p:cSld>
+  <p:clrMapOvr>
+    <a:masterClrMapping/>
+  </p:clrMapOvr>
 </p:sldLayout>
 </file>
 
 <file path=ppt/slideLayouts/slideLayout15.xml><?xml version="1.0" encoding="utf-8"?>
-<p:sldLayout xmlns:a="http://schemas.openxmlformats.org/drawingml/2006/main" xmlns:p="http://schemas.openxmlformats.org/presentationml/2006/main" xmlns:r="http://schemas.openxmlformats.org/officeDocument/2006/relationships" xmlns:p14="http://schemas.microsoft.com/office/powerpoint/2010/main" xmlns:p15="http://schemas.microsoft.com/office/powerpoint/2012/main" xmlns:mc="http://schemas.openxmlformats.org/markup-compatibility/2006" type="obj" preserve="1">
+<p:sldLayout xmlns:a="http://schemas.openxmlformats.org/drawingml/2006/main" xmlns:r="http://schemas.openxmlformats.org/officeDocument/2006/relationships" xmlns:p="http://schemas.openxmlformats.org/presentationml/2006/main" type="obj" preserve="1">
   <p:cSld name="Title, Content">
     <p:spTree>
       <p:nvGrpSpPr>
@@ -739,9 +876,10 @@
           </a:prstGeom>
         </p:spPr>
         <p:txBody>
-          <a:bodyPr lIns="0" rIns="0" tIns="0" bIns="0" anchor="ctr"/>
-          <a:p>
-            <a:endParaRPr b="0" lang="en-US" sz="1800" spc="-1" strike="noStrike">
+          <a:bodyPr lIns="0" tIns="0" rIns="0" bIns="0" anchor="ctr"/>
+          <a:lstStyle/>
+          <a:p>
+            <a:endParaRPr lang="en-US" sz="1800" b="0" strike="noStrike" spc="-1">
               <a:solidFill>
                 <a:srgbClr val="000000"/>
               </a:solidFill>
@@ -770,11 +908,12 @@
           </a:prstGeom>
         </p:spPr>
         <p:txBody>
-          <a:bodyPr lIns="0" rIns="0" tIns="0" bIns="0">
+          <a:bodyPr lIns="0" tIns="0" rIns="0" bIns="0">
             <a:normAutofit/>
           </a:bodyPr>
-          <a:p>
-            <a:endParaRPr b="0" lang="en-US" sz="2000" spc="-1" strike="noStrike">
+          <a:lstStyle/>
+          <a:p>
+            <a:endParaRPr lang="en-US" sz="2000" b="0" strike="noStrike" spc="-1">
               <a:solidFill>
                 <a:srgbClr val="404040"/>
               </a:solidFill>
@@ -785,11 +924,14 @@
       </p:sp>
     </p:spTree>
   </p:cSld>
+  <p:clrMapOvr>
+    <a:masterClrMapping/>
+  </p:clrMapOvr>
 </p:sldLayout>
 </file>
 
 <file path=ppt/slideLayouts/slideLayout16.xml><?xml version="1.0" encoding="utf-8"?>
-<p:sldLayout xmlns:a="http://schemas.openxmlformats.org/drawingml/2006/main" xmlns:p="http://schemas.openxmlformats.org/presentationml/2006/main" xmlns:r="http://schemas.openxmlformats.org/officeDocument/2006/relationships" xmlns:p14="http://schemas.microsoft.com/office/powerpoint/2010/main" xmlns:p15="http://schemas.microsoft.com/office/powerpoint/2012/main" xmlns:mc="http://schemas.openxmlformats.org/markup-compatibility/2006" type="twoObj" preserve="1">
+<p:sldLayout xmlns:a="http://schemas.openxmlformats.org/drawingml/2006/main" xmlns:r="http://schemas.openxmlformats.org/officeDocument/2006/relationships" xmlns:p="http://schemas.openxmlformats.org/presentationml/2006/main" type="twoObj" preserve="1">
   <p:cSld name="Title, 2 Content">
     <p:spTree>
       <p:nvGrpSpPr>
@@ -825,9 +967,10 @@
           </a:prstGeom>
         </p:spPr>
         <p:txBody>
-          <a:bodyPr lIns="0" rIns="0" tIns="0" bIns="0" anchor="ctr"/>
-          <a:p>
-            <a:endParaRPr b="0" lang="en-US" sz="1800" spc="-1" strike="noStrike">
+          <a:bodyPr lIns="0" tIns="0" rIns="0" bIns="0" anchor="ctr"/>
+          <a:lstStyle/>
+          <a:p>
+            <a:endParaRPr lang="en-US" sz="1800" b="0" strike="noStrike" spc="-1">
               <a:solidFill>
                 <a:srgbClr val="000000"/>
               </a:solidFill>
@@ -856,11 +999,12 @@
           </a:prstGeom>
         </p:spPr>
         <p:txBody>
-          <a:bodyPr lIns="0" rIns="0" tIns="0" bIns="0">
+          <a:bodyPr lIns="0" tIns="0" rIns="0" bIns="0">
             <a:normAutofit/>
           </a:bodyPr>
-          <a:p>
-            <a:endParaRPr b="0" lang="en-US" sz="2000" spc="-1" strike="noStrike">
+          <a:lstStyle/>
+          <a:p>
+            <a:endParaRPr lang="en-US" sz="2000" b="0" strike="noStrike" spc="-1">
               <a:solidFill>
                 <a:srgbClr val="404040"/>
               </a:solidFill>
@@ -889,11 +1033,12 @@
           </a:prstGeom>
         </p:spPr>
         <p:txBody>
-          <a:bodyPr lIns="0" rIns="0" tIns="0" bIns="0">
+          <a:bodyPr lIns="0" tIns="0" rIns="0" bIns="0">
             <a:normAutofit/>
           </a:bodyPr>
-          <a:p>
-            <a:endParaRPr b="0" lang="en-US" sz="2000" spc="-1" strike="noStrike">
+          <a:lstStyle/>
+          <a:p>
+            <a:endParaRPr lang="en-US" sz="2000" b="0" strike="noStrike" spc="-1">
               <a:solidFill>
                 <a:srgbClr val="404040"/>
               </a:solidFill>
@@ -904,11 +1049,14 @@
       </p:sp>
     </p:spTree>
   </p:cSld>
+  <p:clrMapOvr>
+    <a:masterClrMapping/>
+  </p:clrMapOvr>
 </p:sldLayout>
 </file>
 
 <file path=ppt/slideLayouts/slideLayout17.xml><?xml version="1.0" encoding="utf-8"?>
-<p:sldLayout xmlns:a="http://schemas.openxmlformats.org/drawingml/2006/main" xmlns:p="http://schemas.openxmlformats.org/presentationml/2006/main" xmlns:r="http://schemas.openxmlformats.org/officeDocument/2006/relationships" xmlns:p14="http://schemas.microsoft.com/office/powerpoint/2010/main" xmlns:p15="http://schemas.microsoft.com/office/powerpoint/2012/main" xmlns:mc="http://schemas.openxmlformats.org/markup-compatibility/2006" type="titleOnly" preserve="1">
+<p:sldLayout xmlns:a="http://schemas.openxmlformats.org/drawingml/2006/main" xmlns:r="http://schemas.openxmlformats.org/officeDocument/2006/relationships" xmlns:p="http://schemas.openxmlformats.org/presentationml/2006/main" type="titleOnly" preserve="1">
   <p:cSld name="Title Only">
     <p:spTree>
       <p:nvGrpSpPr>
@@ -944,9 +1092,10 @@
           </a:prstGeom>
         </p:spPr>
         <p:txBody>
-          <a:bodyPr lIns="0" rIns="0" tIns="0" bIns="0" anchor="ctr"/>
-          <a:p>
-            <a:endParaRPr b="0" lang="en-US" sz="1800" spc="-1" strike="noStrike">
+          <a:bodyPr lIns="0" tIns="0" rIns="0" bIns="0" anchor="ctr"/>
+          <a:lstStyle/>
+          <a:p>
+            <a:endParaRPr lang="en-US" sz="1800" b="0" strike="noStrike" spc="-1">
               <a:solidFill>
                 <a:srgbClr val="000000"/>
               </a:solidFill>
@@ -957,11 +1106,14 @@
       </p:sp>
     </p:spTree>
   </p:cSld>
+  <p:clrMapOvr>
+    <a:masterClrMapping/>
+  </p:clrMapOvr>
 </p:sldLayout>
 </file>
 
 <file path=ppt/slideLayouts/slideLayout18.xml><?xml version="1.0" encoding="utf-8"?>
-<p:sldLayout xmlns:a="http://schemas.openxmlformats.org/drawingml/2006/main" xmlns:p="http://schemas.openxmlformats.org/presentationml/2006/main" xmlns:r="http://schemas.openxmlformats.org/officeDocument/2006/relationships" xmlns:p14="http://schemas.microsoft.com/office/powerpoint/2010/main" xmlns:p15="http://schemas.microsoft.com/office/powerpoint/2012/main" xmlns:mc="http://schemas.openxmlformats.org/markup-compatibility/2006" type="objOnly" preserve="1">
+<p:sldLayout xmlns:a="http://schemas.openxmlformats.org/drawingml/2006/main" xmlns:r="http://schemas.openxmlformats.org/officeDocument/2006/relationships" xmlns:p="http://schemas.openxmlformats.org/presentationml/2006/main" type="objOnly" preserve="1">
   <p:cSld name="Centered Text">
     <p:spTree>
       <p:nvGrpSpPr>
@@ -997,10 +1149,11 @@
           </a:prstGeom>
         </p:spPr>
         <p:txBody>
-          <a:bodyPr lIns="0" rIns="0" tIns="0" bIns="0" anchor="ctr"/>
+          <a:bodyPr lIns="0" tIns="0" rIns="0" bIns="0" anchor="ctr"/>
+          <a:lstStyle/>
           <a:p>
             <a:pPr algn="ctr"/>
-            <a:endParaRPr b="0" lang="en-US" sz="3200" spc="-1" strike="noStrike">
+            <a:endParaRPr lang="en-US" sz="3200" b="0" strike="noStrike" spc="-1">
               <a:latin typeface="Arial"/>
             </a:endParaRPr>
           </a:p>
@@ -1008,11 +1161,14 @@
       </p:sp>
     </p:spTree>
   </p:cSld>
+  <p:clrMapOvr>
+    <a:masterClrMapping/>
+  </p:clrMapOvr>
 </p:sldLayout>
 </file>
 
 <file path=ppt/slideLayouts/slideLayout19.xml><?xml version="1.0" encoding="utf-8"?>
-<p:sldLayout xmlns:a="http://schemas.openxmlformats.org/drawingml/2006/main" xmlns:p="http://schemas.openxmlformats.org/presentationml/2006/main" xmlns:r="http://schemas.openxmlformats.org/officeDocument/2006/relationships" xmlns:p14="http://schemas.microsoft.com/office/powerpoint/2010/main" xmlns:p15="http://schemas.microsoft.com/office/powerpoint/2012/main" xmlns:mc="http://schemas.openxmlformats.org/markup-compatibility/2006" type="twoObjAndObj" preserve="1">
+<p:sldLayout xmlns:a="http://schemas.openxmlformats.org/drawingml/2006/main" xmlns:r="http://schemas.openxmlformats.org/officeDocument/2006/relationships" xmlns:p="http://schemas.openxmlformats.org/presentationml/2006/main" type="twoObjAndObj" preserve="1">
   <p:cSld name="Title, 2 Content and Content">
     <p:spTree>
       <p:nvGrpSpPr>
@@ -1048,9 +1204,10 @@
           </a:prstGeom>
         </p:spPr>
         <p:txBody>
-          <a:bodyPr lIns="0" rIns="0" tIns="0" bIns="0" anchor="ctr"/>
-          <a:p>
-            <a:endParaRPr b="0" lang="en-US" sz="1800" spc="-1" strike="noStrike">
+          <a:bodyPr lIns="0" tIns="0" rIns="0" bIns="0" anchor="ctr"/>
+          <a:lstStyle/>
+          <a:p>
+            <a:endParaRPr lang="en-US" sz="1800" b="0" strike="noStrike" spc="-1">
               <a:solidFill>
                 <a:srgbClr val="000000"/>
               </a:solidFill>
@@ -1079,11 +1236,12 @@
           </a:prstGeom>
         </p:spPr>
         <p:txBody>
-          <a:bodyPr lIns="0" rIns="0" tIns="0" bIns="0">
+          <a:bodyPr lIns="0" tIns="0" rIns="0" bIns="0">
             <a:normAutofit/>
           </a:bodyPr>
-          <a:p>
-            <a:endParaRPr b="0" lang="en-US" sz="2000" spc="-1" strike="noStrike">
+          <a:lstStyle/>
+          <a:p>
+            <a:endParaRPr lang="en-US" sz="2000" b="0" strike="noStrike" spc="-1">
               <a:solidFill>
                 <a:srgbClr val="404040"/>
               </a:solidFill>
@@ -1112,11 +1270,12 @@
           </a:prstGeom>
         </p:spPr>
         <p:txBody>
-          <a:bodyPr lIns="0" rIns="0" tIns="0" bIns="0">
+          <a:bodyPr lIns="0" tIns="0" rIns="0" bIns="0">
             <a:normAutofit/>
           </a:bodyPr>
-          <a:p>
-            <a:endParaRPr b="0" lang="en-US" sz="2000" spc="-1" strike="noStrike">
+          <a:lstStyle/>
+          <a:p>
+            <a:endParaRPr lang="en-US" sz="2000" b="0" strike="noStrike" spc="-1">
               <a:solidFill>
                 <a:srgbClr val="404040"/>
               </a:solidFill>
@@ -1145,11 +1304,12 @@
           </a:prstGeom>
         </p:spPr>
         <p:txBody>
-          <a:bodyPr lIns="0" rIns="0" tIns="0" bIns="0">
+          <a:bodyPr lIns="0" tIns="0" rIns="0" bIns="0">
             <a:normAutofit/>
           </a:bodyPr>
-          <a:p>
-            <a:endParaRPr b="0" lang="en-US" sz="2000" spc="-1" strike="noStrike">
+          <a:lstStyle/>
+          <a:p>
+            <a:endParaRPr lang="en-US" sz="2000" b="0" strike="noStrike" spc="-1">
               <a:solidFill>
                 <a:srgbClr val="404040"/>
               </a:solidFill>
@@ -1160,11 +1320,14 @@
       </p:sp>
     </p:spTree>
   </p:cSld>
+  <p:clrMapOvr>
+    <a:masterClrMapping/>
+  </p:clrMapOvr>
 </p:sldLayout>
 </file>
 
 <file path=ppt/slideLayouts/slideLayout2.xml><?xml version="1.0" encoding="utf-8"?>
-<p:sldLayout xmlns:a="http://schemas.openxmlformats.org/drawingml/2006/main" xmlns:p="http://schemas.openxmlformats.org/presentationml/2006/main" xmlns:r="http://schemas.openxmlformats.org/officeDocument/2006/relationships" xmlns:p14="http://schemas.microsoft.com/office/powerpoint/2010/main" xmlns:p15="http://schemas.microsoft.com/office/powerpoint/2012/main" xmlns:mc="http://schemas.openxmlformats.org/markup-compatibility/2006" type="tx" preserve="1">
+<p:sldLayout xmlns:a="http://schemas.openxmlformats.org/drawingml/2006/main" xmlns:r="http://schemas.openxmlformats.org/officeDocument/2006/relationships" xmlns:p="http://schemas.openxmlformats.org/presentationml/2006/main" type="tx" preserve="1">
   <p:cSld name="Title Slide">
     <p:spTree>
       <p:nvGrpSpPr>
@@ -1200,9 +1363,10 @@
           </a:prstGeom>
         </p:spPr>
         <p:txBody>
-          <a:bodyPr lIns="0" rIns="0" tIns="0" bIns="0" anchor="ctr"/>
-          <a:p>
-            <a:endParaRPr b="0" lang="en-US" sz="1800" spc="-1" strike="noStrike">
+          <a:bodyPr lIns="0" tIns="0" rIns="0" bIns="0" anchor="ctr"/>
+          <a:lstStyle/>
+          <a:p>
+            <a:endParaRPr lang="en-US" sz="1800" b="0" strike="noStrike" spc="-1">
               <a:solidFill>
                 <a:srgbClr val="000000"/>
               </a:solidFill>
@@ -1231,10 +1395,11 @@
           </a:prstGeom>
         </p:spPr>
         <p:txBody>
-          <a:bodyPr lIns="0" rIns="0" tIns="0" bIns="0" anchor="ctr"/>
+          <a:bodyPr lIns="0" tIns="0" rIns="0" bIns="0" anchor="ctr"/>
+          <a:lstStyle/>
           <a:p>
             <a:pPr algn="ctr"/>
-            <a:endParaRPr b="0" lang="en-US" sz="3200" spc="-1" strike="noStrike">
+            <a:endParaRPr lang="en-US" sz="3200" b="0" strike="noStrike" spc="-1">
               <a:latin typeface="Arial"/>
             </a:endParaRPr>
           </a:p>
@@ -1242,11 +1407,14 @@
       </p:sp>
     </p:spTree>
   </p:cSld>
+  <p:clrMapOvr>
+    <a:masterClrMapping/>
+  </p:clrMapOvr>
 </p:sldLayout>
 </file>
 
 <file path=ppt/slideLayouts/slideLayout20.xml><?xml version="1.0" encoding="utf-8"?>
-<p:sldLayout xmlns:a="http://schemas.openxmlformats.org/drawingml/2006/main" xmlns:p="http://schemas.openxmlformats.org/presentationml/2006/main" xmlns:r="http://schemas.openxmlformats.org/officeDocument/2006/relationships" xmlns:p14="http://schemas.microsoft.com/office/powerpoint/2010/main" xmlns:p15="http://schemas.microsoft.com/office/powerpoint/2012/main" xmlns:mc="http://schemas.openxmlformats.org/markup-compatibility/2006" type="objAndTwoObj" preserve="1">
+<p:sldLayout xmlns:a="http://schemas.openxmlformats.org/drawingml/2006/main" xmlns:r="http://schemas.openxmlformats.org/officeDocument/2006/relationships" xmlns:p="http://schemas.openxmlformats.org/presentationml/2006/main" type="objAndTwoObj" preserve="1">
   <p:cSld name="Title Content and 2 Content">
     <p:spTree>
       <p:nvGrpSpPr>
@@ -1282,9 +1450,10 @@
           </a:prstGeom>
         </p:spPr>
         <p:txBody>
-          <a:bodyPr lIns="0" rIns="0" tIns="0" bIns="0" anchor="ctr"/>
-          <a:p>
-            <a:endParaRPr b="0" lang="en-US" sz="1800" spc="-1" strike="noStrike">
+          <a:bodyPr lIns="0" tIns="0" rIns="0" bIns="0" anchor="ctr"/>
+          <a:lstStyle/>
+          <a:p>
+            <a:endParaRPr lang="en-US" sz="1800" b="0" strike="noStrike" spc="-1">
               <a:solidFill>
                 <a:srgbClr val="000000"/>
               </a:solidFill>
@@ -1313,11 +1482,12 @@
           </a:prstGeom>
         </p:spPr>
         <p:txBody>
-          <a:bodyPr lIns="0" rIns="0" tIns="0" bIns="0">
+          <a:bodyPr lIns="0" tIns="0" rIns="0" bIns="0">
             <a:normAutofit/>
           </a:bodyPr>
-          <a:p>
-            <a:endParaRPr b="0" lang="en-US" sz="2000" spc="-1" strike="noStrike">
+          <a:lstStyle/>
+          <a:p>
+            <a:endParaRPr lang="en-US" sz="2000" b="0" strike="noStrike" spc="-1">
               <a:solidFill>
                 <a:srgbClr val="404040"/>
               </a:solidFill>
@@ -1346,11 +1516,12 @@
           </a:prstGeom>
         </p:spPr>
         <p:txBody>
-          <a:bodyPr lIns="0" rIns="0" tIns="0" bIns="0">
+          <a:bodyPr lIns="0" tIns="0" rIns="0" bIns="0">
             <a:normAutofit/>
           </a:bodyPr>
-          <a:p>
-            <a:endParaRPr b="0" lang="en-US" sz="2000" spc="-1" strike="noStrike">
+          <a:lstStyle/>
+          <a:p>
+            <a:endParaRPr lang="en-US" sz="2000" b="0" strike="noStrike" spc="-1">
               <a:solidFill>
                 <a:srgbClr val="404040"/>
               </a:solidFill>
@@ -1379,11 +1550,12 @@
           </a:prstGeom>
         </p:spPr>
         <p:txBody>
-          <a:bodyPr lIns="0" rIns="0" tIns="0" bIns="0">
+          <a:bodyPr lIns="0" tIns="0" rIns="0" bIns="0">
             <a:normAutofit/>
           </a:bodyPr>
-          <a:p>
-            <a:endParaRPr b="0" lang="en-US" sz="2000" spc="-1" strike="noStrike">
+          <a:lstStyle/>
+          <a:p>
+            <a:endParaRPr lang="en-US" sz="2000" b="0" strike="noStrike" spc="-1">
               <a:solidFill>
                 <a:srgbClr val="404040"/>
               </a:solidFill>
@@ -1394,11 +1566,14 @@
       </p:sp>
     </p:spTree>
   </p:cSld>
+  <p:clrMapOvr>
+    <a:masterClrMapping/>
+  </p:clrMapOvr>
 </p:sldLayout>
 </file>
 
 <file path=ppt/slideLayouts/slideLayout21.xml><?xml version="1.0" encoding="utf-8"?>
-<p:sldLayout xmlns:a="http://schemas.openxmlformats.org/drawingml/2006/main" xmlns:p="http://schemas.openxmlformats.org/presentationml/2006/main" xmlns:r="http://schemas.openxmlformats.org/officeDocument/2006/relationships" xmlns:p14="http://schemas.microsoft.com/office/powerpoint/2010/main" xmlns:p15="http://schemas.microsoft.com/office/powerpoint/2012/main" xmlns:mc="http://schemas.openxmlformats.org/markup-compatibility/2006" type="twoObjOverTx" preserve="1">
+<p:sldLayout xmlns:a="http://schemas.openxmlformats.org/drawingml/2006/main" xmlns:r="http://schemas.openxmlformats.org/officeDocument/2006/relationships" xmlns:p="http://schemas.openxmlformats.org/presentationml/2006/main" type="twoObjOverTx" preserve="1">
   <p:cSld name="Title, 2 Content over Content">
     <p:spTree>
       <p:nvGrpSpPr>
@@ -1434,9 +1609,10 @@
           </a:prstGeom>
         </p:spPr>
         <p:txBody>
-          <a:bodyPr lIns="0" rIns="0" tIns="0" bIns="0" anchor="ctr"/>
-          <a:p>
-            <a:endParaRPr b="0" lang="en-US" sz="1800" spc="-1" strike="noStrike">
+          <a:bodyPr lIns="0" tIns="0" rIns="0" bIns="0" anchor="ctr"/>
+          <a:lstStyle/>
+          <a:p>
+            <a:endParaRPr lang="en-US" sz="1800" b="0" strike="noStrike" spc="-1">
               <a:solidFill>
                 <a:srgbClr val="000000"/>
               </a:solidFill>
@@ -1465,11 +1641,12 @@
           </a:prstGeom>
         </p:spPr>
         <p:txBody>
-          <a:bodyPr lIns="0" rIns="0" tIns="0" bIns="0">
+          <a:bodyPr lIns="0" tIns="0" rIns="0" bIns="0">
             <a:normAutofit/>
           </a:bodyPr>
-          <a:p>
-            <a:endParaRPr b="0" lang="en-US" sz="2000" spc="-1" strike="noStrike">
+          <a:lstStyle/>
+          <a:p>
+            <a:endParaRPr lang="en-US" sz="2000" b="0" strike="noStrike" spc="-1">
               <a:solidFill>
                 <a:srgbClr val="404040"/>
               </a:solidFill>
@@ -1498,11 +1675,12 @@
           </a:prstGeom>
         </p:spPr>
         <p:txBody>
-          <a:bodyPr lIns="0" rIns="0" tIns="0" bIns="0">
+          <a:bodyPr lIns="0" tIns="0" rIns="0" bIns="0">
             <a:normAutofit/>
           </a:bodyPr>
-          <a:p>
-            <a:endParaRPr b="0" lang="en-US" sz="2000" spc="-1" strike="noStrike">
+          <a:lstStyle/>
+          <a:p>
+            <a:endParaRPr lang="en-US" sz="2000" b="0" strike="noStrike" spc="-1">
               <a:solidFill>
                 <a:srgbClr val="404040"/>
               </a:solidFill>
@@ -1531,11 +1709,12 @@
           </a:prstGeom>
         </p:spPr>
         <p:txBody>
-          <a:bodyPr lIns="0" rIns="0" tIns="0" bIns="0">
+          <a:bodyPr lIns="0" tIns="0" rIns="0" bIns="0">
             <a:normAutofit/>
           </a:bodyPr>
-          <a:p>
-            <a:endParaRPr b="0" lang="en-US" sz="2000" spc="-1" strike="noStrike">
+          <a:lstStyle/>
+          <a:p>
+            <a:endParaRPr lang="en-US" sz="2000" b="0" strike="noStrike" spc="-1">
               <a:solidFill>
                 <a:srgbClr val="404040"/>
               </a:solidFill>
@@ -1546,11 +1725,14 @@
       </p:sp>
     </p:spTree>
   </p:cSld>
+  <p:clrMapOvr>
+    <a:masterClrMapping/>
+  </p:clrMapOvr>
 </p:sldLayout>
 </file>
 
 <file path=ppt/slideLayouts/slideLayout22.xml><?xml version="1.0" encoding="utf-8"?>
-<p:sldLayout xmlns:a="http://schemas.openxmlformats.org/drawingml/2006/main" xmlns:p="http://schemas.openxmlformats.org/presentationml/2006/main" xmlns:r="http://schemas.openxmlformats.org/officeDocument/2006/relationships" xmlns:p14="http://schemas.microsoft.com/office/powerpoint/2010/main" xmlns:p15="http://schemas.microsoft.com/office/powerpoint/2012/main" xmlns:mc="http://schemas.openxmlformats.org/markup-compatibility/2006" type="objOverTx" preserve="1">
+<p:sldLayout xmlns:a="http://schemas.openxmlformats.org/drawingml/2006/main" xmlns:r="http://schemas.openxmlformats.org/officeDocument/2006/relationships" xmlns:p="http://schemas.openxmlformats.org/presentationml/2006/main" type="objOverTx" preserve="1">
   <p:cSld name="Title, Content over Content">
     <p:spTree>
       <p:nvGrpSpPr>
@@ -1586,9 +1768,10 @@
           </a:prstGeom>
         </p:spPr>
         <p:txBody>
-          <a:bodyPr lIns="0" rIns="0" tIns="0" bIns="0" anchor="ctr"/>
-          <a:p>
-            <a:endParaRPr b="0" lang="en-US" sz="1800" spc="-1" strike="noStrike">
+          <a:bodyPr lIns="0" tIns="0" rIns="0" bIns="0" anchor="ctr"/>
+          <a:lstStyle/>
+          <a:p>
+            <a:endParaRPr lang="en-US" sz="1800" b="0" strike="noStrike" spc="-1">
               <a:solidFill>
                 <a:srgbClr val="000000"/>
               </a:solidFill>
@@ -1617,11 +1800,12 @@
           </a:prstGeom>
         </p:spPr>
         <p:txBody>
-          <a:bodyPr lIns="0" rIns="0" tIns="0" bIns="0">
+          <a:bodyPr lIns="0" tIns="0" rIns="0" bIns="0">
             <a:normAutofit/>
           </a:bodyPr>
-          <a:p>
-            <a:endParaRPr b="0" lang="en-US" sz="2000" spc="-1" strike="noStrike">
+          <a:lstStyle/>
+          <a:p>
+            <a:endParaRPr lang="en-US" sz="2000" b="0" strike="noStrike" spc="-1">
               <a:solidFill>
                 <a:srgbClr val="404040"/>
               </a:solidFill>
@@ -1650,11 +1834,12 @@
           </a:prstGeom>
         </p:spPr>
         <p:txBody>
-          <a:bodyPr lIns="0" rIns="0" tIns="0" bIns="0">
+          <a:bodyPr lIns="0" tIns="0" rIns="0" bIns="0">
             <a:normAutofit/>
           </a:bodyPr>
-          <a:p>
-            <a:endParaRPr b="0" lang="en-US" sz="2000" spc="-1" strike="noStrike">
+          <a:lstStyle/>
+          <a:p>
+            <a:endParaRPr lang="en-US" sz="2000" b="0" strike="noStrike" spc="-1">
               <a:solidFill>
                 <a:srgbClr val="404040"/>
               </a:solidFill>
@@ -1665,11 +1850,14 @@
       </p:sp>
     </p:spTree>
   </p:cSld>
+  <p:clrMapOvr>
+    <a:masterClrMapping/>
+  </p:clrMapOvr>
 </p:sldLayout>
 </file>
 
 <file path=ppt/slideLayouts/slideLayout23.xml><?xml version="1.0" encoding="utf-8"?>
-<p:sldLayout xmlns:a="http://schemas.openxmlformats.org/drawingml/2006/main" xmlns:p="http://schemas.openxmlformats.org/presentationml/2006/main" xmlns:r="http://schemas.openxmlformats.org/officeDocument/2006/relationships" xmlns:p14="http://schemas.microsoft.com/office/powerpoint/2010/main" xmlns:p15="http://schemas.microsoft.com/office/powerpoint/2012/main" xmlns:mc="http://schemas.openxmlformats.org/markup-compatibility/2006" type="fourObj" preserve="1">
+<p:sldLayout xmlns:a="http://schemas.openxmlformats.org/drawingml/2006/main" xmlns:r="http://schemas.openxmlformats.org/officeDocument/2006/relationships" xmlns:p="http://schemas.openxmlformats.org/presentationml/2006/main" type="fourObj" preserve="1">
   <p:cSld name="Title, 4 Content">
     <p:spTree>
       <p:nvGrpSpPr>
@@ -1705,9 +1893,10 @@
           </a:prstGeom>
         </p:spPr>
         <p:txBody>
-          <a:bodyPr lIns="0" rIns="0" tIns="0" bIns="0" anchor="ctr"/>
-          <a:p>
-            <a:endParaRPr b="0" lang="en-US" sz="1800" spc="-1" strike="noStrike">
+          <a:bodyPr lIns="0" tIns="0" rIns="0" bIns="0" anchor="ctr"/>
+          <a:lstStyle/>
+          <a:p>
+            <a:endParaRPr lang="en-US" sz="1800" b="0" strike="noStrike" spc="-1">
               <a:solidFill>
                 <a:srgbClr val="000000"/>
               </a:solidFill>
@@ -1736,11 +1925,12 @@
           </a:prstGeom>
         </p:spPr>
         <p:txBody>
-          <a:bodyPr lIns="0" rIns="0" tIns="0" bIns="0">
+          <a:bodyPr lIns="0" tIns="0" rIns="0" bIns="0">
             <a:normAutofit/>
           </a:bodyPr>
-          <a:p>
-            <a:endParaRPr b="0" lang="en-US" sz="2000" spc="-1" strike="noStrike">
+          <a:lstStyle/>
+          <a:p>
+            <a:endParaRPr lang="en-US" sz="2000" b="0" strike="noStrike" spc="-1">
               <a:solidFill>
                 <a:srgbClr val="404040"/>
               </a:solidFill>
@@ -1769,11 +1959,12 @@
           </a:prstGeom>
         </p:spPr>
         <p:txBody>
-          <a:bodyPr lIns="0" rIns="0" tIns="0" bIns="0">
+          <a:bodyPr lIns="0" tIns="0" rIns="0" bIns="0">
             <a:normAutofit/>
           </a:bodyPr>
-          <a:p>
-            <a:endParaRPr b="0" lang="en-US" sz="2000" spc="-1" strike="noStrike">
+          <a:lstStyle/>
+          <a:p>
+            <a:endParaRPr lang="en-US" sz="2000" b="0" strike="noStrike" spc="-1">
               <a:solidFill>
                 <a:srgbClr val="404040"/>
               </a:solidFill>
@@ -1802,11 +1993,12 @@
           </a:prstGeom>
         </p:spPr>
         <p:txBody>
-          <a:bodyPr lIns="0" rIns="0" tIns="0" bIns="0">
+          <a:bodyPr lIns="0" tIns="0" rIns="0" bIns="0">
             <a:normAutofit/>
           </a:bodyPr>
-          <a:p>
-            <a:endParaRPr b="0" lang="en-US" sz="2000" spc="-1" strike="noStrike">
+          <a:lstStyle/>
+          <a:p>
+            <a:endParaRPr lang="en-US" sz="2000" b="0" strike="noStrike" spc="-1">
               <a:solidFill>
                 <a:srgbClr val="404040"/>
               </a:solidFill>
@@ -1835,11 +2027,12 @@
           </a:prstGeom>
         </p:spPr>
         <p:txBody>
-          <a:bodyPr lIns="0" rIns="0" tIns="0" bIns="0">
+          <a:bodyPr lIns="0" tIns="0" rIns="0" bIns="0">
             <a:normAutofit/>
           </a:bodyPr>
-          <a:p>
-            <a:endParaRPr b="0" lang="en-US" sz="2000" spc="-1" strike="noStrike">
+          <a:lstStyle/>
+          <a:p>
+            <a:endParaRPr lang="en-US" sz="2000" b="0" strike="noStrike" spc="-1">
               <a:solidFill>
                 <a:srgbClr val="404040"/>
               </a:solidFill>
@@ -1850,11 +2043,14 @@
       </p:sp>
     </p:spTree>
   </p:cSld>
+  <p:clrMapOvr>
+    <a:masterClrMapping/>
+  </p:clrMapOvr>
 </p:sldLayout>
 </file>
 
 <file path=ppt/slideLayouts/slideLayout24.xml><?xml version="1.0" encoding="utf-8"?>
-<p:sldLayout xmlns:a="http://schemas.openxmlformats.org/drawingml/2006/main" xmlns:p="http://schemas.openxmlformats.org/presentationml/2006/main" xmlns:r="http://schemas.openxmlformats.org/officeDocument/2006/relationships" xmlns:p14="http://schemas.microsoft.com/office/powerpoint/2010/main" xmlns:p15="http://schemas.microsoft.com/office/powerpoint/2012/main" xmlns:mc="http://schemas.openxmlformats.org/markup-compatibility/2006" type="blank" preserve="1">
+<p:sldLayout xmlns:a="http://schemas.openxmlformats.org/drawingml/2006/main" xmlns:r="http://schemas.openxmlformats.org/officeDocument/2006/relationships" xmlns:p="http://schemas.openxmlformats.org/presentationml/2006/main" type="blank" preserve="1">
   <p:cSld name="Title, 6 Content">
     <p:spTree>
       <p:nvGrpSpPr>
@@ -1890,9 +2086,10 @@
           </a:prstGeom>
         </p:spPr>
         <p:txBody>
-          <a:bodyPr lIns="0" rIns="0" tIns="0" bIns="0" anchor="ctr"/>
-          <a:p>
-            <a:endParaRPr b="0" lang="en-US" sz="1800" spc="-1" strike="noStrike">
+          <a:bodyPr lIns="0" tIns="0" rIns="0" bIns="0" anchor="ctr"/>
+          <a:lstStyle/>
+          <a:p>
+            <a:endParaRPr lang="en-US" sz="1800" b="0" strike="noStrike" spc="-1">
               <a:solidFill>
                 <a:srgbClr val="000000"/>
               </a:solidFill>
@@ -1921,11 +2118,12 @@
           </a:prstGeom>
         </p:spPr>
         <p:txBody>
-          <a:bodyPr lIns="0" rIns="0" tIns="0" bIns="0">
+          <a:bodyPr lIns="0" tIns="0" rIns="0" bIns="0">
             <a:normAutofit/>
           </a:bodyPr>
-          <a:p>
-            <a:endParaRPr b="0" lang="en-US" sz="2000" spc="-1" strike="noStrike">
+          <a:lstStyle/>
+          <a:p>
+            <a:endParaRPr lang="en-US" sz="2000" b="0" strike="noStrike" spc="-1">
               <a:solidFill>
                 <a:srgbClr val="404040"/>
               </a:solidFill>
@@ -1954,11 +2152,12 @@
           </a:prstGeom>
         </p:spPr>
         <p:txBody>
-          <a:bodyPr lIns="0" rIns="0" tIns="0" bIns="0">
+          <a:bodyPr lIns="0" tIns="0" rIns="0" bIns="0">
             <a:normAutofit/>
           </a:bodyPr>
-          <a:p>
-            <a:endParaRPr b="0" lang="en-US" sz="2000" spc="-1" strike="noStrike">
+          <a:lstStyle/>
+          <a:p>
+            <a:endParaRPr lang="en-US" sz="2000" b="0" strike="noStrike" spc="-1">
               <a:solidFill>
                 <a:srgbClr val="404040"/>
               </a:solidFill>
@@ -1987,11 +2186,12 @@
           </a:prstGeom>
         </p:spPr>
         <p:txBody>
-          <a:bodyPr lIns="0" rIns="0" tIns="0" bIns="0">
+          <a:bodyPr lIns="0" tIns="0" rIns="0" bIns="0">
             <a:normAutofit/>
           </a:bodyPr>
-          <a:p>
-            <a:endParaRPr b="0" lang="en-US" sz="2000" spc="-1" strike="noStrike">
+          <a:lstStyle/>
+          <a:p>
+            <a:endParaRPr lang="en-US" sz="2000" b="0" strike="noStrike" spc="-1">
               <a:solidFill>
                 <a:srgbClr val="404040"/>
               </a:solidFill>
@@ -2020,11 +2220,12 @@
           </a:prstGeom>
         </p:spPr>
         <p:txBody>
-          <a:bodyPr lIns="0" rIns="0" tIns="0" bIns="0">
+          <a:bodyPr lIns="0" tIns="0" rIns="0" bIns="0">
             <a:normAutofit/>
           </a:bodyPr>
-          <a:p>
-            <a:endParaRPr b="0" lang="en-US" sz="2000" spc="-1" strike="noStrike">
+          <a:lstStyle/>
+          <a:p>
+            <a:endParaRPr lang="en-US" sz="2000" b="0" strike="noStrike" spc="-1">
               <a:solidFill>
                 <a:srgbClr val="404040"/>
               </a:solidFill>
@@ -2053,11 +2254,12 @@
           </a:prstGeom>
         </p:spPr>
         <p:txBody>
-          <a:bodyPr lIns="0" rIns="0" tIns="0" bIns="0">
+          <a:bodyPr lIns="0" tIns="0" rIns="0" bIns="0">
             <a:normAutofit/>
           </a:bodyPr>
-          <a:p>
-            <a:endParaRPr b="0" lang="en-US" sz="2000" spc="-1" strike="noStrike">
+          <a:lstStyle/>
+          <a:p>
+            <a:endParaRPr lang="en-US" sz="2000" b="0" strike="noStrike" spc="-1">
               <a:solidFill>
                 <a:srgbClr val="404040"/>
               </a:solidFill>
@@ -2086,11 +2288,12 @@
           </a:prstGeom>
         </p:spPr>
         <p:txBody>
-          <a:bodyPr lIns="0" rIns="0" tIns="0" bIns="0">
+          <a:bodyPr lIns="0" tIns="0" rIns="0" bIns="0">
             <a:normAutofit/>
           </a:bodyPr>
-          <a:p>
-            <a:endParaRPr b="0" lang="en-US" sz="2000" spc="-1" strike="noStrike">
+          <a:lstStyle/>
+          <a:p>
+            <a:endParaRPr lang="en-US" sz="2000" b="0" strike="noStrike" spc="-1">
               <a:solidFill>
                 <a:srgbClr val="404040"/>
               </a:solidFill>
@@ -2101,11 +2304,14 @@
       </p:sp>
     </p:spTree>
   </p:cSld>
+  <p:clrMapOvr>
+    <a:masterClrMapping/>
+  </p:clrMapOvr>
 </p:sldLayout>
 </file>
 
 <file path=ppt/slideLayouts/slideLayout3.xml><?xml version="1.0" encoding="utf-8"?>
-<p:sldLayout xmlns:a="http://schemas.openxmlformats.org/drawingml/2006/main" xmlns:p="http://schemas.openxmlformats.org/presentationml/2006/main" xmlns:r="http://schemas.openxmlformats.org/officeDocument/2006/relationships" xmlns:p14="http://schemas.microsoft.com/office/powerpoint/2010/main" xmlns:p15="http://schemas.microsoft.com/office/powerpoint/2012/main" xmlns:mc="http://schemas.openxmlformats.org/markup-compatibility/2006" type="obj" preserve="1">
+<p:sldLayout xmlns:a="http://schemas.openxmlformats.org/drawingml/2006/main" xmlns:r="http://schemas.openxmlformats.org/officeDocument/2006/relationships" xmlns:p="http://schemas.openxmlformats.org/presentationml/2006/main" type="obj" preserve="1">
   <p:cSld name="Title, Content">
     <p:spTree>
       <p:nvGrpSpPr>
@@ -2141,9 +2347,10 @@
           </a:prstGeom>
         </p:spPr>
         <p:txBody>
-          <a:bodyPr lIns="0" rIns="0" tIns="0" bIns="0" anchor="ctr"/>
-          <a:p>
-            <a:endParaRPr b="0" lang="en-US" sz="1800" spc="-1" strike="noStrike">
+          <a:bodyPr lIns="0" tIns="0" rIns="0" bIns="0" anchor="ctr"/>
+          <a:lstStyle/>
+          <a:p>
+            <a:endParaRPr lang="en-US" sz="1800" b="0" strike="noStrike" spc="-1">
               <a:solidFill>
                 <a:srgbClr val="000000"/>
               </a:solidFill>
@@ -2172,11 +2379,12 @@
           </a:prstGeom>
         </p:spPr>
         <p:txBody>
-          <a:bodyPr lIns="0" rIns="0" tIns="0" bIns="0">
+          <a:bodyPr lIns="0" tIns="0" rIns="0" bIns="0">
             <a:normAutofit/>
           </a:bodyPr>
-          <a:p>
-            <a:endParaRPr b="0" lang="en-US" sz="2000" spc="-1" strike="noStrike">
+          <a:lstStyle/>
+          <a:p>
+            <a:endParaRPr lang="en-US" sz="2000" b="0" strike="noStrike" spc="-1">
               <a:solidFill>
                 <a:srgbClr val="404040"/>
               </a:solidFill>
@@ -2187,11 +2395,14 @@
       </p:sp>
     </p:spTree>
   </p:cSld>
+  <p:clrMapOvr>
+    <a:masterClrMapping/>
+  </p:clrMapOvr>
 </p:sldLayout>
 </file>
 
 <file path=ppt/slideLayouts/slideLayout4.xml><?xml version="1.0" encoding="utf-8"?>
-<p:sldLayout xmlns:a="http://schemas.openxmlformats.org/drawingml/2006/main" xmlns:p="http://schemas.openxmlformats.org/presentationml/2006/main" xmlns:r="http://schemas.openxmlformats.org/officeDocument/2006/relationships" xmlns:p14="http://schemas.microsoft.com/office/powerpoint/2010/main" xmlns:p15="http://schemas.microsoft.com/office/powerpoint/2012/main" xmlns:mc="http://schemas.openxmlformats.org/markup-compatibility/2006" type="twoObj" preserve="1">
+<p:sldLayout xmlns:a="http://schemas.openxmlformats.org/drawingml/2006/main" xmlns:r="http://schemas.openxmlformats.org/officeDocument/2006/relationships" xmlns:p="http://schemas.openxmlformats.org/presentationml/2006/main" type="twoObj" preserve="1">
   <p:cSld name="Title, 2 Content">
     <p:spTree>
       <p:nvGrpSpPr>
@@ -2227,9 +2438,10 @@
           </a:prstGeom>
         </p:spPr>
         <p:txBody>
-          <a:bodyPr lIns="0" rIns="0" tIns="0" bIns="0" anchor="ctr"/>
-          <a:p>
-            <a:endParaRPr b="0" lang="en-US" sz="1800" spc="-1" strike="noStrike">
+          <a:bodyPr lIns="0" tIns="0" rIns="0" bIns="0" anchor="ctr"/>
+          <a:lstStyle/>
+          <a:p>
+            <a:endParaRPr lang="en-US" sz="1800" b="0" strike="noStrike" spc="-1">
               <a:solidFill>
                 <a:srgbClr val="000000"/>
               </a:solidFill>
@@ -2258,11 +2470,12 @@
           </a:prstGeom>
         </p:spPr>
         <p:txBody>
-          <a:bodyPr lIns="0" rIns="0" tIns="0" bIns="0">
+          <a:bodyPr lIns="0" tIns="0" rIns="0" bIns="0">
             <a:normAutofit/>
           </a:bodyPr>
-          <a:p>
-            <a:endParaRPr b="0" lang="en-US" sz="2000" spc="-1" strike="noStrike">
+          <a:lstStyle/>
+          <a:p>
+            <a:endParaRPr lang="en-US" sz="2000" b="0" strike="noStrike" spc="-1">
               <a:solidFill>
                 <a:srgbClr val="404040"/>
               </a:solidFill>
@@ -2291,11 +2504,12 @@
           </a:prstGeom>
         </p:spPr>
         <p:txBody>
-          <a:bodyPr lIns="0" rIns="0" tIns="0" bIns="0">
+          <a:bodyPr lIns="0" tIns="0" rIns="0" bIns="0">
             <a:normAutofit/>
           </a:bodyPr>
-          <a:p>
-            <a:endParaRPr b="0" lang="en-US" sz="2000" spc="-1" strike="noStrike">
+          <a:lstStyle/>
+          <a:p>
+            <a:endParaRPr lang="en-US" sz="2000" b="0" strike="noStrike" spc="-1">
               <a:solidFill>
                 <a:srgbClr val="404040"/>
               </a:solidFill>
@@ -2306,11 +2520,14 @@
       </p:sp>
     </p:spTree>
   </p:cSld>
+  <p:clrMapOvr>
+    <a:masterClrMapping/>
+  </p:clrMapOvr>
 </p:sldLayout>
 </file>
 
 <file path=ppt/slideLayouts/slideLayout5.xml><?xml version="1.0" encoding="utf-8"?>
-<p:sldLayout xmlns:a="http://schemas.openxmlformats.org/drawingml/2006/main" xmlns:p="http://schemas.openxmlformats.org/presentationml/2006/main" xmlns:r="http://schemas.openxmlformats.org/officeDocument/2006/relationships" xmlns:p14="http://schemas.microsoft.com/office/powerpoint/2010/main" xmlns:p15="http://schemas.microsoft.com/office/powerpoint/2012/main" xmlns:mc="http://schemas.openxmlformats.org/markup-compatibility/2006" type="titleOnly" preserve="1">
+<p:sldLayout xmlns:a="http://schemas.openxmlformats.org/drawingml/2006/main" xmlns:r="http://schemas.openxmlformats.org/officeDocument/2006/relationships" xmlns:p="http://schemas.openxmlformats.org/presentationml/2006/main" type="titleOnly" preserve="1">
   <p:cSld name="Title Only">
     <p:spTree>
       <p:nvGrpSpPr>
@@ -2346,9 +2563,10 @@
           </a:prstGeom>
         </p:spPr>
         <p:txBody>
-          <a:bodyPr lIns="0" rIns="0" tIns="0" bIns="0" anchor="ctr"/>
-          <a:p>
-            <a:endParaRPr b="0" lang="en-US" sz="1800" spc="-1" strike="noStrike">
+          <a:bodyPr lIns="0" tIns="0" rIns="0" bIns="0" anchor="ctr"/>
+          <a:lstStyle/>
+          <a:p>
+            <a:endParaRPr lang="en-US" sz="1800" b="0" strike="noStrike" spc="-1">
               <a:solidFill>
                 <a:srgbClr val="000000"/>
               </a:solidFill>
@@ -2359,11 +2577,14 @@
       </p:sp>
     </p:spTree>
   </p:cSld>
+  <p:clrMapOvr>
+    <a:masterClrMapping/>
+  </p:clrMapOvr>
 </p:sldLayout>
 </file>
 
 <file path=ppt/slideLayouts/slideLayout6.xml><?xml version="1.0" encoding="utf-8"?>
-<p:sldLayout xmlns:a="http://schemas.openxmlformats.org/drawingml/2006/main" xmlns:p="http://schemas.openxmlformats.org/presentationml/2006/main" xmlns:r="http://schemas.openxmlformats.org/officeDocument/2006/relationships" xmlns:p14="http://schemas.microsoft.com/office/powerpoint/2010/main" xmlns:p15="http://schemas.microsoft.com/office/powerpoint/2012/main" xmlns:mc="http://schemas.openxmlformats.org/markup-compatibility/2006" type="objOnly" preserve="1">
+<p:sldLayout xmlns:a="http://schemas.openxmlformats.org/drawingml/2006/main" xmlns:r="http://schemas.openxmlformats.org/officeDocument/2006/relationships" xmlns:p="http://schemas.openxmlformats.org/presentationml/2006/main" type="objOnly" preserve="1">
   <p:cSld name="Centered Text">
     <p:spTree>
       <p:nvGrpSpPr>
@@ -2399,10 +2620,11 @@
           </a:prstGeom>
         </p:spPr>
         <p:txBody>
-          <a:bodyPr lIns="0" rIns="0" tIns="0" bIns="0" anchor="ctr"/>
+          <a:bodyPr lIns="0" tIns="0" rIns="0" bIns="0" anchor="ctr"/>
+          <a:lstStyle/>
           <a:p>
             <a:pPr algn="ctr"/>
-            <a:endParaRPr b="0" lang="en-US" sz="3200" spc="-1" strike="noStrike">
+            <a:endParaRPr lang="en-US" sz="3200" b="0" strike="noStrike" spc="-1">
               <a:latin typeface="Arial"/>
             </a:endParaRPr>
           </a:p>
@@ -2410,11 +2632,14 @@
       </p:sp>
     </p:spTree>
   </p:cSld>
+  <p:clrMapOvr>
+    <a:masterClrMapping/>
+  </p:clrMapOvr>
 </p:sldLayout>
 </file>
 
 <file path=ppt/slideLayouts/slideLayout7.xml><?xml version="1.0" encoding="utf-8"?>
-<p:sldLayout xmlns:a="http://schemas.openxmlformats.org/drawingml/2006/main" xmlns:p="http://schemas.openxmlformats.org/presentationml/2006/main" xmlns:r="http://schemas.openxmlformats.org/officeDocument/2006/relationships" xmlns:p14="http://schemas.microsoft.com/office/powerpoint/2010/main" xmlns:p15="http://schemas.microsoft.com/office/powerpoint/2012/main" xmlns:mc="http://schemas.openxmlformats.org/markup-compatibility/2006" type="twoObjAndObj" preserve="1">
+<p:sldLayout xmlns:a="http://schemas.openxmlformats.org/drawingml/2006/main" xmlns:r="http://schemas.openxmlformats.org/officeDocument/2006/relationships" xmlns:p="http://schemas.openxmlformats.org/presentationml/2006/main" type="twoObjAndObj" preserve="1">
   <p:cSld name="Title, 2 Content and Content">
     <p:spTree>
       <p:nvGrpSpPr>
@@ -2450,9 +2675,10 @@
           </a:prstGeom>
         </p:spPr>
         <p:txBody>
-          <a:bodyPr lIns="0" rIns="0" tIns="0" bIns="0" anchor="ctr"/>
-          <a:p>
-            <a:endParaRPr b="0" lang="en-US" sz="1800" spc="-1" strike="noStrike">
+          <a:bodyPr lIns="0" tIns="0" rIns="0" bIns="0" anchor="ctr"/>
+          <a:lstStyle/>
+          <a:p>
+            <a:endParaRPr lang="en-US" sz="1800" b="0" strike="noStrike" spc="-1">
               <a:solidFill>
                 <a:srgbClr val="000000"/>
               </a:solidFill>
@@ -2481,11 +2707,12 @@
           </a:prstGeom>
         </p:spPr>
         <p:txBody>
-          <a:bodyPr lIns="0" rIns="0" tIns="0" bIns="0">
+          <a:bodyPr lIns="0" tIns="0" rIns="0" bIns="0">
             <a:normAutofit/>
           </a:bodyPr>
-          <a:p>
-            <a:endParaRPr b="0" lang="en-US" sz="2000" spc="-1" strike="noStrike">
+          <a:lstStyle/>
+          <a:p>
+            <a:endParaRPr lang="en-US" sz="2000" b="0" strike="noStrike" spc="-1">
               <a:solidFill>
                 <a:srgbClr val="404040"/>
               </a:solidFill>
@@ -2514,11 +2741,12 @@
           </a:prstGeom>
         </p:spPr>
         <p:txBody>
-          <a:bodyPr lIns="0" rIns="0" tIns="0" bIns="0">
+          <a:bodyPr lIns="0" tIns="0" rIns="0" bIns="0">
             <a:normAutofit/>
           </a:bodyPr>
-          <a:p>
-            <a:endParaRPr b="0" lang="en-US" sz="2000" spc="-1" strike="noStrike">
+          <a:lstStyle/>
+          <a:p>
+            <a:endParaRPr lang="en-US" sz="2000" b="0" strike="noStrike" spc="-1">
               <a:solidFill>
                 <a:srgbClr val="404040"/>
               </a:solidFill>
@@ -2547,11 +2775,12 @@
           </a:prstGeom>
         </p:spPr>
         <p:txBody>
-          <a:bodyPr lIns="0" rIns="0" tIns="0" bIns="0">
+          <a:bodyPr lIns="0" tIns="0" rIns="0" bIns="0">
             <a:normAutofit/>
           </a:bodyPr>
-          <a:p>
-            <a:endParaRPr b="0" lang="en-US" sz="2000" spc="-1" strike="noStrike">
+          <a:lstStyle/>
+          <a:p>
+            <a:endParaRPr lang="en-US" sz="2000" b="0" strike="noStrike" spc="-1">
               <a:solidFill>
                 <a:srgbClr val="404040"/>
               </a:solidFill>
@@ -2562,11 +2791,14 @@
       </p:sp>
     </p:spTree>
   </p:cSld>
+  <p:clrMapOvr>
+    <a:masterClrMapping/>
+  </p:clrMapOvr>
 </p:sldLayout>
 </file>
 
 <file path=ppt/slideLayouts/slideLayout8.xml><?xml version="1.0" encoding="utf-8"?>
-<p:sldLayout xmlns:a="http://schemas.openxmlformats.org/drawingml/2006/main" xmlns:p="http://schemas.openxmlformats.org/presentationml/2006/main" xmlns:r="http://schemas.openxmlformats.org/officeDocument/2006/relationships" xmlns:p14="http://schemas.microsoft.com/office/powerpoint/2010/main" xmlns:p15="http://schemas.microsoft.com/office/powerpoint/2012/main" xmlns:mc="http://schemas.openxmlformats.org/markup-compatibility/2006" type="objAndTwoObj" preserve="1">
+<p:sldLayout xmlns:a="http://schemas.openxmlformats.org/drawingml/2006/main" xmlns:r="http://schemas.openxmlformats.org/officeDocument/2006/relationships" xmlns:p="http://schemas.openxmlformats.org/presentationml/2006/main" type="objAndTwoObj" preserve="1">
   <p:cSld name="Title Content and 2 Content">
     <p:spTree>
       <p:nvGrpSpPr>
@@ -2602,9 +2834,10 @@
           </a:prstGeom>
         </p:spPr>
         <p:txBody>
-          <a:bodyPr lIns="0" rIns="0" tIns="0" bIns="0" anchor="ctr"/>
-          <a:p>
-            <a:endParaRPr b="0" lang="en-US" sz="1800" spc="-1" strike="noStrike">
+          <a:bodyPr lIns="0" tIns="0" rIns="0" bIns="0" anchor="ctr"/>
+          <a:lstStyle/>
+          <a:p>
+            <a:endParaRPr lang="en-US" sz="1800" b="0" strike="noStrike" spc="-1">
               <a:solidFill>
                 <a:srgbClr val="000000"/>
               </a:solidFill>
@@ -2633,11 +2866,12 @@
           </a:prstGeom>
         </p:spPr>
         <p:txBody>
-          <a:bodyPr lIns="0" rIns="0" tIns="0" bIns="0">
+          <a:bodyPr lIns="0" tIns="0" rIns="0" bIns="0">
             <a:normAutofit/>
           </a:bodyPr>
-          <a:p>
-            <a:endParaRPr b="0" lang="en-US" sz="2000" spc="-1" strike="noStrike">
+          <a:lstStyle/>
+          <a:p>
+            <a:endParaRPr lang="en-US" sz="2000" b="0" strike="noStrike" spc="-1">
               <a:solidFill>
                 <a:srgbClr val="404040"/>
               </a:solidFill>
@@ -2666,11 +2900,12 @@
           </a:prstGeom>
         </p:spPr>
         <p:txBody>
-          <a:bodyPr lIns="0" rIns="0" tIns="0" bIns="0">
+          <a:bodyPr lIns="0" tIns="0" rIns="0" bIns="0">
             <a:normAutofit/>
           </a:bodyPr>
-          <a:p>
-            <a:endParaRPr b="0" lang="en-US" sz="2000" spc="-1" strike="noStrike">
+          <a:lstStyle/>
+          <a:p>
+            <a:endParaRPr lang="en-US" sz="2000" b="0" strike="noStrike" spc="-1">
               <a:solidFill>
                 <a:srgbClr val="404040"/>
               </a:solidFill>
@@ -2699,11 +2934,12 @@
           </a:prstGeom>
         </p:spPr>
         <p:txBody>
-          <a:bodyPr lIns="0" rIns="0" tIns="0" bIns="0">
+          <a:bodyPr lIns="0" tIns="0" rIns="0" bIns="0">
             <a:normAutofit/>
           </a:bodyPr>
-          <a:p>
-            <a:endParaRPr b="0" lang="en-US" sz="2000" spc="-1" strike="noStrike">
+          <a:lstStyle/>
+          <a:p>
+            <a:endParaRPr lang="en-US" sz="2000" b="0" strike="noStrike" spc="-1">
               <a:solidFill>
                 <a:srgbClr val="404040"/>
               </a:solidFill>
@@ -2714,11 +2950,14 @@
       </p:sp>
     </p:spTree>
   </p:cSld>
+  <p:clrMapOvr>
+    <a:masterClrMapping/>
+  </p:clrMapOvr>
 </p:sldLayout>
 </file>
 
 <file path=ppt/slideLayouts/slideLayout9.xml><?xml version="1.0" encoding="utf-8"?>
-<p:sldLayout xmlns:a="http://schemas.openxmlformats.org/drawingml/2006/main" xmlns:p="http://schemas.openxmlformats.org/presentationml/2006/main" xmlns:r="http://schemas.openxmlformats.org/officeDocument/2006/relationships" xmlns:p14="http://schemas.microsoft.com/office/powerpoint/2010/main" xmlns:p15="http://schemas.microsoft.com/office/powerpoint/2012/main" xmlns:mc="http://schemas.openxmlformats.org/markup-compatibility/2006" type="twoObjOverTx" preserve="1">
+<p:sldLayout xmlns:a="http://schemas.openxmlformats.org/drawingml/2006/main" xmlns:r="http://schemas.openxmlformats.org/officeDocument/2006/relationships" xmlns:p="http://schemas.openxmlformats.org/presentationml/2006/main" type="twoObjOverTx" preserve="1">
   <p:cSld name="Title, 2 Content over Content">
     <p:spTree>
       <p:nvGrpSpPr>
@@ -2754,9 +2993,10 @@
           </a:prstGeom>
         </p:spPr>
         <p:txBody>
-          <a:bodyPr lIns="0" rIns="0" tIns="0" bIns="0" anchor="ctr"/>
-          <a:p>
-            <a:endParaRPr b="0" lang="en-US" sz="1800" spc="-1" strike="noStrike">
+          <a:bodyPr lIns="0" tIns="0" rIns="0" bIns="0" anchor="ctr"/>
+          <a:lstStyle/>
+          <a:p>
+            <a:endParaRPr lang="en-US" sz="1800" b="0" strike="noStrike" spc="-1">
               <a:solidFill>
                 <a:srgbClr val="000000"/>
               </a:solidFill>
@@ -2785,11 +3025,12 @@
           </a:prstGeom>
         </p:spPr>
         <p:txBody>
-          <a:bodyPr lIns="0" rIns="0" tIns="0" bIns="0">
+          <a:bodyPr lIns="0" tIns="0" rIns="0" bIns="0">
             <a:normAutofit/>
           </a:bodyPr>
-          <a:p>
-            <a:endParaRPr b="0" lang="en-US" sz="2000" spc="-1" strike="noStrike">
+          <a:lstStyle/>
+          <a:p>
+            <a:endParaRPr lang="en-US" sz="2000" b="0" strike="noStrike" spc="-1">
               <a:solidFill>
                 <a:srgbClr val="404040"/>
               </a:solidFill>
@@ -2818,11 +3059,12 @@
           </a:prstGeom>
         </p:spPr>
         <p:txBody>
-          <a:bodyPr lIns="0" rIns="0" tIns="0" bIns="0">
+          <a:bodyPr lIns="0" tIns="0" rIns="0" bIns="0">
             <a:normAutofit/>
           </a:bodyPr>
-          <a:p>
-            <a:endParaRPr b="0" lang="en-US" sz="2000" spc="-1" strike="noStrike">
+          <a:lstStyle/>
+          <a:p>
+            <a:endParaRPr lang="en-US" sz="2000" b="0" strike="noStrike" spc="-1">
               <a:solidFill>
                 <a:srgbClr val="404040"/>
               </a:solidFill>
@@ -2851,11 +3093,12 @@
           </a:prstGeom>
         </p:spPr>
         <p:txBody>
-          <a:bodyPr lIns="0" rIns="0" tIns="0" bIns="0">
+          <a:bodyPr lIns="0" tIns="0" rIns="0" bIns="0">
             <a:normAutofit/>
           </a:bodyPr>
-          <a:p>
-            <a:endParaRPr b="0" lang="en-US" sz="2000" spc="-1" strike="noStrike">
+          <a:lstStyle/>
+          <a:p>
+            <a:endParaRPr lang="en-US" sz="2000" b="0" strike="noStrike" spc="-1">
               <a:solidFill>
                 <a:srgbClr val="404040"/>
               </a:solidFill>
@@ -2866,17 +3109,21 @@
       </p:sp>
     </p:spTree>
   </p:cSld>
+  <p:clrMapOvr>
+    <a:masterClrMapping/>
+  </p:clrMapOvr>
 </p:sldLayout>
 </file>
 
 <file path=ppt/slideMasters/slideMaster1.xml><?xml version="1.0" encoding="utf-8"?>
-<p:sldMaster xmlns:a="http://schemas.openxmlformats.org/drawingml/2006/main" xmlns:p="http://schemas.openxmlformats.org/presentationml/2006/main" xmlns:r="http://schemas.openxmlformats.org/officeDocument/2006/relationships" xmlns:p14="http://schemas.microsoft.com/office/powerpoint/2010/main" xmlns:p15="http://schemas.microsoft.com/office/powerpoint/2012/main" xmlns:mc="http://schemas.openxmlformats.org/markup-compatibility/2006">
+<p:sldMaster xmlns:a="http://schemas.openxmlformats.org/drawingml/2006/main" xmlns:r="http://schemas.openxmlformats.org/officeDocument/2006/relationships" xmlns:p="http://schemas.openxmlformats.org/presentationml/2006/main">
   <p:cSld>
     <p:bg>
       <p:bgPr>
         <a:solidFill>
-          <a:srgbClr val="ffffff"/>
+          <a:srgbClr val="FFFFFF"/>
         </a:solidFill>
+        <a:effectLst/>
       </p:bgPr>
     </p:bg>
     <p:spTree>
@@ -2895,7 +3142,7 @@
       </p:grpSpPr>
       <p:sp>
         <p:nvSpPr>
-          <p:cNvPr id="0" name="CustomShape 1" hidden="1"/>
+          <p:cNvPr id="11" name="CustomShape 1" hidden="1"/>
           <p:cNvSpPr/>
           <p:nvPr/>
         </p:nvSpPr>
@@ -2908,22 +3155,28 @@
             <a:avLst/>
           </a:prstGeom>
           <a:solidFill>
-            <a:srgbClr val="bd582c"/>
+            <a:srgbClr val="BD582C"/>
           </a:solidFill>
           <a:ln w="15840">
             <a:noFill/>
           </a:ln>
         </p:spPr>
         <p:style>
-          <a:lnRef idx="0"/>
-          <a:fillRef idx="0"/>
-          <a:effectRef idx="0"/>
+          <a:lnRef idx="0">
+            <a:scrgbClr r="0" g="0" b="0"/>
+          </a:lnRef>
+          <a:fillRef idx="0">
+            <a:scrgbClr r="0" g="0" b="0"/>
+          </a:fillRef>
+          <a:effectRef idx="0">
+            <a:scrgbClr r="0" g="0" b="0"/>
+          </a:effectRef>
           <a:fontRef idx="minor"/>
         </p:style>
       </p:sp>
       <p:sp>
         <p:nvSpPr>
-          <p:cNvPr id="1" name="CustomShape 2" hidden="1"/>
+          <p:cNvPr id="12" name="CustomShape 2" hidden="1"/>
           <p:cNvSpPr/>
           <p:nvPr/>
         </p:nvSpPr>
@@ -2936,16 +3189,22 @@
             <a:avLst/>
           </a:prstGeom>
           <a:solidFill>
-            <a:srgbClr val="e48312"/>
+            <a:srgbClr val="E48312"/>
           </a:solidFill>
           <a:ln w="15840">
             <a:noFill/>
           </a:ln>
         </p:spPr>
         <p:style>
-          <a:lnRef idx="0"/>
-          <a:fillRef idx="0"/>
-          <a:effectRef idx="0"/>
+          <a:lnRef idx="0">
+            <a:scrgbClr r="0" g="0" b="0"/>
+          </a:lnRef>
+          <a:fillRef idx="0">
+            <a:scrgbClr r="0" g="0" b="0"/>
+          </a:fillRef>
+          <a:effectRef idx="0">
+            <a:scrgbClr r="0" g="0" b="0"/>
+          </a:effectRef>
           <a:fontRef idx="minor"/>
         </p:style>
       </p:sp>
@@ -2971,9 +3230,15 @@
           </a:ln>
         </p:spPr>
         <p:style>
-          <a:lnRef idx="0"/>
-          <a:fillRef idx="0"/>
-          <a:effectRef idx="0"/>
+          <a:lnRef idx="0">
+            <a:scrgbClr r="0" g="0" b="0"/>
+          </a:lnRef>
+          <a:fillRef idx="0">
+            <a:scrgbClr r="0" g="0" b="0"/>
+          </a:fillRef>
+          <a:effectRef idx="0">
+            <a:scrgbClr r="0" g="0" b="0"/>
+          </a:effectRef>
           <a:fontRef idx="minor"/>
         </p:style>
       </p:sp>
@@ -2992,16 +3257,22 @@
             <a:avLst/>
           </a:prstGeom>
           <a:solidFill>
-            <a:srgbClr val="bd582c"/>
+            <a:srgbClr val="BD582C"/>
           </a:solidFill>
           <a:ln w="15840">
             <a:noFill/>
           </a:ln>
         </p:spPr>
         <p:style>
-          <a:lnRef idx="0"/>
-          <a:fillRef idx="0"/>
-          <a:effectRef idx="0"/>
+          <a:lnRef idx="0">
+            <a:scrgbClr r="0" g="0" b="0"/>
+          </a:lnRef>
+          <a:fillRef idx="0">
+            <a:scrgbClr r="0" g="0" b="0"/>
+          </a:fillRef>
+          <a:effectRef idx="0">
+            <a:scrgbClr r="0" g="0" b="0"/>
+          </a:effectRef>
           <a:fontRef idx="minor"/>
         </p:style>
       </p:sp>
@@ -3020,16 +3291,22 @@
             <a:avLst/>
           </a:prstGeom>
           <a:solidFill>
-            <a:srgbClr val="e48312"/>
+            <a:srgbClr val="E48312"/>
           </a:solidFill>
           <a:ln w="15840">
             <a:noFill/>
           </a:ln>
         </p:spPr>
         <p:style>
-          <a:lnRef idx="0"/>
-          <a:fillRef idx="0"/>
-          <a:effectRef idx="0"/>
+          <a:lnRef idx="0">
+            <a:scrgbClr r="0" g="0" b="0"/>
+          </a:lnRef>
+          <a:fillRef idx="0">
+            <a:scrgbClr r="0" g="0" b="0"/>
+          </a:fillRef>
+          <a:effectRef idx="0">
+            <a:scrgbClr r="0" g="0" b="0"/>
+          </a:effectRef>
           <a:fontRef idx="minor"/>
         </p:style>
       </p:sp>
@@ -3056,6 +3333,7 @@
           <a:bodyPr anchor="b">
             <a:normAutofit/>
           </a:bodyPr>
+          <a:lstStyle/>
           <a:p>
             <a:pPr>
               <a:lnSpc>
@@ -3063,7 +3341,7 @@
               </a:lnSpc>
             </a:pPr>
             <a:r>
-              <a:rPr b="0" lang="en-US" sz="8000" spc="-49" strike="noStrike">
+              <a:rPr lang="en-US" sz="8000" b="0" strike="noStrike" spc="-49">
                 <a:solidFill>
                   <a:srgbClr val="262626"/>
                 </a:solidFill>
@@ -3071,7 +3349,7 @@
               </a:rPr>
               <a:t>Click to edit Master title style</a:t>
             </a:r>
-            <a:endParaRPr b="0" lang="en-US" sz="8000" spc="-1" strike="noStrike">
+            <a:endParaRPr lang="en-US" sz="8000" b="0" strike="noStrike" spc="-1">
               <a:solidFill>
                 <a:srgbClr val="000000"/>
               </a:solidFill>
@@ -3101,6 +3379,7 @@
         </p:spPr>
         <p:txBody>
           <a:bodyPr anchor="ctr"/>
+          <a:lstStyle/>
           <a:p>
             <a:pPr>
               <a:lnSpc>
@@ -3108,15 +3387,15 @@
               </a:lnSpc>
             </a:pPr>
             <a:fld id="{675DE930-268F-4527-B843-715747EF891F}" type="datetime">
-              <a:rPr b="0" lang="en-US" sz="900" spc="-1" strike="noStrike">
+              <a:rPr lang="en-US" sz="900" b="0" strike="noStrike" spc="-1">
                 <a:solidFill>
-                  <a:srgbClr val="ffffff"/>
+                  <a:srgbClr val="FFFFFF"/>
                 </a:solidFill>
                 <a:latin typeface="Calibri"/>
               </a:rPr>
               <a:t>2/7/19</a:t>
             </a:fld>
-            <a:endParaRPr b="0" lang="en-US" sz="900" spc="-1" strike="noStrike">
+            <a:endParaRPr lang="en-US" sz="900" b="0" strike="noStrike" spc="-1">
               <a:latin typeface="Times New Roman"/>
             </a:endParaRPr>
           </a:p>
@@ -3143,8 +3422,9 @@
         </p:spPr>
         <p:txBody>
           <a:bodyPr anchor="ctr"/>
-          <a:p>
-            <a:endParaRPr b="0" lang="en-US" sz="2400" spc="-1" strike="noStrike">
+          <a:lstStyle/>
+          <a:p>
+            <a:endParaRPr lang="en-US" sz="2400" b="0" strike="noStrike" spc="-1">
               <a:latin typeface="Times New Roman"/>
             </a:endParaRPr>
           </a:p>
@@ -3171,6 +3451,7 @@
         </p:spPr>
         <p:txBody>
           <a:bodyPr anchor="ctr"/>
+          <a:lstStyle/>
           <a:p>
             <a:pPr algn="r">
               <a:lnSpc>
@@ -3178,15 +3459,15 @@
               </a:lnSpc>
             </a:pPr>
             <a:fld id="{8BB19777-80CF-45DB-8F5E-6AE0421DEDE2}" type="slidenum">
-              <a:rPr b="0" lang="en-US" sz="1050" spc="-1" strike="noStrike">
+              <a:rPr lang="en-US" sz="1050" b="0" strike="noStrike" spc="-1">
                 <a:solidFill>
-                  <a:srgbClr val="ffffff"/>
+                  <a:srgbClr val="FFFFFF"/>
                 </a:solidFill>
                 <a:latin typeface="Calibri"/>
               </a:rPr>
-              <a:t>&lt;number&gt;</a:t>
+              <a:t>‹#›</a:t>
             </a:fld>
-            <a:endParaRPr b="0" lang="en-US" sz="1050" spc="-1" strike="noStrike">
+            <a:endParaRPr lang="en-US" sz="1050" b="0" strike="noStrike" spc="-1">
               <a:latin typeface="Times New Roman"/>
             </a:endParaRPr>
           </a:p>
@@ -3214,9 +3495,15 @@
           </a:ln>
         </p:spPr>
         <p:style>
-          <a:lnRef idx="0"/>
-          <a:fillRef idx="0"/>
-          <a:effectRef idx="0"/>
+          <a:lnRef idx="0">
+            <a:scrgbClr r="0" g="0" b="0"/>
+          </a:lnRef>
+          <a:fillRef idx="0">
+            <a:scrgbClr r="0" g="0" b="0"/>
+          </a:fillRef>
+          <a:effectRef idx="0">
+            <a:scrgbClr r="0" g="0" b="0"/>
+          </a:effectRef>
           <a:fontRef idx="minor"/>
         </p:style>
       </p:sp>
@@ -3240,9 +3527,10 @@
           </a:prstGeom>
         </p:spPr>
         <p:txBody>
-          <a:bodyPr lIns="0" rIns="0" tIns="0" bIns="0">
+          <a:bodyPr lIns="0" tIns="0" rIns="0" bIns="0">
             <a:normAutofit/>
           </a:bodyPr>
+          <a:lstStyle/>
           <a:p>
             <a:pPr marL="432000" indent="-324000">
               <a:spcBef>
@@ -3256,7 +3544,7 @@
               <a:buChar char=""/>
             </a:pPr>
             <a:r>
-              <a:rPr b="0" lang="en-US" sz="2000" spc="-1" strike="noStrike">
+              <a:rPr lang="en-US" sz="2000" b="0" strike="noStrike" spc="-1">
                 <a:solidFill>
                   <a:srgbClr val="404040"/>
                 </a:solidFill>
@@ -3264,15 +3552,9 @@
               </a:rPr>
               <a:t>Click to edit the outline text format</a:t>
             </a:r>
-            <a:endParaRPr b="0" lang="en-US" sz="2000" spc="-1" strike="noStrike">
-              <a:solidFill>
-                <a:srgbClr val="404040"/>
-              </a:solidFill>
-              <a:latin typeface="Calibri"/>
-            </a:endParaRPr>
-          </a:p>
-          <a:p>
-            <a:pPr lvl="1" marL="864000" indent="-324000">
+          </a:p>
+          <a:p>
+            <a:pPr marL="864000" lvl="1" indent="-324000">
               <a:spcBef>
                 <a:spcPts val="1134"/>
               </a:spcBef>
@@ -3284,7 +3566,7 @@
               <a:buChar char=""/>
             </a:pPr>
             <a:r>
-              <a:rPr b="0" lang="en-US" sz="1400" spc="-1" strike="noStrike">
+              <a:rPr lang="en-US" sz="1400" b="0" strike="noStrike" spc="-1">
                 <a:solidFill>
                   <a:srgbClr val="404040"/>
                 </a:solidFill>
@@ -3292,15 +3574,9 @@
               </a:rPr>
               <a:t>Second Outline Level</a:t>
             </a:r>
-            <a:endParaRPr b="0" lang="en-US" sz="1400" spc="-1" strike="noStrike">
-              <a:solidFill>
-                <a:srgbClr val="404040"/>
-              </a:solidFill>
-              <a:latin typeface="Calibri"/>
-            </a:endParaRPr>
-          </a:p>
-          <a:p>
-            <a:pPr lvl="2" marL="1296000" indent="-288000">
+          </a:p>
+          <a:p>
+            <a:pPr marL="1296000" lvl="2" indent="-288000">
               <a:spcBef>
                 <a:spcPts val="850"/>
               </a:spcBef>
@@ -3312,7 +3588,7 @@
               <a:buChar char=""/>
             </a:pPr>
             <a:r>
-              <a:rPr b="0" lang="en-US" sz="1400" spc="-1" strike="noStrike">
+              <a:rPr lang="en-US" sz="1400" b="0" strike="noStrike" spc="-1">
                 <a:solidFill>
                   <a:srgbClr val="404040"/>
                 </a:solidFill>
@@ -3320,15 +3596,9 @@
               </a:rPr>
               <a:t>Third Outline Level</a:t>
             </a:r>
-            <a:endParaRPr b="0" lang="en-US" sz="1400" spc="-1" strike="noStrike">
-              <a:solidFill>
-                <a:srgbClr val="404040"/>
-              </a:solidFill>
-              <a:latin typeface="Calibri"/>
-            </a:endParaRPr>
-          </a:p>
-          <a:p>
-            <a:pPr lvl="3" marL="1728000" indent="-216000">
+          </a:p>
+          <a:p>
+            <a:pPr marL="1728000" lvl="3" indent="-216000">
               <a:spcBef>
                 <a:spcPts val="567"/>
               </a:spcBef>
@@ -3340,7 +3610,7 @@
               <a:buChar char=""/>
             </a:pPr>
             <a:r>
-              <a:rPr b="0" lang="en-US" sz="1400" spc="-1" strike="noStrike">
+              <a:rPr lang="en-US" sz="1400" b="0" strike="noStrike" spc="-1">
                 <a:solidFill>
                   <a:srgbClr val="404040"/>
                 </a:solidFill>
@@ -3348,15 +3618,9 @@
               </a:rPr>
               <a:t>Fourth Outline Level</a:t>
             </a:r>
-            <a:endParaRPr b="0" lang="en-US" sz="1400" spc="-1" strike="noStrike">
-              <a:solidFill>
-                <a:srgbClr val="404040"/>
-              </a:solidFill>
-              <a:latin typeface="Calibri"/>
-            </a:endParaRPr>
-          </a:p>
-          <a:p>
-            <a:pPr lvl="4" marL="2160000" indent="-216000">
+          </a:p>
+          <a:p>
+            <a:pPr marL="2160000" lvl="4" indent="-216000">
               <a:spcBef>
                 <a:spcPts val="283"/>
               </a:spcBef>
@@ -3368,7 +3632,7 @@
               <a:buChar char=""/>
             </a:pPr>
             <a:r>
-              <a:rPr b="0" lang="en-US" sz="2000" spc="-1" strike="noStrike">
+              <a:rPr lang="en-US" sz="2000" b="0" strike="noStrike" spc="-1">
                 <a:solidFill>
                   <a:srgbClr val="404040"/>
                 </a:solidFill>
@@ -3376,15 +3640,9 @@
               </a:rPr>
               <a:t>Fifth Outline Level</a:t>
             </a:r>
-            <a:endParaRPr b="0" lang="en-US" sz="2000" spc="-1" strike="noStrike">
-              <a:solidFill>
-                <a:srgbClr val="404040"/>
-              </a:solidFill>
-              <a:latin typeface="Calibri"/>
-            </a:endParaRPr>
-          </a:p>
-          <a:p>
-            <a:pPr lvl="5" marL="2592000" indent="-216000">
+          </a:p>
+          <a:p>
+            <a:pPr marL="2592000" lvl="5" indent="-216000">
               <a:spcBef>
                 <a:spcPts val="283"/>
               </a:spcBef>
@@ -3396,7 +3654,7 @@
               <a:buChar char=""/>
             </a:pPr>
             <a:r>
-              <a:rPr b="0" lang="en-US" sz="2000" spc="-1" strike="noStrike">
+              <a:rPr lang="en-US" sz="2000" b="0" strike="noStrike" spc="-1">
                 <a:solidFill>
                   <a:srgbClr val="404040"/>
                 </a:solidFill>
@@ -3404,15 +3662,9 @@
               </a:rPr>
               <a:t>Sixth Outline Level</a:t>
             </a:r>
-            <a:endParaRPr b="0" lang="en-US" sz="2000" spc="-1" strike="noStrike">
-              <a:solidFill>
-                <a:srgbClr val="404040"/>
-              </a:solidFill>
-              <a:latin typeface="Calibri"/>
-            </a:endParaRPr>
-          </a:p>
-          <a:p>
-            <a:pPr lvl="6" marL="3024000" indent="-216000">
+          </a:p>
+          <a:p>
+            <a:pPr marL="3024000" lvl="6" indent="-216000">
               <a:spcBef>
                 <a:spcPts val="283"/>
               </a:spcBef>
@@ -3424,7 +3676,7 @@
               <a:buChar char=""/>
             </a:pPr>
             <a:r>
-              <a:rPr b="0" lang="en-US" sz="2000" spc="-1" strike="noStrike">
+              <a:rPr lang="en-US" sz="2000" b="0" strike="noStrike" spc="-1">
                 <a:solidFill>
                   <a:srgbClr val="404040"/>
                 </a:solidFill>
@@ -3432,43 +3684,318 @@
               </a:rPr>
               <a:t>Seventh Outline Level</a:t>
             </a:r>
-            <a:endParaRPr b="0" lang="en-US" sz="2000" spc="-1" strike="noStrike">
-              <a:solidFill>
-                <a:srgbClr val="404040"/>
-              </a:solidFill>
-              <a:latin typeface="Calibri"/>
-            </a:endParaRPr>
           </a:p>
         </p:txBody>
       </p:sp>
     </p:spTree>
   </p:cSld>
-  <p:clrMap bg1="lt1" bg2="lt2" tx1="dk1" tx2="dk2" accent1="accent1" accent2="accent2" accent3="accent3" accent4="accent4" accent5="accent5" accent6="accent6" hlink="hlink" folHlink="folHlink"/>
+  <p:clrMap bg1="lt1" tx1="dk1" bg2="lt2" tx2="dk2" accent1="accent1" accent2="accent2" accent3="accent3" accent4="accent4" accent5="accent5" accent6="accent6" hlink="hlink" folHlink="folHlink"/>
   <p:sldLayoutIdLst>
-    <p:sldLayoutId id="2147483649" r:id="rId2"/>
-    <p:sldLayoutId id="2147483650" r:id="rId3"/>
-    <p:sldLayoutId id="2147483651" r:id="rId4"/>
-    <p:sldLayoutId id="2147483652" r:id="rId5"/>
-    <p:sldLayoutId id="2147483653" r:id="rId6"/>
-    <p:sldLayoutId id="2147483654" r:id="rId7"/>
-    <p:sldLayoutId id="2147483655" r:id="rId8"/>
-    <p:sldLayoutId id="2147483656" r:id="rId9"/>
-    <p:sldLayoutId id="2147483657" r:id="rId10"/>
-    <p:sldLayoutId id="2147483658" r:id="rId11"/>
-    <p:sldLayoutId id="2147483659" r:id="rId12"/>
-    <p:sldLayoutId id="2147483660" r:id="rId13"/>
+    <p:sldLayoutId id="2147483649" r:id="rId1"/>
+    <p:sldLayoutId id="2147483650" r:id="rId2"/>
+    <p:sldLayoutId id="2147483651" r:id="rId3"/>
+    <p:sldLayoutId id="2147483652" r:id="rId4"/>
+    <p:sldLayoutId id="2147483653" r:id="rId5"/>
+    <p:sldLayoutId id="2147483654" r:id="rId6"/>
+    <p:sldLayoutId id="2147483655" r:id="rId7"/>
+    <p:sldLayoutId id="2147483656" r:id="rId8"/>
+    <p:sldLayoutId id="2147483657" r:id="rId9"/>
+    <p:sldLayoutId id="2147483658" r:id="rId10"/>
+    <p:sldLayoutId id="2147483659" r:id="rId11"/>
+    <p:sldLayoutId id="2147483660" r:id="rId12"/>
   </p:sldLayoutIdLst>
+  <p:txStyles>
+    <p:titleStyle>
+      <a:lvl1pPr algn="l" defTabSz="914400" rtl="0" eaLnBrk="1" latinLnBrk="0" hangingPunct="1">
+        <a:lnSpc>
+          <a:spcPct val="90000"/>
+        </a:lnSpc>
+        <a:spcBef>
+          <a:spcPct val="0"/>
+        </a:spcBef>
+        <a:buNone/>
+        <a:defRPr sz="4400" kern="1200">
+          <a:solidFill>
+            <a:schemeClr val="tx1"/>
+          </a:solidFill>
+          <a:latin typeface="+mj-lt"/>
+          <a:ea typeface="+mj-ea"/>
+          <a:cs typeface="+mj-cs"/>
+        </a:defRPr>
+      </a:lvl1pPr>
+    </p:titleStyle>
+    <p:bodyStyle>
+      <a:lvl1pPr marL="228600" indent="-228600" algn="l" defTabSz="914400" rtl="0" eaLnBrk="1" latinLnBrk="0" hangingPunct="1">
+        <a:lnSpc>
+          <a:spcPct val="90000"/>
+        </a:lnSpc>
+        <a:spcBef>
+          <a:spcPts val="1000"/>
+        </a:spcBef>
+        <a:buFont typeface="Arial" panose="020B0604020202020204" pitchFamily="34" charset="0"/>
+        <a:buChar char="•"/>
+        <a:defRPr sz="2800" kern="1200">
+          <a:solidFill>
+            <a:schemeClr val="tx1"/>
+          </a:solidFill>
+          <a:latin typeface="+mn-lt"/>
+          <a:ea typeface="+mn-ea"/>
+          <a:cs typeface="+mn-cs"/>
+        </a:defRPr>
+      </a:lvl1pPr>
+      <a:lvl2pPr marL="685800" indent="-228600" algn="l" defTabSz="914400" rtl="0" eaLnBrk="1" latinLnBrk="0" hangingPunct="1">
+        <a:lnSpc>
+          <a:spcPct val="90000"/>
+        </a:lnSpc>
+        <a:spcBef>
+          <a:spcPts val="500"/>
+        </a:spcBef>
+        <a:buFont typeface="Arial" panose="020B0604020202020204" pitchFamily="34" charset="0"/>
+        <a:buChar char="•"/>
+        <a:defRPr sz="2400" kern="1200">
+          <a:solidFill>
+            <a:schemeClr val="tx1"/>
+          </a:solidFill>
+          <a:latin typeface="+mn-lt"/>
+          <a:ea typeface="+mn-ea"/>
+          <a:cs typeface="+mn-cs"/>
+        </a:defRPr>
+      </a:lvl2pPr>
+      <a:lvl3pPr marL="1143000" indent="-228600" algn="l" defTabSz="914400" rtl="0" eaLnBrk="1" latinLnBrk="0" hangingPunct="1">
+        <a:lnSpc>
+          <a:spcPct val="90000"/>
+        </a:lnSpc>
+        <a:spcBef>
+          <a:spcPts val="500"/>
+        </a:spcBef>
+        <a:buFont typeface="Arial" panose="020B0604020202020204" pitchFamily="34" charset="0"/>
+        <a:buChar char="•"/>
+        <a:defRPr sz="2000" kern="1200">
+          <a:solidFill>
+            <a:schemeClr val="tx1"/>
+          </a:solidFill>
+          <a:latin typeface="+mn-lt"/>
+          <a:ea typeface="+mn-ea"/>
+          <a:cs typeface="+mn-cs"/>
+        </a:defRPr>
+      </a:lvl3pPr>
+      <a:lvl4pPr marL="1600200" indent="-228600" algn="l" defTabSz="914400" rtl="0" eaLnBrk="1" latinLnBrk="0" hangingPunct="1">
+        <a:lnSpc>
+          <a:spcPct val="90000"/>
+        </a:lnSpc>
+        <a:spcBef>
+          <a:spcPts val="500"/>
+        </a:spcBef>
+        <a:buFont typeface="Arial" panose="020B0604020202020204" pitchFamily="34" charset="0"/>
+        <a:buChar char="•"/>
+        <a:defRPr sz="1800" kern="1200">
+          <a:solidFill>
+            <a:schemeClr val="tx1"/>
+          </a:solidFill>
+          <a:latin typeface="+mn-lt"/>
+          <a:ea typeface="+mn-ea"/>
+          <a:cs typeface="+mn-cs"/>
+        </a:defRPr>
+      </a:lvl4pPr>
+      <a:lvl5pPr marL="2057400" indent="-228600" algn="l" defTabSz="914400" rtl="0" eaLnBrk="1" latinLnBrk="0" hangingPunct="1">
+        <a:lnSpc>
+          <a:spcPct val="90000"/>
+        </a:lnSpc>
+        <a:spcBef>
+          <a:spcPts val="500"/>
+        </a:spcBef>
+        <a:buFont typeface="Arial" panose="020B0604020202020204" pitchFamily="34" charset="0"/>
+        <a:buChar char="•"/>
+        <a:defRPr sz="1800" kern="1200">
+          <a:solidFill>
+            <a:schemeClr val="tx1"/>
+          </a:solidFill>
+          <a:latin typeface="+mn-lt"/>
+          <a:ea typeface="+mn-ea"/>
+          <a:cs typeface="+mn-cs"/>
+        </a:defRPr>
+      </a:lvl5pPr>
+      <a:lvl6pPr marL="2514600" indent="-228600" algn="l" defTabSz="914400" rtl="0" eaLnBrk="1" latinLnBrk="0" hangingPunct="1">
+        <a:lnSpc>
+          <a:spcPct val="90000"/>
+        </a:lnSpc>
+        <a:spcBef>
+          <a:spcPts val="500"/>
+        </a:spcBef>
+        <a:buFont typeface="Arial" panose="020B0604020202020204" pitchFamily="34" charset="0"/>
+        <a:buChar char="•"/>
+        <a:defRPr sz="1800" kern="1200">
+          <a:solidFill>
+            <a:schemeClr val="tx1"/>
+          </a:solidFill>
+          <a:latin typeface="+mn-lt"/>
+          <a:ea typeface="+mn-ea"/>
+          <a:cs typeface="+mn-cs"/>
+        </a:defRPr>
+      </a:lvl6pPr>
+      <a:lvl7pPr marL="2971800" indent="-228600" algn="l" defTabSz="914400" rtl="0" eaLnBrk="1" latinLnBrk="0" hangingPunct="1">
+        <a:lnSpc>
+          <a:spcPct val="90000"/>
+        </a:lnSpc>
+        <a:spcBef>
+          <a:spcPts val="500"/>
+        </a:spcBef>
+        <a:buFont typeface="Arial" panose="020B0604020202020204" pitchFamily="34" charset="0"/>
+        <a:buChar char="•"/>
+        <a:defRPr sz="1800" kern="1200">
+          <a:solidFill>
+            <a:schemeClr val="tx1"/>
+          </a:solidFill>
+          <a:latin typeface="+mn-lt"/>
+          <a:ea typeface="+mn-ea"/>
+          <a:cs typeface="+mn-cs"/>
+        </a:defRPr>
+      </a:lvl7pPr>
+      <a:lvl8pPr marL="3429000" indent="-228600" algn="l" defTabSz="914400" rtl="0" eaLnBrk="1" latinLnBrk="0" hangingPunct="1">
+        <a:lnSpc>
+          <a:spcPct val="90000"/>
+        </a:lnSpc>
+        <a:spcBef>
+          <a:spcPts val="500"/>
+        </a:spcBef>
+        <a:buFont typeface="Arial" panose="020B0604020202020204" pitchFamily="34" charset="0"/>
+        <a:buChar char="•"/>
+        <a:defRPr sz="1800" kern="1200">
+          <a:solidFill>
+            <a:schemeClr val="tx1"/>
+          </a:solidFill>
+          <a:latin typeface="+mn-lt"/>
+          <a:ea typeface="+mn-ea"/>
+          <a:cs typeface="+mn-cs"/>
+        </a:defRPr>
+      </a:lvl8pPr>
+      <a:lvl9pPr marL="3886200" indent="-228600" algn="l" defTabSz="914400" rtl="0" eaLnBrk="1" latinLnBrk="0" hangingPunct="1">
+        <a:lnSpc>
+          <a:spcPct val="90000"/>
+        </a:lnSpc>
+        <a:spcBef>
+          <a:spcPts val="500"/>
+        </a:spcBef>
+        <a:buFont typeface="Arial" panose="020B0604020202020204" pitchFamily="34" charset="0"/>
+        <a:buChar char="•"/>
+        <a:defRPr sz="1800" kern="1200">
+          <a:solidFill>
+            <a:schemeClr val="tx1"/>
+          </a:solidFill>
+          <a:latin typeface="+mn-lt"/>
+          <a:ea typeface="+mn-ea"/>
+          <a:cs typeface="+mn-cs"/>
+        </a:defRPr>
+      </a:lvl9pPr>
+    </p:bodyStyle>
+    <p:otherStyle>
+      <a:defPPr>
+        <a:defRPr lang="en-US"/>
+      </a:defPPr>
+      <a:lvl1pPr marL="0" algn="l" defTabSz="914400" rtl="0" eaLnBrk="1" latinLnBrk="0" hangingPunct="1">
+        <a:defRPr sz="1800" kern="1200">
+          <a:solidFill>
+            <a:schemeClr val="tx1"/>
+          </a:solidFill>
+          <a:latin typeface="+mn-lt"/>
+          <a:ea typeface="+mn-ea"/>
+          <a:cs typeface="+mn-cs"/>
+        </a:defRPr>
+      </a:lvl1pPr>
+      <a:lvl2pPr marL="457200" algn="l" defTabSz="914400" rtl="0" eaLnBrk="1" latinLnBrk="0" hangingPunct="1">
+        <a:defRPr sz="1800" kern="1200">
+          <a:solidFill>
+            <a:schemeClr val="tx1"/>
+          </a:solidFill>
+          <a:latin typeface="+mn-lt"/>
+          <a:ea typeface="+mn-ea"/>
+          <a:cs typeface="+mn-cs"/>
+        </a:defRPr>
+      </a:lvl2pPr>
+      <a:lvl3pPr marL="914400" algn="l" defTabSz="914400" rtl="0" eaLnBrk="1" latinLnBrk="0" hangingPunct="1">
+        <a:defRPr sz="1800" kern="1200">
+          <a:solidFill>
+            <a:schemeClr val="tx1"/>
+          </a:solidFill>
+          <a:latin typeface="+mn-lt"/>
+          <a:ea typeface="+mn-ea"/>
+          <a:cs typeface="+mn-cs"/>
+        </a:defRPr>
+      </a:lvl3pPr>
+      <a:lvl4pPr marL="1371600" algn="l" defTabSz="914400" rtl="0" eaLnBrk="1" latinLnBrk="0" hangingPunct="1">
+        <a:defRPr sz="1800" kern="1200">
+          <a:solidFill>
+            <a:schemeClr val="tx1"/>
+          </a:solidFill>
+          <a:latin typeface="+mn-lt"/>
+          <a:ea typeface="+mn-ea"/>
+          <a:cs typeface="+mn-cs"/>
+        </a:defRPr>
+      </a:lvl4pPr>
+      <a:lvl5pPr marL="1828800" algn="l" defTabSz="914400" rtl="0" eaLnBrk="1" latinLnBrk="0" hangingPunct="1">
+        <a:defRPr sz="1800" kern="1200">
+          <a:solidFill>
+            <a:schemeClr val="tx1"/>
+          </a:solidFill>
+          <a:latin typeface="+mn-lt"/>
+          <a:ea typeface="+mn-ea"/>
+          <a:cs typeface="+mn-cs"/>
+        </a:defRPr>
+      </a:lvl5pPr>
+      <a:lvl6pPr marL="2286000" algn="l" defTabSz="914400" rtl="0" eaLnBrk="1" latinLnBrk="0" hangingPunct="1">
+        <a:defRPr sz="1800" kern="1200">
+          <a:solidFill>
+            <a:schemeClr val="tx1"/>
+          </a:solidFill>
+          <a:latin typeface="+mn-lt"/>
+          <a:ea typeface="+mn-ea"/>
+          <a:cs typeface="+mn-cs"/>
+        </a:defRPr>
+      </a:lvl6pPr>
+      <a:lvl7pPr marL="2743200" algn="l" defTabSz="914400" rtl="0" eaLnBrk="1" latinLnBrk="0" hangingPunct="1">
+        <a:defRPr sz="1800" kern="1200">
+          <a:solidFill>
+            <a:schemeClr val="tx1"/>
+          </a:solidFill>
+          <a:latin typeface="+mn-lt"/>
+          <a:ea typeface="+mn-ea"/>
+          <a:cs typeface="+mn-cs"/>
+        </a:defRPr>
+      </a:lvl7pPr>
+      <a:lvl8pPr marL="3200400" algn="l" defTabSz="914400" rtl="0" eaLnBrk="1" latinLnBrk="0" hangingPunct="1">
+        <a:defRPr sz="1800" kern="1200">
+          <a:solidFill>
+            <a:schemeClr val="tx1"/>
+          </a:solidFill>
+          <a:latin typeface="+mn-lt"/>
+          <a:ea typeface="+mn-ea"/>
+          <a:cs typeface="+mn-cs"/>
+        </a:defRPr>
+      </a:lvl8pPr>
+      <a:lvl9pPr marL="3657600" algn="l" defTabSz="914400" rtl="0" eaLnBrk="1" latinLnBrk="0" hangingPunct="1">
+        <a:defRPr sz="1800" kern="1200">
+          <a:solidFill>
+            <a:schemeClr val="tx1"/>
+          </a:solidFill>
+          <a:latin typeface="+mn-lt"/>
+          <a:ea typeface="+mn-ea"/>
+          <a:cs typeface="+mn-cs"/>
+        </a:defRPr>
+      </a:lvl9pPr>
+    </p:otherStyle>
+  </p:txStyles>
 </p:sldMaster>
 </file>
 
 <file path=ppt/slideMasters/slideMaster2.xml><?xml version="1.0" encoding="utf-8"?>
-<p:sldMaster xmlns:a="http://schemas.openxmlformats.org/drawingml/2006/main" xmlns:p="http://schemas.openxmlformats.org/presentationml/2006/main" xmlns:r="http://schemas.openxmlformats.org/officeDocument/2006/relationships" xmlns:p14="http://schemas.microsoft.com/office/powerpoint/2010/main" xmlns:p15="http://schemas.microsoft.com/office/powerpoint/2012/main" xmlns:mc="http://schemas.openxmlformats.org/markup-compatibility/2006">
+<p:sldMaster xmlns:a="http://schemas.openxmlformats.org/drawingml/2006/main" xmlns:r="http://schemas.openxmlformats.org/officeDocument/2006/relationships" xmlns:p="http://schemas.openxmlformats.org/presentationml/2006/main">
   <p:cSld>
     <p:bg>
       <p:bgPr>
         <a:solidFill>
-          <a:srgbClr val="ffffff"/>
+          <a:srgbClr val="FFFFFF"/>
         </a:solidFill>
+        <a:effectLst/>
       </p:bgPr>
     </p:bg>
     <p:spTree>
@@ -3500,16 +4027,22 @@
             <a:avLst/>
           </a:prstGeom>
           <a:solidFill>
-            <a:srgbClr val="bd582c"/>
+            <a:srgbClr val="BD582C"/>
           </a:solidFill>
           <a:ln w="15840">
             <a:noFill/>
           </a:ln>
         </p:spPr>
         <p:style>
-          <a:lnRef idx="0"/>
-          <a:fillRef idx="0"/>
-          <a:effectRef idx="0"/>
+          <a:lnRef idx="0">
+            <a:scrgbClr r="0" g="0" b="0"/>
+          </a:lnRef>
+          <a:fillRef idx="0">
+            <a:scrgbClr r="0" g="0" b="0"/>
+          </a:fillRef>
+          <a:effectRef idx="0">
+            <a:scrgbClr r="0" g="0" b="0"/>
+          </a:effectRef>
           <a:fontRef idx="minor"/>
         </p:style>
       </p:sp>
@@ -3528,16 +4061,22 @@
             <a:avLst/>
           </a:prstGeom>
           <a:solidFill>
-            <a:srgbClr val="e48312"/>
+            <a:srgbClr val="E48312"/>
           </a:solidFill>
           <a:ln w="15840">
             <a:noFill/>
           </a:ln>
         </p:spPr>
         <p:style>
-          <a:lnRef idx="0"/>
-          <a:fillRef idx="0"/>
-          <a:effectRef idx="0"/>
+          <a:lnRef idx="0">
+            <a:scrgbClr r="0" g="0" b="0"/>
+          </a:lnRef>
+          <a:fillRef idx="0">
+            <a:scrgbClr r="0" g="0" b="0"/>
+          </a:fillRef>
+          <a:effectRef idx="0">
+            <a:scrgbClr r="0" g="0" b="0"/>
+          </a:effectRef>
           <a:fontRef idx="minor"/>
         </p:style>
       </p:sp>
@@ -3563,9 +4102,15 @@
           </a:ln>
         </p:spPr>
         <p:style>
-          <a:lnRef idx="0"/>
-          <a:fillRef idx="0"/>
-          <a:effectRef idx="0"/>
+          <a:lnRef idx="0">
+            <a:scrgbClr r="0" g="0" b="0"/>
+          </a:lnRef>
+          <a:fillRef idx="0">
+            <a:scrgbClr r="0" g="0" b="0"/>
+          </a:fillRef>
+          <a:effectRef idx="0">
+            <a:scrgbClr r="0" g="0" b="0"/>
+          </a:effectRef>
           <a:fontRef idx="minor"/>
         </p:style>
       </p:sp>
@@ -3590,6 +4135,7 @@
         </p:spPr>
         <p:txBody>
           <a:bodyPr anchor="b"/>
+          <a:lstStyle/>
           <a:p>
             <a:pPr>
               <a:lnSpc>
@@ -3597,7 +4143,7 @@
               </a:lnSpc>
             </a:pPr>
             <a:r>
-              <a:rPr b="0" lang="en-US" sz="4800" spc="-49" strike="noStrike">
+              <a:rPr lang="en-US" sz="4800" b="0" strike="noStrike" spc="-49">
                 <a:solidFill>
                   <a:srgbClr val="404040"/>
                 </a:solidFill>
@@ -3605,7 +4151,7 @@
               </a:rPr>
               <a:t>Click to edit Master title style</a:t>
             </a:r>
-            <a:endParaRPr b="0" lang="en-US" sz="4800" spc="-1" strike="noStrike">
+            <a:endParaRPr lang="en-US" sz="4800" b="0" strike="noStrike" spc="-1">
               <a:solidFill>
                 <a:srgbClr val="000000"/>
               </a:solidFill>
@@ -3635,6 +4181,7 @@
         </p:spPr>
         <p:txBody>
           <a:bodyPr lIns="0" rIns="0"/>
+          <a:lstStyle/>
           <a:p>
             <a:pPr marL="432000" indent="-324000">
               <a:lnSpc>
@@ -3654,7 +4201,7 @@
               <a:buChar char=""/>
             </a:pPr>
             <a:r>
-              <a:rPr b="0" lang="en-US" sz="2000" spc="-1" strike="noStrike">
+              <a:rPr lang="en-US" sz="2000" b="0" strike="noStrike" spc="-1">
                 <a:solidFill>
                   <a:srgbClr val="404040"/>
                 </a:solidFill>
@@ -3662,15 +4209,9 @@
               </a:rPr>
               <a:t>Edit Master text styles</a:t>
             </a:r>
-            <a:endParaRPr b="0" lang="en-US" sz="2000" spc="-1" strike="noStrike">
-              <a:solidFill>
-                <a:srgbClr val="404040"/>
-              </a:solidFill>
-              <a:latin typeface="Calibri"/>
-            </a:endParaRPr>
-          </a:p>
-          <a:p>
-            <a:pPr lvl="1" marL="864000" indent="-324000">
+          </a:p>
+          <a:p>
+            <a:pPr marL="864000" lvl="1" indent="-324000">
               <a:lnSpc>
                 <a:spcPct val="90000"/>
               </a:lnSpc>
@@ -3688,7 +4229,7 @@
               <a:buChar char=""/>
             </a:pPr>
             <a:r>
-              <a:rPr b="0" lang="en-US" sz="1800" spc="-1" strike="noStrike">
+              <a:rPr lang="en-US" sz="1800" b="0" strike="noStrike" spc="-1">
                 <a:solidFill>
                   <a:srgbClr val="404040"/>
                 </a:solidFill>
@@ -3696,15 +4237,9 @@
               </a:rPr>
               <a:t>Second level</a:t>
             </a:r>
-            <a:endParaRPr b="0" lang="en-US" sz="1800" spc="-1" strike="noStrike">
-              <a:solidFill>
-                <a:srgbClr val="404040"/>
-              </a:solidFill>
-              <a:latin typeface="Calibri"/>
-            </a:endParaRPr>
-          </a:p>
-          <a:p>
-            <a:pPr lvl="2" marL="1296000" indent="-288000">
+          </a:p>
+          <a:p>
+            <a:pPr marL="1296000" lvl="2" indent="-288000">
               <a:lnSpc>
                 <a:spcPct val="90000"/>
               </a:lnSpc>
@@ -3722,7 +4257,7 @@
               <a:buChar char=""/>
             </a:pPr>
             <a:r>
-              <a:rPr b="0" lang="en-US" sz="1400" spc="-1" strike="noStrike">
+              <a:rPr lang="en-US" sz="1400" b="0" strike="noStrike" spc="-1">
                 <a:solidFill>
                   <a:srgbClr val="404040"/>
                 </a:solidFill>
@@ -3730,15 +4265,9 @@
               </a:rPr>
               <a:t>Third level</a:t>
             </a:r>
-            <a:endParaRPr b="0" lang="en-US" sz="1400" spc="-1" strike="noStrike">
-              <a:solidFill>
-                <a:srgbClr val="404040"/>
-              </a:solidFill>
-              <a:latin typeface="Calibri"/>
-            </a:endParaRPr>
-          </a:p>
-          <a:p>
-            <a:pPr lvl="3" marL="1728000" indent="-216000">
+          </a:p>
+          <a:p>
+            <a:pPr marL="1728000" lvl="3" indent="-216000">
               <a:lnSpc>
                 <a:spcPct val="90000"/>
               </a:lnSpc>
@@ -3756,7 +4285,7 @@
               <a:buChar char=""/>
             </a:pPr>
             <a:r>
-              <a:rPr b="0" lang="en-US" sz="1400" spc="-1" strike="noStrike">
+              <a:rPr lang="en-US" sz="1400" b="0" strike="noStrike" spc="-1">
                 <a:solidFill>
                   <a:srgbClr val="404040"/>
                 </a:solidFill>
@@ -3764,15 +4293,9 @@
               </a:rPr>
               <a:t>Fourth level</a:t>
             </a:r>
-            <a:endParaRPr b="0" lang="en-US" sz="1400" spc="-1" strike="noStrike">
-              <a:solidFill>
-                <a:srgbClr val="404040"/>
-              </a:solidFill>
-              <a:latin typeface="Calibri"/>
-            </a:endParaRPr>
-          </a:p>
-          <a:p>
-            <a:pPr lvl="4" marL="2160000" indent="-216000">
+          </a:p>
+          <a:p>
+            <a:pPr marL="2160000" lvl="4" indent="-216000">
               <a:lnSpc>
                 <a:spcPct val="90000"/>
               </a:lnSpc>
@@ -3790,7 +4313,7 @@
               <a:buChar char=""/>
             </a:pPr>
             <a:r>
-              <a:rPr b="0" lang="en-US" sz="1400" spc="-1" strike="noStrike">
+              <a:rPr lang="en-US" sz="1400" b="0" strike="noStrike" spc="-1">
                 <a:solidFill>
                   <a:srgbClr val="404040"/>
                 </a:solidFill>
@@ -3798,12 +4321,6 @@
               </a:rPr>
               <a:t>Fifth level</a:t>
             </a:r>
-            <a:endParaRPr b="0" lang="en-US" sz="1400" spc="-1" strike="noStrike">
-              <a:solidFill>
-                <a:srgbClr val="404040"/>
-              </a:solidFill>
-              <a:latin typeface="Calibri"/>
-            </a:endParaRPr>
           </a:p>
         </p:txBody>
       </p:sp>
@@ -3828,6 +4345,7 @@
         </p:spPr>
         <p:txBody>
           <a:bodyPr anchor="ctr"/>
+          <a:lstStyle/>
           <a:p>
             <a:pPr>
               <a:lnSpc>
@@ -3835,15 +4353,15 @@
               </a:lnSpc>
             </a:pPr>
             <a:fld id="{32A51531-3889-4374-9FD2-599B5751CB1E}" type="datetime">
-              <a:rPr b="0" lang="en-US" sz="900" spc="-1" strike="noStrike">
+              <a:rPr lang="en-US" sz="900" b="0" strike="noStrike" spc="-1">
                 <a:solidFill>
-                  <a:srgbClr val="ffffff"/>
+                  <a:srgbClr val="FFFFFF"/>
                 </a:solidFill>
                 <a:latin typeface="Calibri"/>
               </a:rPr>
               <a:t>2/7/19</a:t>
             </a:fld>
-            <a:endParaRPr b="0" lang="en-US" sz="900" spc="-1" strike="noStrike">
+            <a:endParaRPr lang="en-US" sz="900" b="0" strike="noStrike" spc="-1">
               <a:latin typeface="Times New Roman"/>
             </a:endParaRPr>
           </a:p>
@@ -3870,8 +4388,9 @@
         </p:spPr>
         <p:txBody>
           <a:bodyPr anchor="ctr"/>
-          <a:p>
-            <a:endParaRPr b="0" lang="en-US" sz="2400" spc="-1" strike="noStrike">
+          <a:lstStyle/>
+          <a:p>
+            <a:endParaRPr lang="en-US" sz="2400" b="0" strike="noStrike" spc="-1">
               <a:latin typeface="Times New Roman"/>
             </a:endParaRPr>
           </a:p>
@@ -3898,6 +4417,7 @@
         </p:spPr>
         <p:txBody>
           <a:bodyPr anchor="ctr"/>
+          <a:lstStyle/>
           <a:p>
             <a:pPr algn="r">
               <a:lnSpc>
@@ -3905,15 +4425,15 @@
               </a:lnSpc>
             </a:pPr>
             <a:fld id="{302516E7-315F-4AB9-91C6-DEF3DCCA21C6}" type="slidenum">
-              <a:rPr b="0" lang="en-US" sz="1050" spc="-1" strike="noStrike">
+              <a:rPr lang="en-US" sz="1050" b="0" strike="noStrike" spc="-1">
                 <a:solidFill>
-                  <a:srgbClr val="ffffff"/>
+                  <a:srgbClr val="FFFFFF"/>
                 </a:solidFill>
                 <a:latin typeface="Calibri"/>
               </a:rPr>
-              <a:t>1</a:t>
+              <a:t>‹#›</a:t>
             </a:fld>
-            <a:endParaRPr b="0" lang="en-US" sz="1050" spc="-1" strike="noStrike">
+            <a:endParaRPr lang="en-US" sz="1050" b="0" strike="noStrike" spc="-1">
               <a:latin typeface="Times New Roman"/>
             </a:endParaRPr>
           </a:p>
@@ -3921,26 +4441,306 @@
       </p:sp>
     </p:spTree>
   </p:cSld>
-  <p:clrMap bg1="lt1" bg2="lt2" tx1="dk1" tx2="dk2" accent1="accent1" accent2="accent2" accent3="accent3" accent4="accent4" accent5="accent5" accent6="accent6" hlink="hlink" folHlink="folHlink"/>
+  <p:clrMap bg1="lt1" tx1="dk1" bg2="lt2" tx2="dk2" accent1="accent1" accent2="accent2" accent3="accent3" accent4="accent4" accent5="accent5" accent6="accent6" hlink="hlink" folHlink="folHlink"/>
   <p:sldLayoutIdLst>
-    <p:sldLayoutId id="2147483662" r:id="rId2"/>
-    <p:sldLayoutId id="2147483663" r:id="rId3"/>
-    <p:sldLayoutId id="2147483664" r:id="rId4"/>
-    <p:sldLayoutId id="2147483665" r:id="rId5"/>
-    <p:sldLayoutId id="2147483666" r:id="rId6"/>
-    <p:sldLayoutId id="2147483667" r:id="rId7"/>
-    <p:sldLayoutId id="2147483668" r:id="rId8"/>
-    <p:sldLayoutId id="2147483669" r:id="rId9"/>
-    <p:sldLayoutId id="2147483670" r:id="rId10"/>
-    <p:sldLayoutId id="2147483671" r:id="rId11"/>
-    <p:sldLayoutId id="2147483672" r:id="rId12"/>
-    <p:sldLayoutId id="2147483673" r:id="rId13"/>
+    <p:sldLayoutId id="2147483662" r:id="rId1"/>
+    <p:sldLayoutId id="2147483663" r:id="rId2"/>
+    <p:sldLayoutId id="2147483664" r:id="rId3"/>
+    <p:sldLayoutId id="2147483665" r:id="rId4"/>
+    <p:sldLayoutId id="2147483666" r:id="rId5"/>
+    <p:sldLayoutId id="2147483667" r:id="rId6"/>
+    <p:sldLayoutId id="2147483668" r:id="rId7"/>
+    <p:sldLayoutId id="2147483669" r:id="rId8"/>
+    <p:sldLayoutId id="2147483670" r:id="rId9"/>
+    <p:sldLayoutId id="2147483671" r:id="rId10"/>
+    <p:sldLayoutId id="2147483672" r:id="rId11"/>
+    <p:sldLayoutId id="2147483673" r:id="rId12"/>
   </p:sldLayoutIdLst>
+  <p:txStyles>
+    <p:titleStyle>
+      <a:lvl1pPr algn="l" defTabSz="914400" rtl="0" eaLnBrk="1" latinLnBrk="0" hangingPunct="1">
+        <a:lnSpc>
+          <a:spcPct val="90000"/>
+        </a:lnSpc>
+        <a:spcBef>
+          <a:spcPct val="0"/>
+        </a:spcBef>
+        <a:buNone/>
+        <a:defRPr sz="4400" kern="1200">
+          <a:solidFill>
+            <a:schemeClr val="tx1"/>
+          </a:solidFill>
+          <a:latin typeface="+mj-lt"/>
+          <a:ea typeface="+mj-ea"/>
+          <a:cs typeface="+mj-cs"/>
+        </a:defRPr>
+      </a:lvl1pPr>
+    </p:titleStyle>
+    <p:bodyStyle>
+      <a:lvl1pPr marL="228600" indent="-228600" algn="l" defTabSz="914400" rtl="0" eaLnBrk="1" latinLnBrk="0" hangingPunct="1">
+        <a:lnSpc>
+          <a:spcPct val="90000"/>
+        </a:lnSpc>
+        <a:spcBef>
+          <a:spcPts val="1000"/>
+        </a:spcBef>
+        <a:buFont typeface="Arial" panose="020B0604020202020204" pitchFamily="34" charset="0"/>
+        <a:buChar char="•"/>
+        <a:defRPr sz="2800" kern="1200">
+          <a:solidFill>
+            <a:schemeClr val="tx1"/>
+          </a:solidFill>
+          <a:latin typeface="+mn-lt"/>
+          <a:ea typeface="+mn-ea"/>
+          <a:cs typeface="+mn-cs"/>
+        </a:defRPr>
+      </a:lvl1pPr>
+      <a:lvl2pPr marL="685800" indent="-228600" algn="l" defTabSz="914400" rtl="0" eaLnBrk="1" latinLnBrk="0" hangingPunct="1">
+        <a:lnSpc>
+          <a:spcPct val="90000"/>
+        </a:lnSpc>
+        <a:spcBef>
+          <a:spcPts val="500"/>
+        </a:spcBef>
+        <a:buFont typeface="Arial" panose="020B0604020202020204" pitchFamily="34" charset="0"/>
+        <a:buChar char="•"/>
+        <a:defRPr sz="2400" kern="1200">
+          <a:solidFill>
+            <a:schemeClr val="tx1"/>
+          </a:solidFill>
+          <a:latin typeface="+mn-lt"/>
+          <a:ea typeface="+mn-ea"/>
+          <a:cs typeface="+mn-cs"/>
+        </a:defRPr>
+      </a:lvl2pPr>
+      <a:lvl3pPr marL="1143000" indent="-228600" algn="l" defTabSz="914400" rtl="0" eaLnBrk="1" latinLnBrk="0" hangingPunct="1">
+        <a:lnSpc>
+          <a:spcPct val="90000"/>
+        </a:lnSpc>
+        <a:spcBef>
+          <a:spcPts val="500"/>
+        </a:spcBef>
+        <a:buFont typeface="Arial" panose="020B0604020202020204" pitchFamily="34" charset="0"/>
+        <a:buChar char="•"/>
+        <a:defRPr sz="2000" kern="1200">
+          <a:solidFill>
+            <a:schemeClr val="tx1"/>
+          </a:solidFill>
+          <a:latin typeface="+mn-lt"/>
+          <a:ea typeface="+mn-ea"/>
+          <a:cs typeface="+mn-cs"/>
+        </a:defRPr>
+      </a:lvl3pPr>
+      <a:lvl4pPr marL="1600200" indent="-228600" algn="l" defTabSz="914400" rtl="0" eaLnBrk="1" latinLnBrk="0" hangingPunct="1">
+        <a:lnSpc>
+          <a:spcPct val="90000"/>
+        </a:lnSpc>
+        <a:spcBef>
+          <a:spcPts val="500"/>
+        </a:spcBef>
+        <a:buFont typeface="Arial" panose="020B0604020202020204" pitchFamily="34" charset="0"/>
+        <a:buChar char="•"/>
+        <a:defRPr sz="1800" kern="1200">
+          <a:solidFill>
+            <a:schemeClr val="tx1"/>
+          </a:solidFill>
+          <a:latin typeface="+mn-lt"/>
+          <a:ea typeface="+mn-ea"/>
+          <a:cs typeface="+mn-cs"/>
+        </a:defRPr>
+      </a:lvl4pPr>
+      <a:lvl5pPr marL="2057400" indent="-228600" algn="l" defTabSz="914400" rtl="0" eaLnBrk="1" latinLnBrk="0" hangingPunct="1">
+        <a:lnSpc>
+          <a:spcPct val="90000"/>
+        </a:lnSpc>
+        <a:spcBef>
+          <a:spcPts val="500"/>
+        </a:spcBef>
+        <a:buFont typeface="Arial" panose="020B0604020202020204" pitchFamily="34" charset="0"/>
+        <a:buChar char="•"/>
+        <a:defRPr sz="1800" kern="1200">
+          <a:solidFill>
+            <a:schemeClr val="tx1"/>
+          </a:solidFill>
+          <a:latin typeface="+mn-lt"/>
+          <a:ea typeface="+mn-ea"/>
+          <a:cs typeface="+mn-cs"/>
+        </a:defRPr>
+      </a:lvl5pPr>
+      <a:lvl6pPr marL="2514600" indent="-228600" algn="l" defTabSz="914400" rtl="0" eaLnBrk="1" latinLnBrk="0" hangingPunct="1">
+        <a:lnSpc>
+          <a:spcPct val="90000"/>
+        </a:lnSpc>
+        <a:spcBef>
+          <a:spcPts val="500"/>
+        </a:spcBef>
+        <a:buFont typeface="Arial" panose="020B0604020202020204" pitchFamily="34" charset="0"/>
+        <a:buChar char="•"/>
+        <a:defRPr sz="1800" kern="1200">
+          <a:solidFill>
+            <a:schemeClr val="tx1"/>
+          </a:solidFill>
+          <a:latin typeface="+mn-lt"/>
+          <a:ea typeface="+mn-ea"/>
+          <a:cs typeface="+mn-cs"/>
+        </a:defRPr>
+      </a:lvl6pPr>
+      <a:lvl7pPr marL="2971800" indent="-228600" algn="l" defTabSz="914400" rtl="0" eaLnBrk="1" latinLnBrk="0" hangingPunct="1">
+        <a:lnSpc>
+          <a:spcPct val="90000"/>
+        </a:lnSpc>
+        <a:spcBef>
+          <a:spcPts val="500"/>
+        </a:spcBef>
+        <a:buFont typeface="Arial" panose="020B0604020202020204" pitchFamily="34" charset="0"/>
+        <a:buChar char="•"/>
+        <a:defRPr sz="1800" kern="1200">
+          <a:solidFill>
+            <a:schemeClr val="tx1"/>
+          </a:solidFill>
+          <a:latin typeface="+mn-lt"/>
+          <a:ea typeface="+mn-ea"/>
+          <a:cs typeface="+mn-cs"/>
+        </a:defRPr>
+      </a:lvl7pPr>
+      <a:lvl8pPr marL="3429000" indent="-228600" algn="l" defTabSz="914400" rtl="0" eaLnBrk="1" latinLnBrk="0" hangingPunct="1">
+        <a:lnSpc>
+          <a:spcPct val="90000"/>
+        </a:lnSpc>
+        <a:spcBef>
+          <a:spcPts val="500"/>
+        </a:spcBef>
+        <a:buFont typeface="Arial" panose="020B0604020202020204" pitchFamily="34" charset="0"/>
+        <a:buChar char="•"/>
+        <a:defRPr sz="1800" kern="1200">
+          <a:solidFill>
+            <a:schemeClr val="tx1"/>
+          </a:solidFill>
+          <a:latin typeface="+mn-lt"/>
+          <a:ea typeface="+mn-ea"/>
+          <a:cs typeface="+mn-cs"/>
+        </a:defRPr>
+      </a:lvl8pPr>
+      <a:lvl9pPr marL="3886200" indent="-228600" algn="l" defTabSz="914400" rtl="0" eaLnBrk="1" latinLnBrk="0" hangingPunct="1">
+        <a:lnSpc>
+          <a:spcPct val="90000"/>
+        </a:lnSpc>
+        <a:spcBef>
+          <a:spcPts val="500"/>
+        </a:spcBef>
+        <a:buFont typeface="Arial" panose="020B0604020202020204" pitchFamily="34" charset="0"/>
+        <a:buChar char="•"/>
+        <a:defRPr sz="1800" kern="1200">
+          <a:solidFill>
+            <a:schemeClr val="tx1"/>
+          </a:solidFill>
+          <a:latin typeface="+mn-lt"/>
+          <a:ea typeface="+mn-ea"/>
+          <a:cs typeface="+mn-cs"/>
+        </a:defRPr>
+      </a:lvl9pPr>
+    </p:bodyStyle>
+    <p:otherStyle>
+      <a:defPPr>
+        <a:defRPr lang="en-US"/>
+      </a:defPPr>
+      <a:lvl1pPr marL="0" algn="l" defTabSz="914400" rtl="0" eaLnBrk="1" latinLnBrk="0" hangingPunct="1">
+        <a:defRPr sz="1800" kern="1200">
+          <a:solidFill>
+            <a:schemeClr val="tx1"/>
+          </a:solidFill>
+          <a:latin typeface="+mn-lt"/>
+          <a:ea typeface="+mn-ea"/>
+          <a:cs typeface="+mn-cs"/>
+        </a:defRPr>
+      </a:lvl1pPr>
+      <a:lvl2pPr marL="457200" algn="l" defTabSz="914400" rtl="0" eaLnBrk="1" latinLnBrk="0" hangingPunct="1">
+        <a:defRPr sz="1800" kern="1200">
+          <a:solidFill>
+            <a:schemeClr val="tx1"/>
+          </a:solidFill>
+          <a:latin typeface="+mn-lt"/>
+          <a:ea typeface="+mn-ea"/>
+          <a:cs typeface="+mn-cs"/>
+        </a:defRPr>
+      </a:lvl2pPr>
+      <a:lvl3pPr marL="914400" algn="l" defTabSz="914400" rtl="0" eaLnBrk="1" latinLnBrk="0" hangingPunct="1">
+        <a:defRPr sz="1800" kern="1200">
+          <a:solidFill>
+            <a:schemeClr val="tx1"/>
+          </a:solidFill>
+          <a:latin typeface="+mn-lt"/>
+          <a:ea typeface="+mn-ea"/>
+          <a:cs typeface="+mn-cs"/>
+        </a:defRPr>
+      </a:lvl3pPr>
+      <a:lvl4pPr marL="1371600" algn="l" defTabSz="914400" rtl="0" eaLnBrk="1" latinLnBrk="0" hangingPunct="1">
+        <a:defRPr sz="1800" kern="1200">
+          <a:solidFill>
+            <a:schemeClr val="tx1"/>
+          </a:solidFill>
+          <a:latin typeface="+mn-lt"/>
+          <a:ea typeface="+mn-ea"/>
+          <a:cs typeface="+mn-cs"/>
+        </a:defRPr>
+      </a:lvl4pPr>
+      <a:lvl5pPr marL="1828800" algn="l" defTabSz="914400" rtl="0" eaLnBrk="1" latinLnBrk="0" hangingPunct="1">
+        <a:defRPr sz="1800" kern="1200">
+          <a:solidFill>
+            <a:schemeClr val="tx1"/>
+          </a:solidFill>
+          <a:latin typeface="+mn-lt"/>
+          <a:ea typeface="+mn-ea"/>
+          <a:cs typeface="+mn-cs"/>
+        </a:defRPr>
+      </a:lvl5pPr>
+      <a:lvl6pPr marL="2286000" algn="l" defTabSz="914400" rtl="0" eaLnBrk="1" latinLnBrk="0" hangingPunct="1">
+        <a:defRPr sz="1800" kern="1200">
+          <a:solidFill>
+            <a:schemeClr val="tx1"/>
+          </a:solidFill>
+          <a:latin typeface="+mn-lt"/>
+          <a:ea typeface="+mn-ea"/>
+          <a:cs typeface="+mn-cs"/>
+        </a:defRPr>
+      </a:lvl6pPr>
+      <a:lvl7pPr marL="2743200" algn="l" defTabSz="914400" rtl="0" eaLnBrk="1" latinLnBrk="0" hangingPunct="1">
+        <a:defRPr sz="1800" kern="1200">
+          <a:solidFill>
+            <a:schemeClr val="tx1"/>
+          </a:solidFill>
+          <a:latin typeface="+mn-lt"/>
+          <a:ea typeface="+mn-ea"/>
+          <a:cs typeface="+mn-cs"/>
+        </a:defRPr>
+      </a:lvl7pPr>
+      <a:lvl8pPr marL="3200400" algn="l" defTabSz="914400" rtl="0" eaLnBrk="1" latinLnBrk="0" hangingPunct="1">
+        <a:defRPr sz="1800" kern="1200">
+          <a:solidFill>
+            <a:schemeClr val="tx1"/>
+          </a:solidFill>
+          <a:latin typeface="+mn-lt"/>
+          <a:ea typeface="+mn-ea"/>
+          <a:cs typeface="+mn-cs"/>
+        </a:defRPr>
+      </a:lvl8pPr>
+      <a:lvl9pPr marL="3657600" algn="l" defTabSz="914400" rtl="0" eaLnBrk="1" latinLnBrk="0" hangingPunct="1">
+        <a:defRPr sz="1800" kern="1200">
+          <a:solidFill>
+            <a:schemeClr val="tx1"/>
+          </a:solidFill>
+          <a:latin typeface="+mn-lt"/>
+          <a:ea typeface="+mn-ea"/>
+          <a:cs typeface="+mn-cs"/>
+        </a:defRPr>
+      </a:lvl9pPr>
+    </p:otherStyle>
+  </p:txStyles>
 </p:sldMaster>
 </file>
 
 <file path=ppt/slides/slide1.xml><?xml version="1.0" encoding="utf-8"?>
-<p:sld xmlns:a="http://schemas.openxmlformats.org/drawingml/2006/main" xmlns:p="http://schemas.openxmlformats.org/presentationml/2006/main" xmlns:r="http://schemas.openxmlformats.org/officeDocument/2006/relationships" xmlns:p14="http://schemas.microsoft.com/office/powerpoint/2010/main" xmlns:p15="http://schemas.microsoft.com/office/powerpoint/2012/main" xmlns:mc="http://schemas.openxmlformats.org/markup-compatibility/2006">
+<p:sld xmlns:a="http://schemas.openxmlformats.org/drawingml/2006/main" xmlns:r="http://schemas.openxmlformats.org/officeDocument/2006/relationships" xmlns:p="http://schemas.openxmlformats.org/presentationml/2006/main">
   <p:cSld>
     <p:spTree>
       <p:nvGrpSpPr>
@@ -3977,6 +4777,7 @@
         </p:spPr>
         <p:txBody>
           <a:bodyPr anchor="b"/>
+          <a:lstStyle/>
           <a:p>
             <a:pPr>
               <a:lnSpc>
@@ -3984,7 +4785,7 @@
               </a:lnSpc>
             </a:pPr>
             <a:r>
-              <a:rPr b="0" lang="en-US" sz="8000" spc="-49" strike="noStrike">
+              <a:rPr lang="en-US" sz="8000" b="0" strike="noStrike" spc="-49">
                 <a:solidFill>
                   <a:srgbClr val="262626"/>
                 </a:solidFill>
@@ -3992,7 +4793,7 @@
               </a:rPr>
               <a:t>Debugger</a:t>
             </a:r>
-            <a:endParaRPr b="0" lang="en-US" sz="8000" spc="-1" strike="noStrike">
+            <a:endParaRPr lang="en-US" sz="8000" b="0" strike="noStrike" spc="-1">
               <a:solidFill>
                 <a:srgbClr val="000000"/>
               </a:solidFill>
@@ -4022,6 +4823,7 @@
         </p:spPr>
         <p:txBody>
           <a:bodyPr/>
+          <a:lstStyle/>
           <a:p>
             <a:pPr>
               <a:lnSpc>
@@ -4035,7 +4837,7 @@
               </a:spcAft>
             </a:pPr>
             <a:r>
-              <a:rPr b="0" lang="en-US" sz="2400" spc="199" strike="noStrike" cap="all">
+              <a:rPr lang="en-US" sz="2400" b="0" strike="noStrike" cap="all" spc="199">
                 <a:solidFill>
                   <a:srgbClr val="637052"/>
                 </a:solidFill>
@@ -4043,7 +4845,7 @@
               </a:rPr>
               <a:t>Banana Development Team</a:t>
             </a:r>
-            <a:endParaRPr b="0" lang="en-US" sz="2400" spc="-1" strike="noStrike">
+            <a:endParaRPr lang="en-US" sz="2400" b="0" strike="noStrike" spc="-1">
               <a:latin typeface="Arial"/>
             </a:endParaRPr>
           </a:p>
@@ -4051,13 +4853,13 @@
       </p:sp>
       <p:pic>
         <p:nvPicPr>
-          <p:cNvPr id="93" name="Picture 4" descr=""/>
+          <p:cNvPr id="93" name="Picture 4"/>
           <p:cNvPicPr/>
           <p:nvPr/>
         </p:nvPicPr>
         <p:blipFill>
-          <a:blip r:embed="rId1"/>
-          <a:srcRect l="0" t="0" r="0" b="4860"/>
+          <a:blip r:embed="rId2"/>
+          <a:srcRect b="4860"/>
           <a:stretch/>
         </p:blipFill>
         <p:spPr>
@@ -4075,6 +4877,9 @@
       </p:pic>
     </p:spTree>
   </p:cSld>
+  <p:clrMapOvr>
+    <a:masterClrMapping/>
+  </p:clrMapOvr>
   <p:timing>
     <p:tnLst>
       <p:par>
@@ -4083,14 +4888,14 @@
             <p:seq>
               <p:cTn id="2" dur="indefinite" nodeType="mainSeq"/>
               <p:prevCondLst>
-                <p:cond delay="0" evt="onPrev">
+                <p:cond evt="onPrev" delay="0">
                   <p:tgtEl>
                     <p:sldTgt/>
                   </p:tgtEl>
                 </p:cond>
               </p:prevCondLst>
               <p:nextCondLst>
-                <p:cond delay="0" evt="onNext">
+                <p:cond evt="onNext" delay="0">
                   <p:tgtEl>
                     <p:sldTgt/>
                   </p:tgtEl>
@@ -4105,8 +4910,8 @@
 </p:sld>
 </file>
 
-<file path=ppt/slides/slide2.xml><?xml version="1.0" encoding="utf-8"?>
-<p:sld xmlns:a="http://schemas.openxmlformats.org/drawingml/2006/main" xmlns:p="http://schemas.openxmlformats.org/presentationml/2006/main" xmlns:r="http://schemas.openxmlformats.org/officeDocument/2006/relationships" xmlns:p14="http://schemas.microsoft.com/office/powerpoint/2010/main" xmlns:p15="http://schemas.microsoft.com/office/powerpoint/2012/main" xmlns:mc="http://schemas.openxmlformats.org/markup-compatibility/2006">
+<file path=ppt/slides/slide10.xml><?xml version="1.0" encoding="utf-8"?>
+<p:sld xmlns:a="http://schemas.openxmlformats.org/drawingml/2006/main" xmlns:r="http://schemas.openxmlformats.org/officeDocument/2006/relationships" xmlns:p="http://schemas.openxmlformats.org/presentationml/2006/main">
   <p:cSld>
     <p:spTree>
       <p:nvGrpSpPr>
@@ -4124,6 +4929,478 @@
       </p:grpSpPr>
       <p:sp>
         <p:nvSpPr>
+          <p:cNvPr id="2" name="Title 1">
+            <a:extLst>
+              <a:ext uri="{FF2B5EF4-FFF2-40B4-BE49-F238E27FC236}">
+                <a16:creationId xmlns:a16="http://schemas.microsoft.com/office/drawing/2014/main" id="{8BC00AEA-865E-C14E-9CD8-6EB9C4BA555F}"/>
+              </a:ext>
+            </a:extLst>
+          </p:cNvPr>
+          <p:cNvSpPr>
+            <a:spLocks noGrp="1"/>
+          </p:cNvSpPr>
+          <p:nvPr>
+            <p:ph type="title"/>
+          </p:nvPr>
+        </p:nvSpPr>
+        <p:spPr/>
+        <p:txBody>
+          <a:bodyPr/>
+          <a:lstStyle/>
+          <a:p>
+            <a:pPr>
+              <a:lnSpc>
+                <a:spcPct val="85000"/>
+              </a:lnSpc>
+            </a:pPr>
+            <a:br>
+              <a:rPr lang="en-US" dirty="0"/>
+            </a:br>
+            <a:r>
+              <a:rPr lang="en-US" spc="-49" dirty="0">
+                <a:solidFill>
+                  <a:srgbClr val="404040"/>
+                </a:solidFill>
+                <a:latin typeface="Calibri Light"/>
+                <a:ea typeface="Microsoft YaHei"/>
+              </a:rPr>
+              <a:t>Blakely – Sound</a:t>
+            </a:r>
+            <a:endParaRPr lang="en-US" spc="-1" dirty="0">
+              <a:solidFill>
+                <a:srgbClr val="000000"/>
+              </a:solidFill>
+              <a:latin typeface="Calibri"/>
+            </a:endParaRPr>
+          </a:p>
+        </p:txBody>
+      </p:sp>
+      <p:sp>
+        <p:nvSpPr>
+          <p:cNvPr id="3" name="Subtitle 2">
+            <a:extLst>
+              <a:ext uri="{FF2B5EF4-FFF2-40B4-BE49-F238E27FC236}">
+                <a16:creationId xmlns:a16="http://schemas.microsoft.com/office/drawing/2014/main" id="{B6F5B555-79F2-CC4D-A948-A48520149849}"/>
+              </a:ext>
+            </a:extLst>
+          </p:cNvPr>
+          <p:cNvSpPr>
+            <a:spLocks noGrp="1"/>
+          </p:cNvSpPr>
+          <p:nvPr>
+            <p:ph type="subTitle"/>
+          </p:nvPr>
+        </p:nvSpPr>
+        <p:spPr>
+          <a:xfrm>
+            <a:off x="1097280" y="2121142"/>
+            <a:ext cx="10058040" cy="4023000"/>
+          </a:xfrm>
+        </p:spPr>
+        <p:txBody>
+          <a:bodyPr/>
+          <a:lstStyle/>
+          <a:p>
+            <a:pPr marL="91440" indent="-91080">
+              <a:spcBef>
+                <a:spcPts val="1199"/>
+              </a:spcBef>
+              <a:spcAft>
+                <a:spcPts val="201"/>
+              </a:spcAft>
+              <a:buClr>
+                <a:srgbClr val="E48312"/>
+              </a:buClr>
+              <a:buFont typeface="Arial"/>
+              <a:buChar char="•"/>
+            </a:pPr>
+            <a:r>
+              <a:rPr lang="en-US" sz="2200" spc="-1" dirty="0">
+                <a:solidFill>
+                  <a:srgbClr val="404040"/>
+                </a:solidFill>
+                <a:latin typeface="Calibri"/>
+              </a:rPr>
+              <a:t>Creating Sounds for levels and sound effects</a:t>
+            </a:r>
+          </a:p>
+          <a:p>
+            <a:pPr marL="91440" indent="-91080">
+              <a:spcBef>
+                <a:spcPts val="1199"/>
+              </a:spcBef>
+              <a:spcAft>
+                <a:spcPts val="201"/>
+              </a:spcAft>
+              <a:buClr>
+                <a:srgbClr val="E48312"/>
+              </a:buClr>
+              <a:buFont typeface="Arial"/>
+              <a:buChar char="•"/>
+            </a:pPr>
+            <a:r>
+              <a:rPr lang="en-US" sz="2200" spc="-1" dirty="0">
+                <a:solidFill>
+                  <a:srgbClr val="404040"/>
+                </a:solidFill>
+                <a:latin typeface="Calibri"/>
+              </a:rPr>
+              <a:t>Coordinate with Luis on player sound effects</a:t>
+            </a:r>
+          </a:p>
+          <a:p>
+            <a:pPr marL="91440" indent="-91080">
+              <a:spcBef>
+                <a:spcPts val="1199"/>
+              </a:spcBef>
+              <a:spcAft>
+                <a:spcPts val="201"/>
+              </a:spcAft>
+              <a:buClr>
+                <a:srgbClr val="E48312"/>
+              </a:buClr>
+              <a:buFont typeface="Arial"/>
+              <a:buChar char="•"/>
+            </a:pPr>
+            <a:r>
+              <a:rPr lang="en-US" sz="2200" spc="-1" dirty="0">
+                <a:solidFill>
+                  <a:srgbClr val="404040"/>
+                </a:solidFill>
+                <a:latin typeface="Calibri"/>
+              </a:rPr>
+              <a:t>Coordinate with Ben on enemy sound effects</a:t>
+            </a:r>
+          </a:p>
+          <a:p>
+            <a:pPr marL="91440" indent="-91080">
+              <a:spcBef>
+                <a:spcPts val="1199"/>
+              </a:spcBef>
+              <a:spcAft>
+                <a:spcPts val="201"/>
+              </a:spcAft>
+              <a:buClr>
+                <a:srgbClr val="E48312"/>
+              </a:buClr>
+              <a:buFont typeface="Arial"/>
+              <a:buChar char="•"/>
+            </a:pPr>
+            <a:r>
+              <a:rPr lang="en-US" sz="2200" spc="-1" dirty="0">
+                <a:solidFill>
+                  <a:srgbClr val="404040"/>
+                </a:solidFill>
+                <a:latin typeface="Calibri"/>
+              </a:rPr>
+              <a:t>Provide seamless timing between character trigger and sound effect</a:t>
+            </a:r>
+          </a:p>
+          <a:p>
+            <a:pPr marL="91440" indent="-91080">
+              <a:spcBef>
+                <a:spcPts val="1199"/>
+              </a:spcBef>
+              <a:spcAft>
+                <a:spcPts val="201"/>
+              </a:spcAft>
+              <a:buClr>
+                <a:srgbClr val="E48312"/>
+              </a:buClr>
+              <a:buFont typeface="Arial"/>
+              <a:buChar char="•"/>
+            </a:pPr>
+            <a:endParaRPr lang="en-US" sz="2200" spc="-1" dirty="0">
+              <a:solidFill>
+                <a:srgbClr val="404040"/>
+              </a:solidFill>
+              <a:latin typeface="Calibri"/>
+            </a:endParaRPr>
+          </a:p>
+          <a:p>
+            <a:pPr>
+              <a:spcBef>
+                <a:spcPts val="1199"/>
+              </a:spcBef>
+              <a:spcAft>
+                <a:spcPts val="201"/>
+              </a:spcAft>
+            </a:pPr>
+            <a:endParaRPr lang="en-US" sz="2200" spc="-1" dirty="0">
+              <a:solidFill>
+                <a:srgbClr val="404040"/>
+              </a:solidFill>
+              <a:latin typeface="Calibri"/>
+            </a:endParaRPr>
+          </a:p>
+          <a:p>
+            <a:pPr marL="91440" indent="-91080">
+              <a:spcBef>
+                <a:spcPts val="1199"/>
+              </a:spcBef>
+              <a:spcAft>
+                <a:spcPts val="201"/>
+              </a:spcAft>
+              <a:buClr>
+                <a:srgbClr val="E48312"/>
+              </a:buClr>
+              <a:buFont typeface="Arial"/>
+              <a:buChar char="•"/>
+            </a:pPr>
+            <a:r>
+              <a:rPr lang="en-US" sz="2200" spc="-1" dirty="0">
+                <a:solidFill>
+                  <a:srgbClr val="404040"/>
+                </a:solidFill>
+                <a:latin typeface="Calibri"/>
+              </a:rPr>
+              <a:t>Priority level: 3 </a:t>
+            </a:r>
+          </a:p>
+          <a:p>
+            <a:pPr marL="91440" indent="-91080">
+              <a:spcBef>
+                <a:spcPts val="1199"/>
+              </a:spcBef>
+              <a:spcAft>
+                <a:spcPts val="201"/>
+              </a:spcAft>
+              <a:buClr>
+                <a:srgbClr val="E48312"/>
+              </a:buClr>
+              <a:buFont typeface="Arial"/>
+              <a:buChar char="•"/>
+            </a:pPr>
+            <a:r>
+              <a:rPr lang="en-US" sz="2200" spc="-1" dirty="0">
+                <a:solidFill>
+                  <a:srgbClr val="404040"/>
+                </a:solidFill>
+                <a:latin typeface="Calibri"/>
+              </a:rPr>
+              <a:t>Complexity: Moderate</a:t>
+            </a:r>
+          </a:p>
+          <a:p>
+            <a:endParaRPr lang="en-US" sz="2200" dirty="0"/>
+          </a:p>
+        </p:txBody>
+      </p:sp>
+      <p:pic>
+        <p:nvPicPr>
+          <p:cNvPr id="4" name="Picture 4">
+            <a:extLst>
+              <a:ext uri="{FF2B5EF4-FFF2-40B4-BE49-F238E27FC236}">
+                <a16:creationId xmlns:a16="http://schemas.microsoft.com/office/drawing/2014/main" id="{EA58EC98-79CA-DB42-8BC7-054B9A458915}"/>
+              </a:ext>
+            </a:extLst>
+          </p:cNvPr>
+          <p:cNvPicPr/>
+          <p:nvPr/>
+        </p:nvPicPr>
+        <p:blipFill>
+          <a:blip r:embed="rId2"/>
+          <a:srcRect b="4860"/>
+          <a:stretch/>
+        </p:blipFill>
+        <p:spPr>
+          <a:xfrm>
+            <a:off x="10667880" y="274320"/>
+            <a:ext cx="1165680" cy="1261440"/>
+          </a:xfrm>
+          <a:prstGeom prst="rect">
+            <a:avLst/>
+          </a:prstGeom>
+          <a:ln>
+            <a:noFill/>
+          </a:ln>
+        </p:spPr>
+      </p:pic>
+    </p:spTree>
+    <p:extLst>
+      <p:ext uri="{BB962C8B-B14F-4D97-AF65-F5344CB8AC3E}">
+        <p14:creationId xmlns:p14="http://schemas.microsoft.com/office/powerpoint/2010/main" val="3961414226"/>
+      </p:ext>
+    </p:extLst>
+  </p:cSld>
+  <p:clrMapOvr>
+    <a:masterClrMapping/>
+  </p:clrMapOvr>
+</p:sld>
+</file>
+
+<file path=ppt/slides/slide11.xml><?xml version="1.0" encoding="utf-8"?>
+<p:sld xmlns:a="http://schemas.openxmlformats.org/drawingml/2006/main" xmlns:r="http://schemas.openxmlformats.org/officeDocument/2006/relationships" xmlns:p="http://schemas.openxmlformats.org/presentationml/2006/main">
+  <p:cSld>
+    <p:spTree>
+      <p:nvGrpSpPr>
+        <p:cNvPr id="1" name=""/>
+        <p:cNvGrpSpPr/>
+        <p:nvPr/>
+      </p:nvGrpSpPr>
+      <p:grpSpPr>
+        <a:xfrm>
+          <a:off x="0" y="0"/>
+          <a:ext cx="0" cy="0"/>
+          <a:chOff x="0" y="0"/>
+          <a:chExt cx="0" cy="0"/>
+        </a:xfrm>
+      </p:grpSpPr>
+      <p:sp>
+        <p:nvSpPr>
+          <p:cNvPr id="2" name="Title 1">
+            <a:extLst>
+              <a:ext uri="{FF2B5EF4-FFF2-40B4-BE49-F238E27FC236}">
+                <a16:creationId xmlns:a16="http://schemas.microsoft.com/office/drawing/2014/main" id="{45D7FC06-148E-9147-9DFC-BBCC67B37521}"/>
+              </a:ext>
+            </a:extLst>
+          </p:cNvPr>
+          <p:cNvSpPr>
+            <a:spLocks noGrp="1"/>
+          </p:cNvSpPr>
+          <p:nvPr>
+            <p:ph type="title"/>
+          </p:nvPr>
+        </p:nvSpPr>
+        <p:spPr/>
+        <p:txBody>
+          <a:bodyPr/>
+          <a:lstStyle/>
+          <a:p>
+            <a:br>
+              <a:rPr lang="en-US" spc="-49" dirty="0">
+                <a:solidFill>
+                  <a:srgbClr val="404040"/>
+                </a:solidFill>
+                <a:latin typeface="Calibri Light"/>
+              </a:rPr>
+            </a:br>
+            <a:br>
+              <a:rPr lang="en-US" spc="-49" dirty="0">
+                <a:solidFill>
+                  <a:srgbClr val="404040"/>
+                </a:solidFill>
+                <a:latin typeface="Calibri Light"/>
+              </a:rPr>
+            </a:br>
+            <a:r>
+              <a:rPr lang="en-US" spc="-49" dirty="0">
+                <a:solidFill>
+                  <a:srgbClr val="404040"/>
+                </a:solidFill>
+                <a:latin typeface="Calibri Light"/>
+              </a:rPr>
+              <a:t>Sound Design – Use Case Diagram</a:t>
+            </a:r>
+            <a:br>
+              <a:rPr lang="en-US" spc="-1" dirty="0">
+                <a:solidFill>
+                  <a:srgbClr val="000000"/>
+                </a:solidFill>
+                <a:latin typeface="Calibri"/>
+              </a:rPr>
+            </a:br>
+            <a:endParaRPr lang="en-US" dirty="0"/>
+          </a:p>
+        </p:txBody>
+      </p:sp>
+      <p:pic>
+        <p:nvPicPr>
+          <p:cNvPr id="4" name="Picture 4">
+            <a:extLst>
+              <a:ext uri="{FF2B5EF4-FFF2-40B4-BE49-F238E27FC236}">
+                <a16:creationId xmlns:a16="http://schemas.microsoft.com/office/drawing/2014/main" id="{DF33A693-C63A-1940-ADCD-BC2628B6DF8F}"/>
+              </a:ext>
+            </a:extLst>
+          </p:cNvPr>
+          <p:cNvPicPr/>
+          <p:nvPr/>
+        </p:nvPicPr>
+        <p:blipFill>
+          <a:blip r:embed="rId2"/>
+          <a:srcRect b="4860"/>
+          <a:stretch/>
+        </p:blipFill>
+        <p:spPr>
+          <a:xfrm>
+            <a:off x="10667880" y="274320"/>
+            <a:ext cx="1165680" cy="1261440"/>
+          </a:xfrm>
+          <a:prstGeom prst="rect">
+            <a:avLst/>
+          </a:prstGeom>
+          <a:ln>
+            <a:noFill/>
+          </a:ln>
+        </p:spPr>
+      </p:pic>
+      <p:pic>
+        <p:nvPicPr>
+          <p:cNvPr id="6" name="Picture 5">
+            <a:extLst>
+              <a:ext uri="{FF2B5EF4-FFF2-40B4-BE49-F238E27FC236}">
+                <a16:creationId xmlns:a16="http://schemas.microsoft.com/office/drawing/2014/main" id="{BC22EB14-979A-C848-8F42-4B71A7442111}"/>
+              </a:ext>
+            </a:extLst>
+          </p:cNvPr>
+          <p:cNvPicPr>
+            <a:picLocks noChangeAspect="1"/>
+          </p:cNvPicPr>
+          <p:nvPr/>
+        </p:nvPicPr>
+        <p:blipFill rotWithShape="1">
+          <a:blip r:embed="rId3">
+            <a:extLst>
+              <a:ext uri="{28A0092B-C50C-407E-A947-70E740481C1C}">
+                <a14:useLocalDpi xmlns:a14="http://schemas.microsoft.com/office/drawing/2010/main" val="0"/>
+              </a:ext>
+            </a:extLst>
+          </a:blip>
+          <a:srcRect t="4714" b="4408"/>
+          <a:stretch/>
+        </p:blipFill>
+        <p:spPr>
+          <a:xfrm>
+            <a:off x="2485081" y="1905917"/>
+            <a:ext cx="4576731" cy="4318613"/>
+          </a:xfrm>
+          <a:prstGeom prst="rect">
+            <a:avLst/>
+          </a:prstGeom>
+        </p:spPr>
+      </p:pic>
+    </p:spTree>
+    <p:extLst>
+      <p:ext uri="{BB962C8B-B14F-4D97-AF65-F5344CB8AC3E}">
+        <p14:creationId xmlns:p14="http://schemas.microsoft.com/office/powerpoint/2010/main" val="1036464391"/>
+      </p:ext>
+    </p:extLst>
+  </p:cSld>
+  <p:clrMapOvr>
+    <a:masterClrMapping/>
+  </p:clrMapOvr>
+</p:sld>
+</file>
+
+<file path=ppt/slides/slide2.xml><?xml version="1.0" encoding="utf-8"?>
+<p:sld xmlns:a="http://schemas.openxmlformats.org/drawingml/2006/main" xmlns:r="http://schemas.openxmlformats.org/officeDocument/2006/relationships" xmlns:p="http://schemas.openxmlformats.org/presentationml/2006/main">
+  <p:cSld>
+    <p:spTree>
+      <p:nvGrpSpPr>
+        <p:cNvPr id="1" name=""/>
+        <p:cNvGrpSpPr/>
+        <p:nvPr/>
+      </p:nvGrpSpPr>
+      <p:grpSpPr>
+        <a:xfrm>
+          <a:off x="0" y="0"/>
+          <a:ext cx="0" cy="0"/>
+          <a:chOff x="0" y="0"/>
+          <a:chExt cx="0" cy="0"/>
+        </a:xfrm>
+      </p:grpSpPr>
+      <p:sp>
+        <p:nvSpPr>
           <p:cNvPr id="94" name="TextShape 1"/>
           <p:cNvSpPr txBox="1"/>
           <p:nvPr/>
@@ -4143,8 +5420,9 @@
         </p:spPr>
         <p:txBody>
           <a:bodyPr anchor="b"/>
-          <a:p>
-            <a:endParaRPr b="0" lang="en-US" sz="1800" spc="-1" strike="noStrike">
+          <a:lstStyle/>
+          <a:p>
+            <a:endParaRPr lang="en-US" sz="1800" b="0" strike="noStrike" spc="-1">
               <a:solidFill>
                 <a:srgbClr val="000000"/>
               </a:solidFill>
@@ -4174,8 +5452,9 @@
         </p:spPr>
         <p:txBody>
           <a:bodyPr lIns="0" rIns="0"/>
-          <a:p>
-            <a:endParaRPr b="0" lang="en-US" sz="2000" spc="-1" strike="noStrike">
+          <a:lstStyle/>
+          <a:p>
+            <a:endParaRPr lang="en-US" sz="2000" b="0" strike="noStrike" spc="-1">
               <a:solidFill>
                 <a:srgbClr val="404040"/>
               </a:solidFill>
@@ -4186,13 +5465,13 @@
       </p:sp>
       <p:pic>
         <p:nvPicPr>
-          <p:cNvPr id="96" name="Picture 3" descr=""/>
+          <p:cNvPr id="96" name="Picture 3"/>
           <p:cNvPicPr/>
           <p:nvPr/>
         </p:nvPicPr>
         <p:blipFill>
-          <a:blip r:embed="rId1"/>
-          <a:srcRect l="0" t="0" r="0" b="4860"/>
+          <a:blip r:embed="rId2"/>
+          <a:srcRect b="4860"/>
           <a:stretch/>
         </p:blipFill>
         <p:spPr>
@@ -4210,22 +5489,25 @@
       </p:pic>
     </p:spTree>
   </p:cSld>
+  <p:clrMapOvr>
+    <a:masterClrMapping/>
+  </p:clrMapOvr>
   <p:timing>
     <p:tnLst>
       <p:par>
-        <p:cTn id="3" dur="indefinite" restart="never" nodeType="tmRoot">
+        <p:cTn id="1" dur="indefinite" restart="never" nodeType="tmRoot">
           <p:childTnLst>
             <p:seq>
-              <p:cTn id="4" dur="indefinite" nodeType="mainSeq"/>
+              <p:cTn id="2" dur="indefinite" nodeType="mainSeq"/>
               <p:prevCondLst>
-                <p:cond delay="0" evt="onPrev">
+                <p:cond evt="onPrev" delay="0">
                   <p:tgtEl>
                     <p:sldTgt/>
                   </p:tgtEl>
                 </p:cond>
               </p:prevCondLst>
               <p:nextCondLst>
-                <p:cond delay="0" evt="onNext">
+                <p:cond evt="onNext" delay="0">
                   <p:tgtEl>
                     <p:sldTgt/>
                   </p:tgtEl>
@@ -4241,7 +5523,7 @@
 </file>
 
 <file path=ppt/slides/slide3.xml><?xml version="1.0" encoding="utf-8"?>
-<p:sld xmlns:a="http://schemas.openxmlformats.org/drawingml/2006/main" xmlns:p="http://schemas.openxmlformats.org/presentationml/2006/main" xmlns:r="http://schemas.openxmlformats.org/officeDocument/2006/relationships" xmlns:p14="http://schemas.microsoft.com/office/powerpoint/2010/main" xmlns:p15="http://schemas.microsoft.com/office/powerpoint/2012/main" xmlns:mc="http://schemas.openxmlformats.org/markup-compatibility/2006">
+<p:sld xmlns:a="http://schemas.openxmlformats.org/drawingml/2006/main" xmlns:r="http://schemas.openxmlformats.org/officeDocument/2006/relationships" xmlns:p="http://schemas.openxmlformats.org/presentationml/2006/main">
   <p:cSld>
     <p:spTree>
       <p:nvGrpSpPr>
@@ -4278,8 +5560,9 @@
         </p:spPr>
         <p:txBody>
           <a:bodyPr anchor="b"/>
-          <a:p>
-            <a:endParaRPr b="0" lang="en-US" sz="1800" spc="-1" strike="noStrike">
+          <a:lstStyle/>
+          <a:p>
+            <a:endParaRPr lang="en-US" sz="1800" b="0" strike="noStrike" spc="-1">
               <a:solidFill>
                 <a:srgbClr val="000000"/>
               </a:solidFill>
@@ -4309,8 +5592,9 @@
         </p:spPr>
         <p:txBody>
           <a:bodyPr lIns="0" rIns="0"/>
-          <a:p>
-            <a:endParaRPr b="0" lang="en-US" sz="2000" spc="-1" strike="noStrike">
+          <a:lstStyle/>
+          <a:p>
+            <a:endParaRPr lang="en-US" sz="2000" b="0" strike="noStrike" spc="-1">
               <a:solidFill>
                 <a:srgbClr val="404040"/>
               </a:solidFill>
@@ -4321,13 +5605,13 @@
       </p:sp>
       <p:pic>
         <p:nvPicPr>
-          <p:cNvPr id="99" name="Picture 3" descr=""/>
+          <p:cNvPr id="99" name="Picture 3"/>
           <p:cNvPicPr/>
           <p:nvPr/>
         </p:nvPicPr>
         <p:blipFill>
-          <a:blip r:embed="rId1"/>
-          <a:srcRect l="0" t="0" r="0" b="4860"/>
+          <a:blip r:embed="rId2"/>
+          <a:srcRect b="4860"/>
           <a:stretch/>
         </p:blipFill>
         <p:spPr>
@@ -4345,22 +5629,25 @@
       </p:pic>
     </p:spTree>
   </p:cSld>
+  <p:clrMapOvr>
+    <a:masterClrMapping/>
+  </p:clrMapOvr>
   <p:timing>
     <p:tnLst>
       <p:par>
-        <p:cTn id="5" dur="indefinite" restart="never" nodeType="tmRoot">
+        <p:cTn id="1" dur="indefinite" restart="never" nodeType="tmRoot">
           <p:childTnLst>
             <p:seq>
-              <p:cTn id="6" dur="indefinite" nodeType="mainSeq"/>
+              <p:cTn id="2" dur="indefinite" nodeType="mainSeq"/>
               <p:prevCondLst>
-                <p:cond delay="0" evt="onPrev">
+                <p:cond evt="onPrev" delay="0">
                   <p:tgtEl>
                     <p:sldTgt/>
                   </p:tgtEl>
                 </p:cond>
               </p:prevCondLst>
               <p:nextCondLst>
-                <p:cond delay="0" evt="onNext">
+                <p:cond evt="onNext" delay="0">
                   <p:tgtEl>
                     <p:sldTgt/>
                   </p:tgtEl>
@@ -4376,7 +5663,7 @@
 </file>
 
 <file path=ppt/slides/slide4.xml><?xml version="1.0" encoding="utf-8"?>
-<p:sld xmlns:a="http://schemas.openxmlformats.org/drawingml/2006/main" xmlns:p="http://schemas.openxmlformats.org/presentationml/2006/main" xmlns:r="http://schemas.openxmlformats.org/officeDocument/2006/relationships" xmlns:p14="http://schemas.microsoft.com/office/powerpoint/2010/main" xmlns:p15="http://schemas.microsoft.com/office/powerpoint/2012/main" xmlns:mc="http://schemas.openxmlformats.org/markup-compatibility/2006">
+<p:sld xmlns:a="http://schemas.openxmlformats.org/drawingml/2006/main" xmlns:r="http://schemas.openxmlformats.org/officeDocument/2006/relationships" xmlns:p="http://schemas.openxmlformats.org/presentationml/2006/main">
   <p:cSld>
     <p:spTree>
       <p:nvGrpSpPr>
@@ -4413,6 +5700,7 @@
         </p:spPr>
         <p:txBody>
           <a:bodyPr anchor="b"/>
+          <a:lstStyle/>
           <a:p>
             <a:pPr>
               <a:lnSpc>
@@ -4420,7 +5708,7 @@
               </a:lnSpc>
             </a:pPr>
             <a:r>
-              <a:rPr b="0" lang="en-US" sz="4800" spc="-49" strike="noStrike">
+              <a:rPr lang="en-US" sz="4800" b="0" strike="noStrike" spc="-49">
                 <a:solidFill>
                   <a:srgbClr val="404040"/>
                 </a:solidFill>
@@ -4428,7 +5716,7 @@
               </a:rPr>
               <a:t>Josh – Level Design</a:t>
             </a:r>
-            <a:endParaRPr b="0" lang="en-US" sz="4800" spc="-1" strike="noStrike">
+            <a:endParaRPr lang="en-US" sz="4800" b="0" strike="noStrike" spc="-1">
               <a:solidFill>
                 <a:srgbClr val="000000"/>
               </a:solidFill>
@@ -4460,6 +5748,7 @@
           <a:bodyPr lIns="0" rIns="0">
             <a:normAutofit/>
           </a:bodyPr>
+          <a:lstStyle/>
           <a:p>
             <a:pPr marL="91440" indent="-91080">
               <a:lnSpc>
@@ -4472,13 +5761,13 @@
                 <a:spcPts val="201"/>
               </a:spcAft>
               <a:buClr>
-                <a:srgbClr val="e48312"/>
+                <a:srgbClr val="E48312"/>
               </a:buClr>
               <a:buFont typeface="Arial"/>
               <a:buChar char="•"/>
             </a:pPr>
             <a:r>
-              <a:rPr b="0" lang="en-US" sz="2400" spc="-1" strike="noStrike">
+              <a:rPr lang="en-US" sz="2400" b="0" strike="noStrike" spc="-1">
                 <a:solidFill>
                   <a:srgbClr val="404040"/>
                 </a:solidFill>
@@ -4486,12 +5775,6 @@
               </a:rPr>
               <a:t>Creating graphics of stage and objects</a:t>
             </a:r>
-            <a:endParaRPr b="0" lang="en-US" sz="2400" spc="-1" strike="noStrike">
-              <a:solidFill>
-                <a:srgbClr val="404040"/>
-              </a:solidFill>
-              <a:latin typeface="Calibri"/>
-            </a:endParaRPr>
           </a:p>
           <a:p>
             <a:pPr marL="91440" indent="-91080">
@@ -4505,13 +5788,13 @@
                 <a:spcPts val="201"/>
               </a:spcAft>
               <a:buClr>
-                <a:srgbClr val="e48312"/>
+                <a:srgbClr val="E48312"/>
               </a:buClr>
               <a:buFont typeface="Arial"/>
               <a:buChar char="•"/>
             </a:pPr>
             <a:r>
-              <a:rPr b="0" lang="en-US" sz="2400" spc="-1" strike="noStrike">
+              <a:rPr lang="en-US" sz="2400" b="0" strike="noStrike" spc="-1">
                 <a:solidFill>
                   <a:srgbClr val="404040"/>
                 </a:solidFill>
@@ -4519,12 +5802,6 @@
               </a:rPr>
               <a:t>Coordinate with Luis for player character</a:t>
             </a:r>
-            <a:endParaRPr b="0" lang="en-US" sz="2400" spc="-1" strike="noStrike">
-              <a:solidFill>
-                <a:srgbClr val="404040"/>
-              </a:solidFill>
-              <a:latin typeface="Calibri"/>
-            </a:endParaRPr>
           </a:p>
           <a:p>
             <a:pPr marL="91440" indent="-91080">
@@ -4538,13 +5815,13 @@
                 <a:spcPts val="201"/>
               </a:spcAft>
               <a:buClr>
-                <a:srgbClr val="e48312"/>
+                <a:srgbClr val="E48312"/>
               </a:buClr>
               <a:buFont typeface="Arial"/>
               <a:buChar char="•"/>
             </a:pPr>
             <a:r>
-              <a:rPr b="0" lang="en-US" sz="2400" spc="-1" strike="noStrike">
+              <a:rPr lang="en-US" sz="2400" b="0" strike="noStrike" spc="-1">
                 <a:solidFill>
                   <a:srgbClr val="404040"/>
                 </a:solidFill>
@@ -4552,12 +5829,6 @@
               </a:rPr>
               <a:t>Coordinate with Ben for enemy spawn</a:t>
             </a:r>
-            <a:endParaRPr b="0" lang="en-US" sz="2400" spc="-1" strike="noStrike">
-              <a:solidFill>
-                <a:srgbClr val="404040"/>
-              </a:solidFill>
-              <a:latin typeface="Calibri"/>
-            </a:endParaRPr>
           </a:p>
           <a:p>
             <a:pPr marL="91440" indent="-91080">
@@ -4571,13 +5842,13 @@
                 <a:spcPts val="201"/>
               </a:spcAft>
               <a:buClr>
-                <a:srgbClr val="e48312"/>
+                <a:srgbClr val="E48312"/>
               </a:buClr>
               <a:buFont typeface="Arial"/>
               <a:buChar char="•"/>
             </a:pPr>
             <a:r>
-              <a:rPr b="0" lang="en-US" sz="2400" spc="-1" strike="noStrike">
+              <a:rPr lang="en-US" sz="2400" b="0" strike="noStrike" spc="-1">
                 <a:solidFill>
                   <a:srgbClr val="404040"/>
                 </a:solidFill>
@@ -4585,12 +5856,6 @@
               </a:rPr>
               <a:t>Ensuring all objects interact as intended</a:t>
             </a:r>
-            <a:endParaRPr b="0" lang="en-US" sz="2400" spc="-1" strike="noStrike">
-              <a:solidFill>
-                <a:srgbClr val="404040"/>
-              </a:solidFill>
-              <a:latin typeface="Calibri"/>
-            </a:endParaRPr>
           </a:p>
           <a:p>
             <a:pPr>
@@ -4604,7 +5869,7 @@
                 <a:spcPts val="201"/>
               </a:spcAft>
             </a:pPr>
-            <a:endParaRPr b="0" lang="en-US" sz="2400" spc="-1" strike="noStrike">
+            <a:endParaRPr lang="en-US" sz="2400" b="0" strike="noStrike" spc="-1">
               <a:solidFill>
                 <a:srgbClr val="404040"/>
               </a:solidFill>
@@ -4623,7 +5888,7 @@
                 <a:spcPts val="201"/>
               </a:spcAft>
             </a:pPr>
-            <a:endParaRPr b="0" lang="en-US" sz="2400" spc="-1" strike="noStrike">
+            <a:endParaRPr lang="en-US" sz="2400" b="0" strike="noStrike" spc="-1">
               <a:solidFill>
                 <a:srgbClr val="404040"/>
               </a:solidFill>
@@ -4642,13 +5907,13 @@
                 <a:spcPts val="201"/>
               </a:spcAft>
               <a:buClr>
-                <a:srgbClr val="e48312"/>
+                <a:srgbClr val="E48312"/>
               </a:buClr>
               <a:buFont typeface="Arial"/>
               <a:buChar char="•"/>
             </a:pPr>
             <a:r>
-              <a:rPr b="0" lang="en-US" sz="2400" spc="-1" strike="noStrike">
+              <a:rPr lang="en-US" sz="2400" b="0" strike="noStrike" spc="-1">
                 <a:solidFill>
                   <a:srgbClr val="404040"/>
                 </a:solidFill>
@@ -4656,12 +5921,6 @@
               </a:rPr>
               <a:t>Priority level: 1 </a:t>
             </a:r>
-            <a:endParaRPr b="0" lang="en-US" sz="2400" spc="-1" strike="noStrike">
-              <a:solidFill>
-                <a:srgbClr val="404040"/>
-              </a:solidFill>
-              <a:latin typeface="Calibri"/>
-            </a:endParaRPr>
           </a:p>
           <a:p>
             <a:pPr marL="91440" indent="-91080">
@@ -4675,13 +5934,13 @@
                 <a:spcPts val="201"/>
               </a:spcAft>
               <a:buClr>
-                <a:srgbClr val="e48312"/>
+                <a:srgbClr val="E48312"/>
               </a:buClr>
               <a:buFont typeface="Arial"/>
               <a:buChar char="•"/>
             </a:pPr>
             <a:r>
-              <a:rPr b="0" lang="en-US" sz="2400" spc="-1" strike="noStrike">
+              <a:rPr lang="en-US" sz="2400" b="0" strike="noStrike" spc="-1">
                 <a:solidFill>
                   <a:srgbClr val="404040"/>
                 </a:solidFill>
@@ -4689,24 +5948,18 @@
               </a:rPr>
               <a:t>Complexity: Moderate</a:t>
             </a:r>
-            <a:endParaRPr b="0" lang="en-US" sz="2400" spc="-1" strike="noStrike">
-              <a:solidFill>
-                <a:srgbClr val="404040"/>
-              </a:solidFill>
-              <a:latin typeface="Calibri"/>
-            </a:endParaRPr>
           </a:p>
         </p:txBody>
       </p:sp>
       <p:pic>
         <p:nvPicPr>
-          <p:cNvPr id="102" name="Picture 3" descr=""/>
+          <p:cNvPr id="102" name="Picture 3"/>
           <p:cNvPicPr/>
           <p:nvPr/>
         </p:nvPicPr>
         <p:blipFill>
-          <a:blip r:embed="rId1"/>
-          <a:srcRect l="0" t="0" r="0" b="4860"/>
+          <a:blip r:embed="rId2"/>
+          <a:srcRect b="4860"/>
           <a:stretch/>
         </p:blipFill>
         <p:spPr>
@@ -4724,22 +5977,25 @@
       </p:pic>
     </p:spTree>
   </p:cSld>
+  <p:clrMapOvr>
+    <a:masterClrMapping/>
+  </p:clrMapOvr>
   <p:timing>
     <p:tnLst>
       <p:par>
-        <p:cTn id="7" dur="indefinite" restart="never" nodeType="tmRoot">
+        <p:cTn id="1" dur="indefinite" restart="never" nodeType="tmRoot">
           <p:childTnLst>
             <p:seq>
-              <p:cTn id="8" dur="indefinite" nodeType="mainSeq"/>
+              <p:cTn id="2" dur="indefinite" nodeType="mainSeq"/>
               <p:prevCondLst>
-                <p:cond delay="0" evt="onPrev">
+                <p:cond evt="onPrev" delay="0">
                   <p:tgtEl>
                     <p:sldTgt/>
                   </p:tgtEl>
                 </p:cond>
               </p:prevCondLst>
               <p:nextCondLst>
-                <p:cond delay="0" evt="onNext">
+                <p:cond evt="onNext" delay="0">
                   <p:tgtEl>
                     <p:sldTgt/>
                   </p:tgtEl>
@@ -4755,7 +6011,7 @@
 </file>
 
 <file path=ppt/slides/slide5.xml><?xml version="1.0" encoding="utf-8"?>
-<p:sld xmlns:a="http://schemas.openxmlformats.org/drawingml/2006/main" xmlns:p="http://schemas.openxmlformats.org/presentationml/2006/main" xmlns:r="http://schemas.openxmlformats.org/officeDocument/2006/relationships" xmlns:p14="http://schemas.microsoft.com/office/powerpoint/2010/main" xmlns:p15="http://schemas.microsoft.com/office/powerpoint/2012/main" xmlns:mc="http://schemas.openxmlformats.org/markup-compatibility/2006">
+<p:sld xmlns:a="http://schemas.openxmlformats.org/drawingml/2006/main" xmlns:r="http://schemas.openxmlformats.org/officeDocument/2006/relationships" xmlns:p="http://schemas.openxmlformats.org/presentationml/2006/main">
   <p:cSld>
     <p:spTree>
       <p:nvGrpSpPr>
@@ -4792,6 +6048,7 @@
         </p:spPr>
         <p:txBody>
           <a:bodyPr anchor="b"/>
+          <a:lstStyle/>
           <a:p>
             <a:pPr>
               <a:lnSpc>
@@ -4799,7 +6056,7 @@
               </a:lnSpc>
             </a:pPr>
             <a:r>
-              <a:rPr b="0" lang="en-US" sz="4800" spc="-49" strike="noStrike">
+              <a:rPr lang="en-US" sz="4800" b="0" strike="noStrike" spc="-49" dirty="0">
                 <a:solidFill>
                   <a:srgbClr val="404040"/>
                 </a:solidFill>
@@ -4807,7 +6064,7 @@
               </a:rPr>
               <a:t>Level Design – Use Case Diagram</a:t>
             </a:r>
-            <a:endParaRPr b="0" lang="en-US" sz="4800" spc="-1" strike="noStrike">
+            <a:endParaRPr lang="en-US" sz="4800" b="0" strike="noStrike" spc="-1" dirty="0">
               <a:solidFill>
                 <a:srgbClr val="000000"/>
               </a:solidFill>
@@ -4818,42 +6075,18 @@
       </p:sp>
       <p:pic>
         <p:nvPicPr>
-          <p:cNvPr id="104" name="Content Placeholder 3" descr=""/>
-          <p:cNvPicPr/>
-          <p:nvPr/>
-        </p:nvPicPr>
-        <p:blipFill>
-          <a:blip r:embed="rId1"/>
-          <a:stretch/>
-        </p:blipFill>
-        <p:spPr>
-          <a:xfrm>
-            <a:off x="2045520" y="1830240"/>
-            <a:ext cx="7729560" cy="4498200"/>
-          </a:xfrm>
-          <a:prstGeom prst="rect">
-            <a:avLst/>
-          </a:prstGeom>
-          <a:ln>
-            <a:noFill/>
-          </a:ln>
-        </p:spPr>
-      </p:pic>
-      <p:pic>
-        <p:nvPicPr>
-          <p:cNvPr id="105" name="Picture 4" descr=""/>
+          <p:cNvPr id="104" name="Content Placeholder 3"/>
           <p:cNvPicPr/>
           <p:nvPr/>
         </p:nvPicPr>
         <p:blipFill>
           <a:blip r:embed="rId2"/>
-          <a:srcRect l="0" t="0" r="0" b="4860"/>
           <a:stretch/>
         </p:blipFill>
         <p:spPr>
           <a:xfrm>
-            <a:off x="10667880" y="274320"/>
-            <a:ext cx="1165680" cy="1261440"/>
+            <a:off x="2045520" y="1830240"/>
+            <a:ext cx="7729560" cy="4498200"/>
           </a:xfrm>
           <a:prstGeom prst="rect">
             <a:avLst/>
@@ -4863,24 +6096,51 @@
           </a:ln>
         </p:spPr>
       </p:pic>
+      <p:pic>
+        <p:nvPicPr>
+          <p:cNvPr id="105" name="Picture 4"/>
+          <p:cNvPicPr/>
+          <p:nvPr/>
+        </p:nvPicPr>
+        <p:blipFill>
+          <a:blip r:embed="rId3"/>
+          <a:srcRect b="4860"/>
+          <a:stretch/>
+        </p:blipFill>
+        <p:spPr>
+          <a:xfrm>
+            <a:off x="10667880" y="274320"/>
+            <a:ext cx="1165680" cy="1261440"/>
+          </a:xfrm>
+          <a:prstGeom prst="rect">
+            <a:avLst/>
+          </a:prstGeom>
+          <a:ln>
+            <a:noFill/>
+          </a:ln>
+        </p:spPr>
+      </p:pic>
     </p:spTree>
   </p:cSld>
+  <p:clrMapOvr>
+    <a:masterClrMapping/>
+  </p:clrMapOvr>
   <p:timing>
     <p:tnLst>
       <p:par>
-        <p:cTn id="9" dur="indefinite" restart="never" nodeType="tmRoot">
+        <p:cTn id="1" dur="indefinite" restart="never" nodeType="tmRoot">
           <p:childTnLst>
             <p:seq>
-              <p:cTn id="10" dur="indefinite" nodeType="mainSeq"/>
+              <p:cTn id="2" dur="indefinite" nodeType="mainSeq"/>
               <p:prevCondLst>
-                <p:cond delay="0" evt="onPrev">
+                <p:cond evt="onPrev" delay="0">
                   <p:tgtEl>
                     <p:sldTgt/>
                   </p:tgtEl>
                 </p:cond>
               </p:prevCondLst>
               <p:nextCondLst>
-                <p:cond delay="0" evt="onNext">
+                <p:cond evt="onNext" delay="0">
                   <p:tgtEl>
                     <p:sldTgt/>
                   </p:tgtEl>
@@ -4896,7 +6156,7 @@
 </file>
 
 <file path=ppt/slides/slide6.xml><?xml version="1.0" encoding="utf-8"?>
-<p:sld xmlns:a="http://schemas.openxmlformats.org/drawingml/2006/main" xmlns:p="http://schemas.openxmlformats.org/presentationml/2006/main" xmlns:r="http://schemas.openxmlformats.org/officeDocument/2006/relationships" xmlns:p14="http://schemas.microsoft.com/office/powerpoint/2010/main" xmlns:p15="http://schemas.microsoft.com/office/powerpoint/2012/main" xmlns:mc="http://schemas.openxmlformats.org/markup-compatibility/2006">
+<p:sld xmlns:a="http://schemas.openxmlformats.org/drawingml/2006/main" xmlns:r="http://schemas.openxmlformats.org/officeDocument/2006/relationships" xmlns:p="http://schemas.openxmlformats.org/presentationml/2006/main">
   <p:cSld>
     <p:spTree>
       <p:nvGrpSpPr>
@@ -4932,9 +6192,10 @@
           </a:ln>
         </p:spPr>
         <p:txBody>
-          <a:bodyPr lIns="0" rIns="0" tIns="0" bIns="0" anchor="ctr"/>
-          <a:p>
-            <a:endParaRPr b="0" lang="en-US" sz="1800" spc="-1" strike="noStrike">
+          <a:bodyPr lIns="0" tIns="0" rIns="0" bIns="0" anchor="ctr"/>
+          <a:lstStyle/>
+          <a:p>
+            <a:endParaRPr lang="en-US" sz="1800" b="0" strike="noStrike" spc="-1">
               <a:solidFill>
                 <a:srgbClr val="000000"/>
               </a:solidFill>
@@ -4945,13 +6206,13 @@
       </p:sp>
       <p:pic>
         <p:nvPicPr>
-          <p:cNvPr id="107" name="Picture 4" descr=""/>
+          <p:cNvPr id="107" name="Picture 4"/>
           <p:cNvPicPr/>
           <p:nvPr/>
         </p:nvPicPr>
         <p:blipFill>
-          <a:blip r:embed="rId1"/>
-          <a:srcRect l="0" t="0" r="0" b="4860"/>
+          <a:blip r:embed="rId2"/>
+          <a:srcRect b="4860"/>
           <a:stretch/>
         </p:blipFill>
         <p:spPr>
@@ -4969,22 +6230,25 @@
       </p:pic>
     </p:spTree>
   </p:cSld>
+  <p:clrMapOvr>
+    <a:masterClrMapping/>
+  </p:clrMapOvr>
   <p:timing>
     <p:tnLst>
       <p:par>
-        <p:cTn id="11" dur="indefinite" restart="never" nodeType="tmRoot">
+        <p:cTn id="1" dur="indefinite" restart="never" nodeType="tmRoot">
           <p:childTnLst>
             <p:seq>
-              <p:cTn id="12" dur="indefinite" nodeType="mainSeq"/>
+              <p:cTn id="2" dur="indefinite" nodeType="mainSeq"/>
               <p:prevCondLst>
-                <p:cond delay="0" evt="onPrev">
+                <p:cond evt="onPrev" delay="0">
                   <p:tgtEl>
                     <p:sldTgt/>
                   </p:tgtEl>
                 </p:cond>
               </p:prevCondLst>
               <p:nextCondLst>
-                <p:cond delay="0" evt="onNext">
+                <p:cond evt="onNext" delay="0">
                   <p:tgtEl>
                     <p:sldTgt/>
                   </p:tgtEl>
@@ -5000,7 +6264,7 @@
 </file>
 
 <file path=ppt/slides/slide7.xml><?xml version="1.0" encoding="utf-8"?>
-<p:sld xmlns:a="http://schemas.openxmlformats.org/drawingml/2006/main" xmlns:p="http://schemas.openxmlformats.org/presentationml/2006/main" xmlns:r="http://schemas.openxmlformats.org/officeDocument/2006/relationships" xmlns:p14="http://schemas.microsoft.com/office/powerpoint/2010/main" xmlns:p15="http://schemas.microsoft.com/office/powerpoint/2012/main" xmlns:mc="http://schemas.openxmlformats.org/markup-compatibility/2006">
+<p:sld xmlns:a="http://schemas.openxmlformats.org/drawingml/2006/main" xmlns:r="http://schemas.openxmlformats.org/officeDocument/2006/relationships" xmlns:p="http://schemas.openxmlformats.org/presentationml/2006/main">
   <p:cSld>
     <p:spTree>
       <p:nvGrpSpPr>
@@ -5036,9 +6300,10 @@
           </a:ln>
         </p:spPr>
         <p:txBody>
-          <a:bodyPr lIns="0" rIns="0" tIns="0" bIns="0" anchor="ctr"/>
-          <a:p>
-            <a:endParaRPr b="0" lang="en-US" sz="1800" spc="-1" strike="noStrike">
+          <a:bodyPr lIns="0" tIns="0" rIns="0" bIns="0" anchor="ctr"/>
+          <a:lstStyle/>
+          <a:p>
+            <a:endParaRPr lang="en-US" sz="1800" b="0" strike="noStrike" spc="-1">
               <a:solidFill>
                 <a:srgbClr val="000000"/>
               </a:solidFill>
@@ -5049,13 +6314,13 @@
       </p:sp>
       <p:pic>
         <p:nvPicPr>
-          <p:cNvPr id="109" name="Picture 4" descr=""/>
+          <p:cNvPr id="109" name="Picture 4"/>
           <p:cNvPicPr/>
           <p:nvPr/>
         </p:nvPicPr>
         <p:blipFill>
-          <a:blip r:embed="rId1"/>
-          <a:srcRect l="0" t="0" r="0" b="4860"/>
+          <a:blip r:embed="rId2"/>
+          <a:srcRect b="4860"/>
           <a:stretch/>
         </p:blipFill>
         <p:spPr>
@@ -5073,22 +6338,25 @@
       </p:pic>
     </p:spTree>
   </p:cSld>
+  <p:clrMapOvr>
+    <a:masterClrMapping/>
+  </p:clrMapOvr>
   <p:timing>
     <p:tnLst>
       <p:par>
-        <p:cTn id="13" dur="indefinite" restart="never" nodeType="tmRoot">
+        <p:cTn id="1" dur="indefinite" restart="never" nodeType="tmRoot">
           <p:childTnLst>
             <p:seq>
-              <p:cTn id="14" dur="indefinite" nodeType="mainSeq"/>
+              <p:cTn id="2" dur="indefinite" nodeType="mainSeq"/>
               <p:prevCondLst>
-                <p:cond delay="0" evt="onPrev">
+                <p:cond evt="onPrev" delay="0">
                   <p:tgtEl>
                     <p:sldTgt/>
                   </p:tgtEl>
                 </p:cond>
               </p:prevCondLst>
               <p:nextCondLst>
-                <p:cond delay="0" evt="onNext">
+                <p:cond evt="onNext" delay="0">
                   <p:tgtEl>
                     <p:sldTgt/>
                   </p:tgtEl>
@@ -5104,7 +6372,7 @@
 </file>
 
 <file path=ppt/slides/slide8.xml><?xml version="1.0" encoding="utf-8"?>
-<p:sld xmlns:a="http://schemas.openxmlformats.org/drawingml/2006/main" xmlns:p="http://schemas.openxmlformats.org/presentationml/2006/main" xmlns:r="http://schemas.openxmlformats.org/officeDocument/2006/relationships" xmlns:p14="http://schemas.microsoft.com/office/powerpoint/2010/main" xmlns:p15="http://schemas.microsoft.com/office/powerpoint/2012/main" xmlns:mc="http://schemas.openxmlformats.org/markup-compatibility/2006">
+<p:sld xmlns:a="http://schemas.openxmlformats.org/drawingml/2006/main" xmlns:r="http://schemas.openxmlformats.org/officeDocument/2006/relationships" xmlns:p="http://schemas.openxmlformats.org/presentationml/2006/main">
   <p:cSld>
     <p:spTree>
       <p:nvGrpSpPr>
@@ -5140,16 +6408,19 @@
           </a:ln>
         </p:spPr>
         <p:txBody>
-          <a:bodyPr lIns="0" rIns="0" tIns="0" bIns="0"/>
+          <a:bodyPr lIns="0" tIns="0" rIns="0" bIns="0"/>
+          <a:lstStyle/>
           <a:p>
             <a:pPr>
               <a:lnSpc>
                 <a:spcPct val="85000"/>
               </a:lnSpc>
             </a:pPr>
-            <a:br/>
+            <a:br>
+              <a:rPr dirty="0"/>
+            </a:br>
             <a:r>
-              <a:rPr b="0" lang="en-US" sz="4800" spc="-49" strike="noStrike">
+              <a:rPr lang="en-US" sz="4800" b="0" strike="noStrike" spc="-49" dirty="0">
                 <a:solidFill>
                   <a:srgbClr val="404040"/>
                 </a:solidFill>
@@ -5158,7 +6429,7 @@
               </a:rPr>
               <a:t>Ben – Enemies</a:t>
             </a:r>
-            <a:endParaRPr b="0" lang="en-US" sz="4800" spc="-1" strike="noStrike">
+            <a:endParaRPr lang="en-US" sz="4800" b="0" strike="noStrike" spc="-1" dirty="0">
               <a:solidFill>
                 <a:srgbClr val="000000"/>
               </a:solidFill>
@@ -5169,13 +6440,13 @@
       </p:sp>
       <p:pic>
         <p:nvPicPr>
-          <p:cNvPr id="111" name="Picture 4" descr=""/>
+          <p:cNvPr id="111" name="Picture 4"/>
           <p:cNvPicPr/>
           <p:nvPr/>
         </p:nvPicPr>
         <p:blipFill>
-          <a:blip r:embed="rId1"/>
-          <a:srcRect l="0" t="0" r="0" b="4860"/>
+          <a:blip r:embed="rId2"/>
+          <a:srcRect b="4860"/>
           <a:stretch/>
         </p:blipFill>
         <p:spPr>
@@ -5212,8 +6483,9 @@
         </p:spPr>
         <p:txBody>
           <a:bodyPr lIns="0" rIns="0">
-            <a:normAutofit/>
+            <a:normAutofit fontScale="92500" lnSpcReduction="10000"/>
           </a:bodyPr>
+          <a:lstStyle/>
           <a:p>
             <a:pPr marL="91440" indent="-91080">
               <a:lnSpc>
@@ -5226,13 +6498,13 @@
                 <a:spcPts val="201"/>
               </a:spcAft>
               <a:buClr>
-                <a:srgbClr val="e48312"/>
+                <a:srgbClr val="E48312"/>
               </a:buClr>
               <a:buFont typeface="Arial"/>
               <a:buChar char="•"/>
             </a:pPr>
             <a:r>
-              <a:rPr b="0" lang="en-US" sz="2400" spc="-1" strike="noStrike">
+              <a:rPr lang="en-US" sz="2400" b="0" strike="noStrike" spc="-1" dirty="0">
                 <a:solidFill>
                   <a:srgbClr val="404040"/>
                 </a:solidFill>
@@ -5240,12 +6512,6 @@
               </a:rPr>
               <a:t>Creating Enemies and releasing them into the playing field</a:t>
             </a:r>
-            <a:endParaRPr b="0" lang="en-US" sz="2400" spc="-1" strike="noStrike">
-              <a:solidFill>
-                <a:srgbClr val="404040"/>
-              </a:solidFill>
-              <a:latin typeface="Calibri"/>
-            </a:endParaRPr>
           </a:p>
           <a:p>
             <a:pPr marL="91440" indent="-91080">
@@ -5259,13 +6525,13 @@
                 <a:spcPts val="201"/>
               </a:spcAft>
               <a:buClr>
-                <a:srgbClr val="e48312"/>
+                <a:srgbClr val="E48312"/>
               </a:buClr>
               <a:buFont typeface="Arial"/>
               <a:buChar char="•"/>
             </a:pPr>
             <a:r>
-              <a:rPr b="0" lang="en-US" sz="2400" spc="-1" strike="noStrike">
+              <a:rPr lang="en-US" sz="2400" b="0" strike="noStrike" spc="-1" dirty="0">
                 <a:solidFill>
                   <a:srgbClr val="404040"/>
                 </a:solidFill>
@@ -5273,12 +6539,6 @@
               </a:rPr>
               <a:t>Coordinating with Josh on when to spawn enemies</a:t>
             </a:r>
-            <a:endParaRPr b="0" lang="en-US" sz="2400" spc="-1" strike="noStrike">
-              <a:solidFill>
-                <a:srgbClr val="404040"/>
-              </a:solidFill>
-              <a:latin typeface="Calibri"/>
-            </a:endParaRPr>
           </a:p>
           <a:p>
             <a:pPr marL="91440" indent="-91080">
@@ -5292,13 +6552,13 @@
                 <a:spcPts val="201"/>
               </a:spcAft>
               <a:buClr>
-                <a:srgbClr val="e48312"/>
+                <a:srgbClr val="E48312"/>
               </a:buClr>
               <a:buFont typeface="Arial"/>
               <a:buChar char="•"/>
             </a:pPr>
             <a:r>
-              <a:rPr b="0" lang="en-US" sz="2400" spc="-1" strike="noStrike">
+              <a:rPr lang="en-US" sz="2400" b="0" strike="noStrike" spc="-1" dirty="0">
                 <a:solidFill>
                   <a:srgbClr val="404040"/>
                 </a:solidFill>
@@ -5306,12 +6566,6 @@
               </a:rPr>
               <a:t>Making sure enemies advance and attack automatically</a:t>
             </a:r>
-            <a:endParaRPr b="0" lang="en-US" sz="2400" spc="-1" strike="noStrike">
-              <a:solidFill>
-                <a:srgbClr val="404040"/>
-              </a:solidFill>
-              <a:latin typeface="Calibri"/>
-            </a:endParaRPr>
           </a:p>
           <a:p>
             <a:pPr marL="91440" indent="-91080">
@@ -5325,13 +6579,13 @@
                 <a:spcPts val="201"/>
               </a:spcAft>
               <a:buClr>
-                <a:srgbClr val="e48312"/>
+                <a:srgbClr val="E48312"/>
               </a:buClr>
               <a:buFont typeface="Arial"/>
               <a:buChar char="•"/>
             </a:pPr>
             <a:r>
-              <a:rPr b="0" lang="en-US" sz="2400" spc="-1" strike="noStrike">
+              <a:rPr lang="en-US" sz="2400" b="0" strike="noStrike" spc="-1" dirty="0">
                 <a:solidFill>
                   <a:srgbClr val="404040"/>
                 </a:solidFill>
@@ -5339,12 +6593,6 @@
               </a:rPr>
               <a:t>Making sure enemies can navigate around obstacles</a:t>
             </a:r>
-            <a:endParaRPr b="0" lang="en-US" sz="2400" spc="-1" strike="noStrike">
-              <a:solidFill>
-                <a:srgbClr val="404040"/>
-              </a:solidFill>
-              <a:latin typeface="Calibri"/>
-            </a:endParaRPr>
           </a:p>
           <a:p>
             <a:pPr marL="91440" indent="-91080">
@@ -5358,13 +6606,13 @@
                 <a:spcPts val="201"/>
               </a:spcAft>
               <a:buClr>
-                <a:srgbClr val="e48312"/>
+                <a:srgbClr val="E48312"/>
               </a:buClr>
               <a:buFont typeface="Arial"/>
               <a:buChar char="•"/>
             </a:pPr>
             <a:r>
-              <a:rPr b="0" lang="en-US" sz="2400" spc="-1" strike="noStrike">
+              <a:rPr lang="en-US" sz="2400" b="0" strike="noStrike" spc="-1" dirty="0">
                 <a:solidFill>
                   <a:srgbClr val="404040"/>
                 </a:solidFill>
@@ -5372,12 +6620,6 @@
               </a:rPr>
               <a:t>Coordinating with Luis on interactions between enemies and the player character</a:t>
             </a:r>
-            <a:endParaRPr b="0" lang="en-US" sz="2400" spc="-1" strike="noStrike">
-              <a:solidFill>
-                <a:srgbClr val="404040"/>
-              </a:solidFill>
-              <a:latin typeface="Calibri"/>
-            </a:endParaRPr>
           </a:p>
           <a:p>
             <a:pPr>
@@ -5391,7 +6633,7 @@
                 <a:spcPts val="201"/>
               </a:spcAft>
             </a:pPr>
-            <a:endParaRPr b="0" lang="en-US" sz="2400" spc="-1" strike="noStrike">
+            <a:endParaRPr lang="en-US" sz="2400" b="0" strike="noStrike" spc="-1" dirty="0">
               <a:solidFill>
                 <a:srgbClr val="404040"/>
               </a:solidFill>
@@ -5410,7 +6652,7 @@
                 <a:spcPts val="201"/>
               </a:spcAft>
             </a:pPr>
-            <a:endParaRPr b="0" lang="en-US" sz="2400" spc="-1" strike="noStrike">
+            <a:endParaRPr lang="en-US" sz="2400" b="0" strike="noStrike" spc="-1" dirty="0">
               <a:solidFill>
                 <a:srgbClr val="404040"/>
               </a:solidFill>
@@ -5429,13 +6671,13 @@
                 <a:spcPts val="201"/>
               </a:spcAft>
               <a:buClr>
-                <a:srgbClr val="e48312"/>
+                <a:srgbClr val="E48312"/>
               </a:buClr>
               <a:buFont typeface="Arial"/>
               <a:buChar char="•"/>
             </a:pPr>
             <a:r>
-              <a:rPr b="0" lang="en-US" sz="2400" spc="-1" strike="noStrike">
+              <a:rPr lang="en-US" sz="2400" b="0" strike="noStrike" spc="-1" dirty="0">
                 <a:solidFill>
                   <a:srgbClr val="404040"/>
                 </a:solidFill>
@@ -5443,12 +6685,6 @@
               </a:rPr>
               <a:t>Priority level: 3 </a:t>
             </a:r>
-            <a:endParaRPr b="0" lang="en-US" sz="2400" spc="-1" strike="noStrike">
-              <a:solidFill>
-                <a:srgbClr val="404040"/>
-              </a:solidFill>
-              <a:latin typeface="Calibri"/>
-            </a:endParaRPr>
           </a:p>
           <a:p>
             <a:pPr marL="91440" indent="-91080">
@@ -5462,13 +6698,13 @@
                 <a:spcPts val="201"/>
               </a:spcAft>
               <a:buClr>
-                <a:srgbClr val="e48312"/>
+                <a:srgbClr val="E48312"/>
               </a:buClr>
               <a:buFont typeface="Arial"/>
               <a:buChar char="•"/>
             </a:pPr>
             <a:r>
-              <a:rPr b="0" lang="en-US" sz="2400" spc="-1" strike="noStrike">
+              <a:rPr lang="en-US" sz="2400" b="0" strike="noStrike" spc="-1" dirty="0">
                 <a:solidFill>
                   <a:srgbClr val="404040"/>
                 </a:solidFill>
@@ -5476,33 +6712,30 @@
               </a:rPr>
               <a:t>Complexity: Moderate</a:t>
             </a:r>
-            <a:endParaRPr b="0" lang="en-US" sz="2400" spc="-1" strike="noStrike">
-              <a:solidFill>
-                <a:srgbClr val="404040"/>
-              </a:solidFill>
-              <a:latin typeface="Calibri"/>
-            </a:endParaRPr>
           </a:p>
         </p:txBody>
       </p:sp>
     </p:spTree>
   </p:cSld>
+  <p:clrMapOvr>
+    <a:masterClrMapping/>
+  </p:clrMapOvr>
   <p:timing>
     <p:tnLst>
       <p:par>
-        <p:cTn id="15" dur="indefinite" restart="never" nodeType="tmRoot">
+        <p:cTn id="1" dur="indefinite" restart="never" nodeType="tmRoot">
           <p:childTnLst>
             <p:seq>
-              <p:cTn id="16" dur="indefinite" nodeType="mainSeq"/>
+              <p:cTn id="2" dur="indefinite" nodeType="mainSeq"/>
               <p:prevCondLst>
-                <p:cond delay="0" evt="onPrev">
+                <p:cond evt="onPrev" delay="0">
                   <p:tgtEl>
                     <p:sldTgt/>
                   </p:tgtEl>
                 </p:cond>
               </p:prevCondLst>
               <p:nextCondLst>
-                <p:cond delay="0" evt="onNext">
+                <p:cond evt="onNext" delay="0">
                   <p:tgtEl>
                     <p:sldTgt/>
                   </p:tgtEl>
@@ -5518,7 +6751,7 @@
 </file>
 
 <file path=ppt/slides/slide9.xml><?xml version="1.0" encoding="utf-8"?>
-<p:sld xmlns:a="http://schemas.openxmlformats.org/drawingml/2006/main" xmlns:p="http://schemas.openxmlformats.org/presentationml/2006/main" xmlns:r="http://schemas.openxmlformats.org/officeDocument/2006/relationships" xmlns:p14="http://schemas.microsoft.com/office/powerpoint/2010/main" xmlns:p15="http://schemas.microsoft.com/office/powerpoint/2012/main" xmlns:mc="http://schemas.openxmlformats.org/markup-compatibility/2006">
+<p:sld xmlns:a="http://schemas.openxmlformats.org/drawingml/2006/main" xmlns:r="http://schemas.openxmlformats.org/officeDocument/2006/relationships" xmlns:p="http://schemas.openxmlformats.org/presentationml/2006/main">
   <p:cSld>
     <p:spTree>
       <p:nvGrpSpPr>
@@ -5554,9 +6787,10 @@
           </a:ln>
         </p:spPr>
         <p:txBody>
-          <a:bodyPr lIns="0" rIns="0" tIns="0" bIns="0" anchor="ctr"/>
-          <a:p>
-            <a:endParaRPr b="0" lang="en-US" sz="1800" spc="-1" strike="noStrike">
+          <a:bodyPr lIns="0" tIns="0" rIns="0" bIns="0" anchor="ctr"/>
+          <a:lstStyle/>
+          <a:p>
+            <a:endParaRPr lang="en-US" sz="1800" b="0" strike="noStrike" spc="-1">
               <a:solidFill>
                 <a:srgbClr val="000000"/>
               </a:solidFill>
@@ -5567,13 +6801,13 @@
       </p:sp>
       <p:pic>
         <p:nvPicPr>
-          <p:cNvPr id="114" name="Picture 4" descr=""/>
+          <p:cNvPr id="114" name="Picture 4"/>
           <p:cNvPicPr/>
           <p:nvPr/>
         </p:nvPicPr>
         <p:blipFill>
-          <a:blip r:embed="rId1"/>
-          <a:srcRect l="0" t="0" r="0" b="4860"/>
+          <a:blip r:embed="rId2"/>
+          <a:srcRect b="4860"/>
           <a:stretch/>
         </p:blipFill>
         <p:spPr>
@@ -5591,22 +6825,25 @@
       </p:pic>
     </p:spTree>
   </p:cSld>
+  <p:clrMapOvr>
+    <a:masterClrMapping/>
+  </p:clrMapOvr>
   <p:timing>
     <p:tnLst>
       <p:par>
-        <p:cTn id="17" dur="indefinite" restart="never" nodeType="tmRoot">
+        <p:cTn id="1" dur="indefinite" restart="never" nodeType="tmRoot">
           <p:childTnLst>
             <p:seq>
-              <p:cTn id="18" dur="indefinite" nodeType="mainSeq"/>
+              <p:cTn id="2" dur="indefinite" nodeType="mainSeq"/>
               <p:prevCondLst>
-                <p:cond delay="0" evt="onPrev">
+                <p:cond evt="onPrev" delay="0">
                   <p:tgtEl>
                     <p:sldTgt/>
                   </p:tgtEl>
                 </p:cond>
               </p:prevCondLst>
               <p:nextCondLst>
-                <p:cond delay="0" evt="onNext">
+                <p:cond evt="onNext" delay="0">
                   <p:tgtEl>
                     <p:sldTgt/>
                   </p:tgtEl>
@@ -5632,31 +6869,31 @@
         <a:sysClr val="window" lastClr="FFFFFF"/>
       </a:lt1>
       <a:dk2>
-        <a:srgbClr val="1f497d"/>
+        <a:srgbClr val="1F497D"/>
       </a:dk2>
       <a:lt2>
-        <a:srgbClr val="eeece1"/>
+        <a:srgbClr val="EEECE1"/>
       </a:lt2>
       <a:accent1>
-        <a:srgbClr val="4f81bd"/>
+        <a:srgbClr val="4F81BD"/>
       </a:accent1>
       <a:accent2>
-        <a:srgbClr val="c0504d"/>
+        <a:srgbClr val="C0504D"/>
       </a:accent2>
       <a:accent3>
-        <a:srgbClr val="9bbb59"/>
+        <a:srgbClr val="9BBB59"/>
       </a:accent3>
       <a:accent4>
-        <a:srgbClr val="8064a2"/>
+        <a:srgbClr val="8064A2"/>
       </a:accent4>
       <a:accent5>
-        <a:srgbClr val="4bacc6"/>
+        <a:srgbClr val="4BACC6"/>
       </a:accent5>
       <a:accent6>
-        <a:srgbClr val="f79646"/>
+        <a:srgbClr val="F79646"/>
       </a:accent6>
       <a:hlink>
-        <a:srgbClr val="0000ff"/>
+        <a:srgbClr val="0000FF"/>
       </a:hlink>
       <a:folHlink>
         <a:srgbClr val="800080"/>
@@ -5841,6 +7078,8 @@
       </a:bgFillStyleLst>
     </a:fmtScheme>
   </a:themeElements>
+  <a:objectDefaults/>
+  <a:extraClrSchemeLst/>
 </a:theme>
 </file>
 
@@ -5855,31 +7094,31 @@
         <a:sysClr val="window" lastClr="FFFFFF"/>
       </a:lt1>
       <a:dk2>
-        <a:srgbClr val="1f497d"/>
+        <a:srgbClr val="1F497D"/>
       </a:dk2>
       <a:lt2>
-        <a:srgbClr val="eeece1"/>
+        <a:srgbClr val="EEECE1"/>
       </a:lt2>
       <a:accent1>
-        <a:srgbClr val="4f81bd"/>
+        <a:srgbClr val="4F81BD"/>
       </a:accent1>
       <a:accent2>
-        <a:srgbClr val="c0504d"/>
+        <a:srgbClr val="C0504D"/>
       </a:accent2>
       <a:accent3>
-        <a:srgbClr val="9bbb59"/>
+        <a:srgbClr val="9BBB59"/>
       </a:accent3>
       <a:accent4>
-        <a:srgbClr val="8064a2"/>
+        <a:srgbClr val="8064A2"/>
       </a:accent4>
       <a:accent5>
-        <a:srgbClr val="4bacc6"/>
+        <a:srgbClr val="4BACC6"/>
       </a:accent5>
       <a:accent6>
-        <a:srgbClr val="f79646"/>
+        <a:srgbClr val="F79646"/>
       </a:accent6>
       <a:hlink>
-        <a:srgbClr val="0000ff"/>
+        <a:srgbClr val="0000FF"/>
       </a:hlink>
       <a:folHlink>
         <a:srgbClr val="800080"/>
@@ -6064,5 +7303,7 @@
       </a:bgFillStyleLst>
     </a:fmtScheme>
   </a:themeElements>
+  <a:objectDefaults/>
+  <a:extraClrSchemeLst/>
 </a:theme>
 </file>
</xml_diff>

<commit_message>
Fixed a typo -Ben
</commit_message>
<xml_diff>
--- a/docs/Debugger.pptx
+++ b/docs/Debugger.pptx
@@ -76,7 +76,7 @@
         <p:spPr>
           <a:xfrm>
             <a:off x="1097280" y="286560"/>
-            <a:ext cx="10057680" cy="1450080"/>
+            <a:ext cx="10057320" cy="1449720"/>
           </a:xfrm>
           <a:prstGeom prst="rect">
             <a:avLst/>
@@ -85,10 +85,8 @@
         <p:txBody>
           <a:bodyPr lIns="0" rIns="0" tIns="0" bIns="0" anchor="ctr"/>
           <a:p>
-            <a:endParaRPr b="0" lang="en-US" sz="1800" spc="-1" strike="noStrike">
-              <a:solidFill>
-                <a:srgbClr val="000000"/>
-              </a:solidFill>
+            <a:pPr algn="ctr"/>
+            <a:endParaRPr b="0" lang="en-US" sz="4400" spc="-1" strike="noStrike">
               <a:latin typeface="Arial"/>
             </a:endParaRPr>
           </a:p>
@@ -107,7 +105,7 @@
         <p:spPr>
           <a:xfrm>
             <a:off x="609480" y="1604520"/>
-            <a:ext cx="10972440" cy="1896840"/>
+            <a:ext cx="10972080" cy="1896840"/>
           </a:xfrm>
           <a:prstGeom prst="rect">
             <a:avLst/>
@@ -118,10 +116,7 @@
             <a:normAutofit/>
           </a:bodyPr>
           <a:p>
-            <a:endParaRPr b="0" lang="en-US" sz="2800" spc="-1" strike="noStrike">
-              <a:solidFill>
-                <a:srgbClr val="000000"/>
-              </a:solidFill>
+            <a:endParaRPr b="0" lang="en-US" sz="3200" spc="-1" strike="noStrike">
               <a:latin typeface="Arial"/>
             </a:endParaRPr>
           </a:p>
@@ -140,7 +135,7 @@
         <p:spPr>
           <a:xfrm>
             <a:off x="609480" y="3682080"/>
-            <a:ext cx="10972440" cy="1896840"/>
+            <a:ext cx="10972080" cy="1896840"/>
           </a:xfrm>
           <a:prstGeom prst="rect">
             <a:avLst/>
@@ -151,10 +146,7 @@
             <a:normAutofit/>
           </a:bodyPr>
           <a:p>
-            <a:endParaRPr b="0" lang="en-US" sz="2800" spc="-1" strike="noStrike">
-              <a:solidFill>
-                <a:srgbClr val="000000"/>
-              </a:solidFill>
+            <a:endParaRPr b="0" lang="en-US" sz="3200" spc="-1" strike="noStrike">
               <a:latin typeface="Arial"/>
             </a:endParaRPr>
           </a:p>
@@ -195,7 +187,7 @@
         <p:spPr>
           <a:xfrm>
             <a:off x="1097280" y="286560"/>
-            <a:ext cx="10057680" cy="1450080"/>
+            <a:ext cx="10057320" cy="1449720"/>
           </a:xfrm>
           <a:prstGeom prst="rect">
             <a:avLst/>
@@ -204,10 +196,8 @@
         <p:txBody>
           <a:bodyPr lIns="0" rIns="0" tIns="0" bIns="0" anchor="ctr"/>
           <a:p>
-            <a:endParaRPr b="0" lang="en-US" sz="1800" spc="-1" strike="noStrike">
-              <a:solidFill>
-                <a:srgbClr val="000000"/>
-              </a:solidFill>
+            <a:pPr algn="ctr"/>
+            <a:endParaRPr b="0" lang="en-US" sz="4400" spc="-1" strike="noStrike">
               <a:latin typeface="Arial"/>
             </a:endParaRPr>
           </a:p>
@@ -237,10 +227,7 @@
             <a:normAutofit/>
           </a:bodyPr>
           <a:p>
-            <a:endParaRPr b="0" lang="en-US" sz="2800" spc="-1" strike="noStrike">
-              <a:solidFill>
-                <a:srgbClr val="000000"/>
-              </a:solidFill>
+            <a:endParaRPr b="0" lang="en-US" sz="3200" spc="-1" strike="noStrike">
               <a:latin typeface="Arial"/>
             </a:endParaRPr>
           </a:p>
@@ -270,10 +257,7 @@
             <a:normAutofit/>
           </a:bodyPr>
           <a:p>
-            <a:endParaRPr b="0" lang="en-US" sz="2800" spc="-1" strike="noStrike">
-              <a:solidFill>
-                <a:srgbClr val="000000"/>
-              </a:solidFill>
+            <a:endParaRPr b="0" lang="en-US" sz="3200" spc="-1" strike="noStrike">
               <a:latin typeface="Arial"/>
             </a:endParaRPr>
           </a:p>
@@ -303,10 +287,7 @@
             <a:normAutofit/>
           </a:bodyPr>
           <a:p>
-            <a:endParaRPr b="0" lang="en-US" sz="2800" spc="-1" strike="noStrike">
-              <a:solidFill>
-                <a:srgbClr val="000000"/>
-              </a:solidFill>
+            <a:endParaRPr b="0" lang="en-US" sz="3200" spc="-1" strike="noStrike">
               <a:latin typeface="Arial"/>
             </a:endParaRPr>
           </a:p>
@@ -336,10 +317,7 @@
             <a:normAutofit/>
           </a:bodyPr>
           <a:p>
-            <a:endParaRPr b="0" lang="en-US" sz="2800" spc="-1" strike="noStrike">
-              <a:solidFill>
-                <a:srgbClr val="000000"/>
-              </a:solidFill>
+            <a:endParaRPr b="0" lang="en-US" sz="3200" spc="-1" strike="noStrike">
               <a:latin typeface="Arial"/>
             </a:endParaRPr>
           </a:p>
@@ -380,7 +358,7 @@
         <p:spPr>
           <a:xfrm>
             <a:off x="1097280" y="286560"/>
-            <a:ext cx="10057680" cy="1450080"/>
+            <a:ext cx="10057320" cy="1449720"/>
           </a:xfrm>
           <a:prstGeom prst="rect">
             <a:avLst/>
@@ -389,10 +367,8 @@
         <p:txBody>
           <a:bodyPr lIns="0" rIns="0" tIns="0" bIns="0" anchor="ctr"/>
           <a:p>
-            <a:endParaRPr b="0" lang="en-US" sz="1800" spc="-1" strike="noStrike">
-              <a:solidFill>
-                <a:srgbClr val="000000"/>
-              </a:solidFill>
+            <a:pPr algn="ctr"/>
+            <a:endParaRPr b="0" lang="en-US" sz="4400" spc="-1" strike="noStrike">
               <a:latin typeface="Arial"/>
             </a:endParaRPr>
           </a:p>
@@ -411,7 +387,7 @@
         <p:spPr>
           <a:xfrm>
             <a:off x="609480" y="1604520"/>
-            <a:ext cx="3533040" cy="1896840"/>
+            <a:ext cx="3532680" cy="1896840"/>
           </a:xfrm>
           <a:prstGeom prst="rect">
             <a:avLst/>
@@ -422,10 +398,7 @@
             <a:normAutofit/>
           </a:bodyPr>
           <a:p>
-            <a:endParaRPr b="0" lang="en-US" sz="2800" spc="-1" strike="noStrike">
-              <a:solidFill>
-                <a:srgbClr val="000000"/>
-              </a:solidFill>
+            <a:endParaRPr b="0" lang="en-US" sz="3200" spc="-1" strike="noStrike">
               <a:latin typeface="Arial"/>
             </a:endParaRPr>
           </a:p>
@@ -443,8 +416,8 @@
         </p:nvSpPr>
         <p:spPr>
           <a:xfrm>
-            <a:off x="4319640" y="1604520"/>
-            <a:ext cx="3533040" cy="1896840"/>
+            <a:off x="4319280" y="1604520"/>
+            <a:ext cx="3532680" cy="1896840"/>
           </a:xfrm>
           <a:prstGeom prst="rect">
             <a:avLst/>
@@ -455,10 +428,7 @@
             <a:normAutofit/>
           </a:bodyPr>
           <a:p>
-            <a:endParaRPr b="0" lang="en-US" sz="2800" spc="-1" strike="noStrike">
-              <a:solidFill>
-                <a:srgbClr val="000000"/>
-              </a:solidFill>
+            <a:endParaRPr b="0" lang="en-US" sz="3200" spc="-1" strike="noStrike">
               <a:latin typeface="Arial"/>
             </a:endParaRPr>
           </a:p>
@@ -476,8 +446,8 @@
         </p:nvSpPr>
         <p:spPr>
           <a:xfrm>
-            <a:off x="8029800" y="1604520"/>
-            <a:ext cx="3533040" cy="1896840"/>
+            <a:off x="8028720" y="1604520"/>
+            <a:ext cx="3532680" cy="1896840"/>
           </a:xfrm>
           <a:prstGeom prst="rect">
             <a:avLst/>
@@ -488,10 +458,7 @@
             <a:normAutofit/>
           </a:bodyPr>
           <a:p>
-            <a:endParaRPr b="0" lang="en-US" sz="2800" spc="-1" strike="noStrike">
-              <a:solidFill>
-                <a:srgbClr val="000000"/>
-              </a:solidFill>
+            <a:endParaRPr b="0" lang="en-US" sz="3200" spc="-1" strike="noStrike">
               <a:latin typeface="Arial"/>
             </a:endParaRPr>
           </a:p>
@@ -510,7 +477,7 @@
         <p:spPr>
           <a:xfrm>
             <a:off x="609480" y="3682080"/>
-            <a:ext cx="3533040" cy="1896840"/>
+            <a:ext cx="3532680" cy="1896840"/>
           </a:xfrm>
           <a:prstGeom prst="rect">
             <a:avLst/>
@@ -521,10 +488,7 @@
             <a:normAutofit/>
           </a:bodyPr>
           <a:p>
-            <a:endParaRPr b="0" lang="en-US" sz="2800" spc="-1" strike="noStrike">
-              <a:solidFill>
-                <a:srgbClr val="000000"/>
-              </a:solidFill>
+            <a:endParaRPr b="0" lang="en-US" sz="3200" spc="-1" strike="noStrike">
               <a:latin typeface="Arial"/>
             </a:endParaRPr>
           </a:p>
@@ -542,8 +506,8 @@
         </p:nvSpPr>
         <p:spPr>
           <a:xfrm>
-            <a:off x="4319640" y="3682080"/>
-            <a:ext cx="3533040" cy="1896840"/>
+            <a:off x="4319280" y="3682080"/>
+            <a:ext cx="3532680" cy="1896840"/>
           </a:xfrm>
           <a:prstGeom prst="rect">
             <a:avLst/>
@@ -554,10 +518,7 @@
             <a:normAutofit/>
           </a:bodyPr>
           <a:p>
-            <a:endParaRPr b="0" lang="en-US" sz="2800" spc="-1" strike="noStrike">
-              <a:solidFill>
-                <a:srgbClr val="000000"/>
-              </a:solidFill>
+            <a:endParaRPr b="0" lang="en-US" sz="3200" spc="-1" strike="noStrike">
               <a:latin typeface="Arial"/>
             </a:endParaRPr>
           </a:p>
@@ -575,8 +536,8 @@
         </p:nvSpPr>
         <p:spPr>
           <a:xfrm>
-            <a:off x="8029800" y="3682080"/>
-            <a:ext cx="3533040" cy="1896840"/>
+            <a:off x="8028720" y="3682080"/>
+            <a:ext cx="3532680" cy="1896840"/>
           </a:xfrm>
           <a:prstGeom prst="rect">
             <a:avLst/>
@@ -587,10 +548,7 @@
             <a:normAutofit/>
           </a:bodyPr>
           <a:p>
-            <a:endParaRPr b="0" lang="en-US" sz="2800" spc="-1" strike="noStrike">
-              <a:solidFill>
-                <a:srgbClr val="000000"/>
-              </a:solidFill>
+            <a:endParaRPr b="0" lang="en-US" sz="3200" spc="-1" strike="noStrike">
               <a:latin typeface="Arial"/>
             </a:endParaRPr>
           </a:p>
@@ -653,7 +611,7 @@
         <p:spPr>
           <a:xfrm>
             <a:off x="1097280" y="286560"/>
-            <a:ext cx="10057680" cy="1450080"/>
+            <a:ext cx="10057320" cy="1449720"/>
           </a:xfrm>
           <a:prstGeom prst="rect">
             <a:avLst/>
@@ -662,10 +620,8 @@
         <p:txBody>
           <a:bodyPr lIns="0" rIns="0" tIns="0" bIns="0" anchor="ctr"/>
           <a:p>
-            <a:endParaRPr b="0" lang="en-US" sz="1800" spc="-1" strike="noStrike">
-              <a:solidFill>
-                <a:srgbClr val="000000"/>
-              </a:solidFill>
+            <a:pPr algn="ctr"/>
+            <a:endParaRPr b="0" lang="en-US" sz="4400" spc="-1" strike="noStrike">
               <a:latin typeface="Arial"/>
             </a:endParaRPr>
           </a:p>
@@ -684,7 +640,7 @@
         <p:spPr>
           <a:xfrm>
             <a:off x="609480" y="1604520"/>
-            <a:ext cx="10972440" cy="3977280"/>
+            <a:ext cx="10972080" cy="3976920"/>
           </a:xfrm>
           <a:prstGeom prst="rect">
             <a:avLst/>
@@ -735,7 +691,7 @@
         <p:spPr>
           <a:xfrm>
             <a:off x="1097280" y="286560"/>
-            <a:ext cx="10057680" cy="1450080"/>
+            <a:ext cx="10057320" cy="1449720"/>
           </a:xfrm>
           <a:prstGeom prst="rect">
             <a:avLst/>
@@ -744,10 +700,8 @@
         <p:txBody>
           <a:bodyPr lIns="0" rIns="0" tIns="0" bIns="0" anchor="ctr"/>
           <a:p>
-            <a:endParaRPr b="0" lang="en-US" sz="1800" spc="-1" strike="noStrike">
-              <a:solidFill>
-                <a:srgbClr val="000000"/>
-              </a:solidFill>
+            <a:pPr algn="ctr"/>
+            <a:endParaRPr b="0" lang="en-US" sz="4400" spc="-1" strike="noStrike">
               <a:latin typeface="Arial"/>
             </a:endParaRPr>
           </a:p>
@@ -766,7 +720,7 @@
         <p:spPr>
           <a:xfrm>
             <a:off x="609480" y="1604520"/>
-            <a:ext cx="10972440" cy="3977280"/>
+            <a:ext cx="10972080" cy="3976920"/>
           </a:xfrm>
           <a:prstGeom prst="rect">
             <a:avLst/>
@@ -777,10 +731,7 @@
             <a:normAutofit/>
           </a:bodyPr>
           <a:p>
-            <a:endParaRPr b="0" lang="en-US" sz="2800" spc="-1" strike="noStrike">
-              <a:solidFill>
-                <a:srgbClr val="000000"/>
-              </a:solidFill>
+            <a:endParaRPr b="0" lang="en-US" sz="3200" spc="-1" strike="noStrike">
               <a:latin typeface="Arial"/>
             </a:endParaRPr>
           </a:p>
@@ -821,7 +772,7 @@
         <p:spPr>
           <a:xfrm>
             <a:off x="1097280" y="286560"/>
-            <a:ext cx="10057680" cy="1450080"/>
+            <a:ext cx="10057320" cy="1449720"/>
           </a:xfrm>
           <a:prstGeom prst="rect">
             <a:avLst/>
@@ -830,10 +781,8 @@
         <p:txBody>
           <a:bodyPr lIns="0" rIns="0" tIns="0" bIns="0" anchor="ctr"/>
           <a:p>
-            <a:endParaRPr b="0" lang="en-US" sz="1800" spc="-1" strike="noStrike">
-              <a:solidFill>
-                <a:srgbClr val="000000"/>
-              </a:solidFill>
+            <a:pPr algn="ctr"/>
+            <a:endParaRPr b="0" lang="en-US" sz="4400" spc="-1" strike="noStrike">
               <a:latin typeface="Arial"/>
             </a:endParaRPr>
           </a:p>
@@ -852,7 +801,7 @@
         <p:spPr>
           <a:xfrm>
             <a:off x="609480" y="1604520"/>
-            <a:ext cx="5354280" cy="3977280"/>
+            <a:ext cx="5354280" cy="3976920"/>
           </a:xfrm>
           <a:prstGeom prst="rect">
             <a:avLst/>
@@ -863,10 +812,7 @@
             <a:normAutofit/>
           </a:bodyPr>
           <a:p>
-            <a:endParaRPr b="0" lang="en-US" sz="2800" spc="-1" strike="noStrike">
-              <a:solidFill>
-                <a:srgbClr val="000000"/>
-              </a:solidFill>
+            <a:endParaRPr b="0" lang="en-US" sz="3200" spc="-1" strike="noStrike">
               <a:latin typeface="Arial"/>
             </a:endParaRPr>
           </a:p>
@@ -885,7 +831,7 @@
         <p:spPr>
           <a:xfrm>
             <a:off x="6231960" y="1604520"/>
-            <a:ext cx="5354280" cy="3977280"/>
+            <a:ext cx="5354280" cy="3976920"/>
           </a:xfrm>
           <a:prstGeom prst="rect">
             <a:avLst/>
@@ -896,10 +842,7 @@
             <a:normAutofit/>
           </a:bodyPr>
           <a:p>
-            <a:endParaRPr b="0" lang="en-US" sz="2800" spc="-1" strike="noStrike">
-              <a:solidFill>
-                <a:srgbClr val="000000"/>
-              </a:solidFill>
+            <a:endParaRPr b="0" lang="en-US" sz="3200" spc="-1" strike="noStrike">
               <a:latin typeface="Arial"/>
             </a:endParaRPr>
           </a:p>
@@ -940,7 +883,7 @@
         <p:spPr>
           <a:xfrm>
             <a:off x="1097280" y="286560"/>
-            <a:ext cx="10057680" cy="1450080"/>
+            <a:ext cx="10057320" cy="1449720"/>
           </a:xfrm>
           <a:prstGeom prst="rect">
             <a:avLst/>
@@ -949,10 +892,8 @@
         <p:txBody>
           <a:bodyPr lIns="0" rIns="0" tIns="0" bIns="0" anchor="ctr"/>
           <a:p>
-            <a:endParaRPr b="0" lang="en-US" sz="1800" spc="-1" strike="noStrike">
-              <a:solidFill>
-                <a:srgbClr val="000000"/>
-              </a:solidFill>
+            <a:pPr algn="ctr"/>
+            <a:endParaRPr b="0" lang="en-US" sz="4400" spc="-1" strike="noStrike">
               <a:latin typeface="Arial"/>
             </a:endParaRPr>
           </a:p>
@@ -993,7 +934,7 @@
         <p:spPr>
           <a:xfrm>
             <a:off x="1097280" y="286560"/>
-            <a:ext cx="10057680" cy="6723000"/>
+            <a:ext cx="10057320" cy="6721200"/>
           </a:xfrm>
           <a:prstGeom prst="rect">
             <a:avLst/>
@@ -1044,7 +985,7 @@
         <p:spPr>
           <a:xfrm>
             <a:off x="1097280" y="286560"/>
-            <a:ext cx="10057680" cy="1450080"/>
+            <a:ext cx="10057320" cy="1449720"/>
           </a:xfrm>
           <a:prstGeom prst="rect">
             <a:avLst/>
@@ -1053,10 +994,8 @@
         <p:txBody>
           <a:bodyPr lIns="0" rIns="0" tIns="0" bIns="0" anchor="ctr"/>
           <a:p>
-            <a:endParaRPr b="0" lang="en-US" sz="1800" spc="-1" strike="noStrike">
-              <a:solidFill>
-                <a:srgbClr val="000000"/>
-              </a:solidFill>
+            <a:pPr algn="ctr"/>
+            <a:endParaRPr b="0" lang="en-US" sz="4400" spc="-1" strike="noStrike">
               <a:latin typeface="Arial"/>
             </a:endParaRPr>
           </a:p>
@@ -1086,10 +1025,7 @@
             <a:normAutofit/>
           </a:bodyPr>
           <a:p>
-            <a:endParaRPr b="0" lang="en-US" sz="2800" spc="-1" strike="noStrike">
-              <a:solidFill>
-                <a:srgbClr val="000000"/>
-              </a:solidFill>
+            <a:endParaRPr b="0" lang="en-US" sz="3200" spc="-1" strike="noStrike">
               <a:latin typeface="Arial"/>
             </a:endParaRPr>
           </a:p>
@@ -1108,7 +1044,7 @@
         <p:spPr>
           <a:xfrm>
             <a:off x="6231960" y="1604520"/>
-            <a:ext cx="5354280" cy="3977280"/>
+            <a:ext cx="5354280" cy="3976920"/>
           </a:xfrm>
           <a:prstGeom prst="rect">
             <a:avLst/>
@@ -1119,10 +1055,7 @@
             <a:normAutofit/>
           </a:bodyPr>
           <a:p>
-            <a:endParaRPr b="0" lang="en-US" sz="2800" spc="-1" strike="noStrike">
-              <a:solidFill>
-                <a:srgbClr val="000000"/>
-              </a:solidFill>
+            <a:endParaRPr b="0" lang="en-US" sz="3200" spc="-1" strike="noStrike">
               <a:latin typeface="Arial"/>
             </a:endParaRPr>
           </a:p>
@@ -1152,10 +1085,7 @@
             <a:normAutofit/>
           </a:bodyPr>
           <a:p>
-            <a:endParaRPr b="0" lang="en-US" sz="2800" spc="-1" strike="noStrike">
-              <a:solidFill>
-                <a:srgbClr val="000000"/>
-              </a:solidFill>
+            <a:endParaRPr b="0" lang="en-US" sz="3200" spc="-1" strike="noStrike">
               <a:latin typeface="Arial"/>
             </a:endParaRPr>
           </a:p>
@@ -1196,7 +1126,7 @@
         <p:spPr>
           <a:xfrm>
             <a:off x="1097280" y="286560"/>
-            <a:ext cx="10057680" cy="1450080"/>
+            <a:ext cx="10057320" cy="1449720"/>
           </a:xfrm>
           <a:prstGeom prst="rect">
             <a:avLst/>
@@ -1205,10 +1135,8 @@
         <p:txBody>
           <a:bodyPr lIns="0" rIns="0" tIns="0" bIns="0" anchor="ctr"/>
           <a:p>
-            <a:endParaRPr b="0" lang="en-US" sz="1800" spc="-1" strike="noStrike">
-              <a:solidFill>
-                <a:srgbClr val="000000"/>
-              </a:solidFill>
+            <a:pPr algn="ctr"/>
+            <a:endParaRPr b="0" lang="en-US" sz="4400" spc="-1" strike="noStrike">
               <a:latin typeface="Arial"/>
             </a:endParaRPr>
           </a:p>
@@ -1227,7 +1155,7 @@
         <p:spPr>
           <a:xfrm>
             <a:off x="609480" y="1604520"/>
-            <a:ext cx="10972440" cy="3977280"/>
+            <a:ext cx="10972080" cy="3976920"/>
           </a:xfrm>
           <a:prstGeom prst="rect">
             <a:avLst/>
@@ -1278,7 +1206,7 @@
         <p:spPr>
           <a:xfrm>
             <a:off x="1097280" y="286560"/>
-            <a:ext cx="10057680" cy="1450080"/>
+            <a:ext cx="10057320" cy="1449720"/>
           </a:xfrm>
           <a:prstGeom prst="rect">
             <a:avLst/>
@@ -1287,10 +1215,8 @@
         <p:txBody>
           <a:bodyPr lIns="0" rIns="0" tIns="0" bIns="0" anchor="ctr"/>
           <a:p>
-            <a:endParaRPr b="0" lang="en-US" sz="1800" spc="-1" strike="noStrike">
-              <a:solidFill>
-                <a:srgbClr val="000000"/>
-              </a:solidFill>
+            <a:pPr algn="ctr"/>
+            <a:endParaRPr b="0" lang="en-US" sz="4400" spc="-1" strike="noStrike">
               <a:latin typeface="Arial"/>
             </a:endParaRPr>
           </a:p>
@@ -1309,7 +1235,7 @@
         <p:spPr>
           <a:xfrm>
             <a:off x="609480" y="1604520"/>
-            <a:ext cx="5354280" cy="3977280"/>
+            <a:ext cx="5354280" cy="3976920"/>
           </a:xfrm>
           <a:prstGeom prst="rect">
             <a:avLst/>
@@ -1320,10 +1246,7 @@
             <a:normAutofit/>
           </a:bodyPr>
           <a:p>
-            <a:endParaRPr b="0" lang="en-US" sz="2800" spc="-1" strike="noStrike">
-              <a:solidFill>
-                <a:srgbClr val="000000"/>
-              </a:solidFill>
+            <a:endParaRPr b="0" lang="en-US" sz="3200" spc="-1" strike="noStrike">
               <a:latin typeface="Arial"/>
             </a:endParaRPr>
           </a:p>
@@ -1353,10 +1276,7 @@
             <a:normAutofit/>
           </a:bodyPr>
           <a:p>
-            <a:endParaRPr b="0" lang="en-US" sz="2800" spc="-1" strike="noStrike">
-              <a:solidFill>
-                <a:srgbClr val="000000"/>
-              </a:solidFill>
+            <a:endParaRPr b="0" lang="en-US" sz="3200" spc="-1" strike="noStrike">
               <a:latin typeface="Arial"/>
             </a:endParaRPr>
           </a:p>
@@ -1386,10 +1306,7 @@
             <a:normAutofit/>
           </a:bodyPr>
           <a:p>
-            <a:endParaRPr b="0" lang="en-US" sz="2800" spc="-1" strike="noStrike">
-              <a:solidFill>
-                <a:srgbClr val="000000"/>
-              </a:solidFill>
+            <a:endParaRPr b="0" lang="en-US" sz="3200" spc="-1" strike="noStrike">
               <a:latin typeface="Arial"/>
             </a:endParaRPr>
           </a:p>
@@ -1430,7 +1347,7 @@
         <p:spPr>
           <a:xfrm>
             <a:off x="1097280" y="286560"/>
-            <a:ext cx="10057680" cy="1450080"/>
+            <a:ext cx="10057320" cy="1449720"/>
           </a:xfrm>
           <a:prstGeom prst="rect">
             <a:avLst/>
@@ -1439,10 +1356,8 @@
         <p:txBody>
           <a:bodyPr lIns="0" rIns="0" tIns="0" bIns="0" anchor="ctr"/>
           <a:p>
-            <a:endParaRPr b="0" lang="en-US" sz="1800" spc="-1" strike="noStrike">
-              <a:solidFill>
-                <a:srgbClr val="000000"/>
-              </a:solidFill>
+            <a:pPr algn="ctr"/>
+            <a:endParaRPr b="0" lang="en-US" sz="4400" spc="-1" strike="noStrike">
               <a:latin typeface="Arial"/>
             </a:endParaRPr>
           </a:p>
@@ -1472,10 +1387,7 @@
             <a:normAutofit/>
           </a:bodyPr>
           <a:p>
-            <a:endParaRPr b="0" lang="en-US" sz="2800" spc="-1" strike="noStrike">
-              <a:solidFill>
-                <a:srgbClr val="000000"/>
-              </a:solidFill>
+            <a:endParaRPr b="0" lang="en-US" sz="3200" spc="-1" strike="noStrike">
               <a:latin typeface="Arial"/>
             </a:endParaRPr>
           </a:p>
@@ -1505,10 +1417,7 @@
             <a:normAutofit/>
           </a:bodyPr>
           <a:p>
-            <a:endParaRPr b="0" lang="en-US" sz="2800" spc="-1" strike="noStrike">
-              <a:solidFill>
-                <a:srgbClr val="000000"/>
-              </a:solidFill>
+            <a:endParaRPr b="0" lang="en-US" sz="3200" spc="-1" strike="noStrike">
               <a:latin typeface="Arial"/>
             </a:endParaRPr>
           </a:p>
@@ -1527,7 +1436,7 @@
         <p:spPr>
           <a:xfrm>
             <a:off x="609480" y="3682080"/>
-            <a:ext cx="10972440" cy="1896840"/>
+            <a:ext cx="10972080" cy="1896840"/>
           </a:xfrm>
           <a:prstGeom prst="rect">
             <a:avLst/>
@@ -1538,10 +1447,7 @@
             <a:normAutofit/>
           </a:bodyPr>
           <a:p>
-            <a:endParaRPr b="0" lang="en-US" sz="2800" spc="-1" strike="noStrike">
-              <a:solidFill>
-                <a:srgbClr val="000000"/>
-              </a:solidFill>
+            <a:endParaRPr b="0" lang="en-US" sz="3200" spc="-1" strike="noStrike">
               <a:latin typeface="Arial"/>
             </a:endParaRPr>
           </a:p>
@@ -1582,7 +1488,7 @@
         <p:spPr>
           <a:xfrm>
             <a:off x="1097280" y="286560"/>
-            <a:ext cx="10057680" cy="1450080"/>
+            <a:ext cx="10057320" cy="1449720"/>
           </a:xfrm>
           <a:prstGeom prst="rect">
             <a:avLst/>
@@ -1591,10 +1497,8 @@
         <p:txBody>
           <a:bodyPr lIns="0" rIns="0" tIns="0" bIns="0" anchor="ctr"/>
           <a:p>
-            <a:endParaRPr b="0" lang="en-US" sz="1800" spc="-1" strike="noStrike">
-              <a:solidFill>
-                <a:srgbClr val="000000"/>
-              </a:solidFill>
+            <a:pPr algn="ctr"/>
+            <a:endParaRPr b="0" lang="en-US" sz="4400" spc="-1" strike="noStrike">
               <a:latin typeface="Arial"/>
             </a:endParaRPr>
           </a:p>
@@ -1613,7 +1517,7 @@
         <p:spPr>
           <a:xfrm>
             <a:off x="609480" y="1604520"/>
-            <a:ext cx="10972440" cy="1896840"/>
+            <a:ext cx="10972080" cy="1896840"/>
           </a:xfrm>
           <a:prstGeom prst="rect">
             <a:avLst/>
@@ -1624,10 +1528,7 @@
             <a:normAutofit/>
           </a:bodyPr>
           <a:p>
-            <a:endParaRPr b="0" lang="en-US" sz="2800" spc="-1" strike="noStrike">
-              <a:solidFill>
-                <a:srgbClr val="000000"/>
-              </a:solidFill>
+            <a:endParaRPr b="0" lang="en-US" sz="3200" spc="-1" strike="noStrike">
               <a:latin typeface="Arial"/>
             </a:endParaRPr>
           </a:p>
@@ -1646,7 +1547,7 @@
         <p:spPr>
           <a:xfrm>
             <a:off x="609480" y="3682080"/>
-            <a:ext cx="10972440" cy="1896840"/>
+            <a:ext cx="10972080" cy="1896840"/>
           </a:xfrm>
           <a:prstGeom prst="rect">
             <a:avLst/>
@@ -1657,10 +1558,7 @@
             <a:normAutofit/>
           </a:bodyPr>
           <a:p>
-            <a:endParaRPr b="0" lang="en-US" sz="2800" spc="-1" strike="noStrike">
-              <a:solidFill>
-                <a:srgbClr val="000000"/>
-              </a:solidFill>
+            <a:endParaRPr b="0" lang="en-US" sz="3200" spc="-1" strike="noStrike">
               <a:latin typeface="Arial"/>
             </a:endParaRPr>
           </a:p>
@@ -1701,7 +1599,7 @@
         <p:spPr>
           <a:xfrm>
             <a:off x="1097280" y="286560"/>
-            <a:ext cx="10057680" cy="1450080"/>
+            <a:ext cx="10057320" cy="1449720"/>
           </a:xfrm>
           <a:prstGeom prst="rect">
             <a:avLst/>
@@ -1710,10 +1608,8 @@
         <p:txBody>
           <a:bodyPr lIns="0" rIns="0" tIns="0" bIns="0" anchor="ctr"/>
           <a:p>
-            <a:endParaRPr b="0" lang="en-US" sz="1800" spc="-1" strike="noStrike">
-              <a:solidFill>
-                <a:srgbClr val="000000"/>
-              </a:solidFill>
+            <a:pPr algn="ctr"/>
+            <a:endParaRPr b="0" lang="en-US" sz="4400" spc="-1" strike="noStrike">
               <a:latin typeface="Arial"/>
             </a:endParaRPr>
           </a:p>
@@ -1743,10 +1639,7 @@
             <a:normAutofit/>
           </a:bodyPr>
           <a:p>
-            <a:endParaRPr b="0" lang="en-US" sz="2800" spc="-1" strike="noStrike">
-              <a:solidFill>
-                <a:srgbClr val="000000"/>
-              </a:solidFill>
+            <a:endParaRPr b="0" lang="en-US" sz="3200" spc="-1" strike="noStrike">
               <a:latin typeface="Arial"/>
             </a:endParaRPr>
           </a:p>
@@ -1776,10 +1669,7 @@
             <a:normAutofit/>
           </a:bodyPr>
           <a:p>
-            <a:endParaRPr b="0" lang="en-US" sz="2800" spc="-1" strike="noStrike">
-              <a:solidFill>
-                <a:srgbClr val="000000"/>
-              </a:solidFill>
+            <a:endParaRPr b="0" lang="en-US" sz="3200" spc="-1" strike="noStrike">
               <a:latin typeface="Arial"/>
             </a:endParaRPr>
           </a:p>
@@ -1809,10 +1699,7 @@
             <a:normAutofit/>
           </a:bodyPr>
           <a:p>
-            <a:endParaRPr b="0" lang="en-US" sz="2800" spc="-1" strike="noStrike">
-              <a:solidFill>
-                <a:srgbClr val="000000"/>
-              </a:solidFill>
+            <a:endParaRPr b="0" lang="en-US" sz="3200" spc="-1" strike="noStrike">
               <a:latin typeface="Arial"/>
             </a:endParaRPr>
           </a:p>
@@ -1842,10 +1729,7 @@
             <a:normAutofit/>
           </a:bodyPr>
           <a:p>
-            <a:endParaRPr b="0" lang="en-US" sz="2800" spc="-1" strike="noStrike">
-              <a:solidFill>
-                <a:srgbClr val="000000"/>
-              </a:solidFill>
+            <a:endParaRPr b="0" lang="en-US" sz="3200" spc="-1" strike="noStrike">
               <a:latin typeface="Arial"/>
             </a:endParaRPr>
           </a:p>
@@ -1886,7 +1770,7 @@
         <p:spPr>
           <a:xfrm>
             <a:off x="1097280" y="286560"/>
-            <a:ext cx="10057680" cy="1450080"/>
+            <a:ext cx="10057320" cy="1449720"/>
           </a:xfrm>
           <a:prstGeom prst="rect">
             <a:avLst/>
@@ -1895,10 +1779,8 @@
         <p:txBody>
           <a:bodyPr lIns="0" rIns="0" tIns="0" bIns="0" anchor="ctr"/>
           <a:p>
-            <a:endParaRPr b="0" lang="en-US" sz="1800" spc="-1" strike="noStrike">
-              <a:solidFill>
-                <a:srgbClr val="000000"/>
-              </a:solidFill>
+            <a:pPr algn="ctr"/>
+            <a:endParaRPr b="0" lang="en-US" sz="4400" spc="-1" strike="noStrike">
               <a:latin typeface="Arial"/>
             </a:endParaRPr>
           </a:p>
@@ -1917,7 +1799,7 @@
         <p:spPr>
           <a:xfrm>
             <a:off x="609480" y="1604520"/>
-            <a:ext cx="3533040" cy="1896840"/>
+            <a:ext cx="3532680" cy="1896840"/>
           </a:xfrm>
           <a:prstGeom prst="rect">
             <a:avLst/>
@@ -1928,10 +1810,7 @@
             <a:normAutofit/>
           </a:bodyPr>
           <a:p>
-            <a:endParaRPr b="0" lang="en-US" sz="2800" spc="-1" strike="noStrike">
-              <a:solidFill>
-                <a:srgbClr val="000000"/>
-              </a:solidFill>
+            <a:endParaRPr b="0" lang="en-US" sz="3200" spc="-1" strike="noStrike">
               <a:latin typeface="Arial"/>
             </a:endParaRPr>
           </a:p>
@@ -1949,8 +1828,8 @@
         </p:nvSpPr>
         <p:spPr>
           <a:xfrm>
-            <a:off x="4319640" y="1604520"/>
-            <a:ext cx="3533040" cy="1896840"/>
+            <a:off x="4319280" y="1604520"/>
+            <a:ext cx="3532680" cy="1896840"/>
           </a:xfrm>
           <a:prstGeom prst="rect">
             <a:avLst/>
@@ -1961,10 +1840,7 @@
             <a:normAutofit/>
           </a:bodyPr>
           <a:p>
-            <a:endParaRPr b="0" lang="en-US" sz="2800" spc="-1" strike="noStrike">
-              <a:solidFill>
-                <a:srgbClr val="000000"/>
-              </a:solidFill>
+            <a:endParaRPr b="0" lang="en-US" sz="3200" spc="-1" strike="noStrike">
               <a:latin typeface="Arial"/>
             </a:endParaRPr>
           </a:p>
@@ -1982,8 +1858,8 @@
         </p:nvSpPr>
         <p:spPr>
           <a:xfrm>
-            <a:off x="8029800" y="1604520"/>
-            <a:ext cx="3533040" cy="1896840"/>
+            <a:off x="8028720" y="1604520"/>
+            <a:ext cx="3532680" cy="1896840"/>
           </a:xfrm>
           <a:prstGeom prst="rect">
             <a:avLst/>
@@ -1994,10 +1870,7 @@
             <a:normAutofit/>
           </a:bodyPr>
           <a:p>
-            <a:endParaRPr b="0" lang="en-US" sz="2800" spc="-1" strike="noStrike">
-              <a:solidFill>
-                <a:srgbClr val="000000"/>
-              </a:solidFill>
+            <a:endParaRPr b="0" lang="en-US" sz="3200" spc="-1" strike="noStrike">
               <a:latin typeface="Arial"/>
             </a:endParaRPr>
           </a:p>
@@ -2016,7 +1889,7 @@
         <p:spPr>
           <a:xfrm>
             <a:off x="609480" y="3682080"/>
-            <a:ext cx="3533040" cy="1896840"/>
+            <a:ext cx="3532680" cy="1896840"/>
           </a:xfrm>
           <a:prstGeom prst="rect">
             <a:avLst/>
@@ -2027,10 +1900,7 @@
             <a:normAutofit/>
           </a:bodyPr>
           <a:p>
-            <a:endParaRPr b="0" lang="en-US" sz="2800" spc="-1" strike="noStrike">
-              <a:solidFill>
-                <a:srgbClr val="000000"/>
-              </a:solidFill>
+            <a:endParaRPr b="0" lang="en-US" sz="3200" spc="-1" strike="noStrike">
               <a:latin typeface="Arial"/>
             </a:endParaRPr>
           </a:p>
@@ -2048,8 +1918,8 @@
         </p:nvSpPr>
         <p:spPr>
           <a:xfrm>
-            <a:off x="4319640" y="3682080"/>
-            <a:ext cx="3533040" cy="1896840"/>
+            <a:off x="4319280" y="3682080"/>
+            <a:ext cx="3532680" cy="1896840"/>
           </a:xfrm>
           <a:prstGeom prst="rect">
             <a:avLst/>
@@ -2060,10 +1930,7 @@
             <a:normAutofit/>
           </a:bodyPr>
           <a:p>
-            <a:endParaRPr b="0" lang="en-US" sz="2800" spc="-1" strike="noStrike">
-              <a:solidFill>
-                <a:srgbClr val="000000"/>
-              </a:solidFill>
+            <a:endParaRPr b="0" lang="en-US" sz="3200" spc="-1" strike="noStrike">
               <a:latin typeface="Arial"/>
             </a:endParaRPr>
           </a:p>
@@ -2081,8 +1948,8 @@
         </p:nvSpPr>
         <p:spPr>
           <a:xfrm>
-            <a:off x="8029800" y="3682080"/>
-            <a:ext cx="3533040" cy="1896840"/>
+            <a:off x="8028720" y="3682080"/>
+            <a:ext cx="3532680" cy="1896840"/>
           </a:xfrm>
           <a:prstGeom prst="rect">
             <a:avLst/>
@@ -2093,10 +1960,7 @@
             <a:normAutofit/>
           </a:bodyPr>
           <a:p>
-            <a:endParaRPr b="0" lang="en-US" sz="2800" spc="-1" strike="noStrike">
-              <a:solidFill>
-                <a:srgbClr val="000000"/>
-              </a:solidFill>
+            <a:endParaRPr b="0" lang="en-US" sz="3200" spc="-1" strike="noStrike">
               <a:latin typeface="Arial"/>
             </a:endParaRPr>
           </a:p>
@@ -2159,7 +2023,7 @@
         <p:spPr>
           <a:xfrm>
             <a:off x="1097280" y="286560"/>
-            <a:ext cx="10057680" cy="1450080"/>
+            <a:ext cx="10057320" cy="1449720"/>
           </a:xfrm>
           <a:prstGeom prst="rect">
             <a:avLst/>
@@ -2168,10 +2032,8 @@
         <p:txBody>
           <a:bodyPr lIns="0" rIns="0" tIns="0" bIns="0" anchor="ctr"/>
           <a:p>
-            <a:endParaRPr b="0" lang="en-US" sz="1800" spc="-1" strike="noStrike">
-              <a:solidFill>
-                <a:srgbClr val="000000"/>
-              </a:solidFill>
+            <a:pPr algn="ctr"/>
+            <a:endParaRPr b="0" lang="en-US" sz="4400" spc="-1" strike="noStrike">
               <a:latin typeface="Arial"/>
             </a:endParaRPr>
           </a:p>
@@ -2190,7 +2052,7 @@
         <p:spPr>
           <a:xfrm>
             <a:off x="609480" y="1604520"/>
-            <a:ext cx="10972440" cy="3977280"/>
+            <a:ext cx="10972080" cy="3976920"/>
           </a:xfrm>
           <a:prstGeom prst="rect">
             <a:avLst/>
@@ -2241,7 +2103,7 @@
         <p:spPr>
           <a:xfrm>
             <a:off x="1097280" y="286560"/>
-            <a:ext cx="10057680" cy="1450080"/>
+            <a:ext cx="10057320" cy="1449720"/>
           </a:xfrm>
           <a:prstGeom prst="rect">
             <a:avLst/>
@@ -2250,10 +2112,8 @@
         <p:txBody>
           <a:bodyPr lIns="0" rIns="0" tIns="0" bIns="0" anchor="ctr"/>
           <a:p>
-            <a:endParaRPr b="0" lang="en-US" sz="1800" spc="-1" strike="noStrike">
-              <a:solidFill>
-                <a:srgbClr val="000000"/>
-              </a:solidFill>
+            <a:pPr algn="ctr"/>
+            <a:endParaRPr b="0" lang="en-US" sz="4400" spc="-1" strike="noStrike">
               <a:latin typeface="Arial"/>
             </a:endParaRPr>
           </a:p>
@@ -2272,7 +2132,7 @@
         <p:spPr>
           <a:xfrm>
             <a:off x="609480" y="1604520"/>
-            <a:ext cx="10972440" cy="3977280"/>
+            <a:ext cx="10972080" cy="3976920"/>
           </a:xfrm>
           <a:prstGeom prst="rect">
             <a:avLst/>
@@ -2283,10 +2143,7 @@
             <a:normAutofit/>
           </a:bodyPr>
           <a:p>
-            <a:endParaRPr b="0" lang="en-US" sz="2800" spc="-1" strike="noStrike">
-              <a:solidFill>
-                <a:srgbClr val="000000"/>
-              </a:solidFill>
+            <a:endParaRPr b="0" lang="en-US" sz="3200" spc="-1" strike="noStrike">
               <a:latin typeface="Arial"/>
             </a:endParaRPr>
           </a:p>
@@ -2327,7 +2184,7 @@
         <p:spPr>
           <a:xfrm>
             <a:off x="1097280" y="286560"/>
-            <a:ext cx="10057680" cy="1450080"/>
+            <a:ext cx="10057320" cy="1449720"/>
           </a:xfrm>
           <a:prstGeom prst="rect">
             <a:avLst/>
@@ -2336,10 +2193,8 @@
         <p:txBody>
           <a:bodyPr lIns="0" rIns="0" tIns="0" bIns="0" anchor="ctr"/>
           <a:p>
-            <a:endParaRPr b="0" lang="en-US" sz="1800" spc="-1" strike="noStrike">
-              <a:solidFill>
-                <a:srgbClr val="000000"/>
-              </a:solidFill>
+            <a:pPr algn="ctr"/>
+            <a:endParaRPr b="0" lang="en-US" sz="4400" spc="-1" strike="noStrike">
               <a:latin typeface="Arial"/>
             </a:endParaRPr>
           </a:p>
@@ -2358,7 +2213,7 @@
         <p:spPr>
           <a:xfrm>
             <a:off x="609480" y="1604520"/>
-            <a:ext cx="5354280" cy="3977280"/>
+            <a:ext cx="5354280" cy="3976920"/>
           </a:xfrm>
           <a:prstGeom prst="rect">
             <a:avLst/>
@@ -2369,10 +2224,7 @@
             <a:normAutofit/>
           </a:bodyPr>
           <a:p>
-            <a:endParaRPr b="0" lang="en-US" sz="2800" spc="-1" strike="noStrike">
-              <a:solidFill>
-                <a:srgbClr val="000000"/>
-              </a:solidFill>
+            <a:endParaRPr b="0" lang="en-US" sz="3200" spc="-1" strike="noStrike">
               <a:latin typeface="Arial"/>
             </a:endParaRPr>
           </a:p>
@@ -2391,7 +2243,7 @@
         <p:spPr>
           <a:xfrm>
             <a:off x="6231960" y="1604520"/>
-            <a:ext cx="5354280" cy="3977280"/>
+            <a:ext cx="5354280" cy="3976920"/>
           </a:xfrm>
           <a:prstGeom prst="rect">
             <a:avLst/>
@@ -2402,10 +2254,7 @@
             <a:normAutofit/>
           </a:bodyPr>
           <a:p>
-            <a:endParaRPr b="0" lang="en-US" sz="2800" spc="-1" strike="noStrike">
-              <a:solidFill>
-                <a:srgbClr val="000000"/>
-              </a:solidFill>
+            <a:endParaRPr b="0" lang="en-US" sz="3200" spc="-1" strike="noStrike">
               <a:latin typeface="Arial"/>
             </a:endParaRPr>
           </a:p>
@@ -2446,7 +2295,7 @@
         <p:spPr>
           <a:xfrm>
             <a:off x="1097280" y="286560"/>
-            <a:ext cx="10057680" cy="1450080"/>
+            <a:ext cx="10057320" cy="1449720"/>
           </a:xfrm>
           <a:prstGeom prst="rect">
             <a:avLst/>
@@ -2455,10 +2304,8 @@
         <p:txBody>
           <a:bodyPr lIns="0" rIns="0" tIns="0" bIns="0" anchor="ctr"/>
           <a:p>
-            <a:endParaRPr b="0" lang="en-US" sz="1800" spc="-1" strike="noStrike">
-              <a:solidFill>
-                <a:srgbClr val="000000"/>
-              </a:solidFill>
+            <a:pPr algn="ctr"/>
+            <a:endParaRPr b="0" lang="en-US" sz="4400" spc="-1" strike="noStrike">
               <a:latin typeface="Arial"/>
             </a:endParaRPr>
           </a:p>
@@ -2499,7 +2346,7 @@
         <p:spPr>
           <a:xfrm>
             <a:off x="1097280" y="286560"/>
-            <a:ext cx="10057680" cy="1450080"/>
+            <a:ext cx="10057320" cy="1449720"/>
           </a:xfrm>
           <a:prstGeom prst="rect">
             <a:avLst/>
@@ -2508,10 +2355,8 @@
         <p:txBody>
           <a:bodyPr lIns="0" rIns="0" tIns="0" bIns="0" anchor="ctr"/>
           <a:p>
-            <a:endParaRPr b="0" lang="en-US" sz="1800" spc="-1" strike="noStrike">
-              <a:solidFill>
-                <a:srgbClr val="000000"/>
-              </a:solidFill>
+            <a:pPr algn="ctr"/>
+            <a:endParaRPr b="0" lang="en-US" sz="4400" spc="-1" strike="noStrike">
               <a:latin typeface="Arial"/>
             </a:endParaRPr>
           </a:p>
@@ -2530,7 +2375,7 @@
         <p:spPr>
           <a:xfrm>
             <a:off x="609480" y="1604520"/>
-            <a:ext cx="10972440" cy="3977280"/>
+            <a:ext cx="10972080" cy="3976920"/>
           </a:xfrm>
           <a:prstGeom prst="rect">
             <a:avLst/>
@@ -2541,10 +2386,7 @@
             <a:normAutofit/>
           </a:bodyPr>
           <a:p>
-            <a:endParaRPr b="0" lang="en-US" sz="2800" spc="-1" strike="noStrike">
-              <a:solidFill>
-                <a:srgbClr val="000000"/>
-              </a:solidFill>
+            <a:endParaRPr b="0" lang="en-US" sz="3200" spc="-1" strike="noStrike">
               <a:latin typeface="Arial"/>
             </a:endParaRPr>
           </a:p>
@@ -2585,7 +2427,7 @@
         <p:spPr>
           <a:xfrm>
             <a:off x="1097280" y="286560"/>
-            <a:ext cx="10057680" cy="6723000"/>
+            <a:ext cx="10057320" cy="6721200"/>
           </a:xfrm>
           <a:prstGeom prst="rect">
             <a:avLst/>
@@ -2636,7 +2478,7 @@
         <p:spPr>
           <a:xfrm>
             <a:off x="1097280" y="286560"/>
-            <a:ext cx="10057680" cy="1450080"/>
+            <a:ext cx="10057320" cy="1449720"/>
           </a:xfrm>
           <a:prstGeom prst="rect">
             <a:avLst/>
@@ -2645,10 +2487,8 @@
         <p:txBody>
           <a:bodyPr lIns="0" rIns="0" tIns="0" bIns="0" anchor="ctr"/>
           <a:p>
-            <a:endParaRPr b="0" lang="en-US" sz="1800" spc="-1" strike="noStrike">
-              <a:solidFill>
-                <a:srgbClr val="000000"/>
-              </a:solidFill>
+            <a:pPr algn="ctr"/>
+            <a:endParaRPr b="0" lang="en-US" sz="4400" spc="-1" strike="noStrike">
               <a:latin typeface="Arial"/>
             </a:endParaRPr>
           </a:p>
@@ -2678,10 +2518,7 @@
             <a:normAutofit/>
           </a:bodyPr>
           <a:p>
-            <a:endParaRPr b="0" lang="en-US" sz="2800" spc="-1" strike="noStrike">
-              <a:solidFill>
-                <a:srgbClr val="000000"/>
-              </a:solidFill>
+            <a:endParaRPr b="0" lang="en-US" sz="3200" spc="-1" strike="noStrike">
               <a:latin typeface="Arial"/>
             </a:endParaRPr>
           </a:p>
@@ -2700,7 +2537,7 @@
         <p:spPr>
           <a:xfrm>
             <a:off x="6231960" y="1604520"/>
-            <a:ext cx="5354280" cy="3977280"/>
+            <a:ext cx="5354280" cy="3976920"/>
           </a:xfrm>
           <a:prstGeom prst="rect">
             <a:avLst/>
@@ -2711,10 +2548,7 @@
             <a:normAutofit/>
           </a:bodyPr>
           <a:p>
-            <a:endParaRPr b="0" lang="en-US" sz="2800" spc="-1" strike="noStrike">
-              <a:solidFill>
-                <a:srgbClr val="000000"/>
-              </a:solidFill>
+            <a:endParaRPr b="0" lang="en-US" sz="3200" spc="-1" strike="noStrike">
               <a:latin typeface="Arial"/>
             </a:endParaRPr>
           </a:p>
@@ -2744,10 +2578,7 @@
             <a:normAutofit/>
           </a:bodyPr>
           <a:p>
-            <a:endParaRPr b="0" lang="en-US" sz="2800" spc="-1" strike="noStrike">
-              <a:solidFill>
-                <a:srgbClr val="000000"/>
-              </a:solidFill>
+            <a:endParaRPr b="0" lang="en-US" sz="3200" spc="-1" strike="noStrike">
               <a:latin typeface="Arial"/>
             </a:endParaRPr>
           </a:p>
@@ -2788,7 +2619,7 @@
         <p:spPr>
           <a:xfrm>
             <a:off x="1097280" y="286560"/>
-            <a:ext cx="10057680" cy="1450080"/>
+            <a:ext cx="10057320" cy="1449720"/>
           </a:xfrm>
           <a:prstGeom prst="rect">
             <a:avLst/>
@@ -2797,10 +2628,8 @@
         <p:txBody>
           <a:bodyPr lIns="0" rIns="0" tIns="0" bIns="0" anchor="ctr"/>
           <a:p>
-            <a:endParaRPr b="0" lang="en-US" sz="1800" spc="-1" strike="noStrike">
-              <a:solidFill>
-                <a:srgbClr val="000000"/>
-              </a:solidFill>
+            <a:pPr algn="ctr"/>
+            <a:endParaRPr b="0" lang="en-US" sz="4400" spc="-1" strike="noStrike">
               <a:latin typeface="Arial"/>
             </a:endParaRPr>
           </a:p>
@@ -2819,7 +2648,7 @@
         <p:spPr>
           <a:xfrm>
             <a:off x="609480" y="1604520"/>
-            <a:ext cx="5354280" cy="3977280"/>
+            <a:ext cx="5354280" cy="3976920"/>
           </a:xfrm>
           <a:prstGeom prst="rect">
             <a:avLst/>
@@ -2830,10 +2659,7 @@
             <a:normAutofit/>
           </a:bodyPr>
           <a:p>
-            <a:endParaRPr b="0" lang="en-US" sz="2800" spc="-1" strike="noStrike">
-              <a:solidFill>
-                <a:srgbClr val="000000"/>
-              </a:solidFill>
+            <a:endParaRPr b="0" lang="en-US" sz="3200" spc="-1" strike="noStrike">
               <a:latin typeface="Arial"/>
             </a:endParaRPr>
           </a:p>
@@ -2863,10 +2689,7 @@
             <a:normAutofit/>
           </a:bodyPr>
           <a:p>
-            <a:endParaRPr b="0" lang="en-US" sz="2800" spc="-1" strike="noStrike">
-              <a:solidFill>
-                <a:srgbClr val="000000"/>
-              </a:solidFill>
+            <a:endParaRPr b="0" lang="en-US" sz="3200" spc="-1" strike="noStrike">
               <a:latin typeface="Arial"/>
             </a:endParaRPr>
           </a:p>
@@ -2896,10 +2719,7 @@
             <a:normAutofit/>
           </a:bodyPr>
           <a:p>
-            <a:endParaRPr b="0" lang="en-US" sz="2800" spc="-1" strike="noStrike">
-              <a:solidFill>
-                <a:srgbClr val="000000"/>
-              </a:solidFill>
+            <a:endParaRPr b="0" lang="en-US" sz="3200" spc="-1" strike="noStrike">
               <a:latin typeface="Arial"/>
             </a:endParaRPr>
           </a:p>
@@ -2940,7 +2760,7 @@
         <p:spPr>
           <a:xfrm>
             <a:off x="1097280" y="286560"/>
-            <a:ext cx="10057680" cy="1450080"/>
+            <a:ext cx="10057320" cy="1449720"/>
           </a:xfrm>
           <a:prstGeom prst="rect">
             <a:avLst/>
@@ -2949,10 +2769,8 @@
         <p:txBody>
           <a:bodyPr lIns="0" rIns="0" tIns="0" bIns="0" anchor="ctr"/>
           <a:p>
-            <a:endParaRPr b="0" lang="en-US" sz="1800" spc="-1" strike="noStrike">
-              <a:solidFill>
-                <a:srgbClr val="000000"/>
-              </a:solidFill>
+            <a:pPr algn="ctr"/>
+            <a:endParaRPr b="0" lang="en-US" sz="4400" spc="-1" strike="noStrike">
               <a:latin typeface="Arial"/>
             </a:endParaRPr>
           </a:p>
@@ -2982,10 +2800,7 @@
             <a:normAutofit/>
           </a:bodyPr>
           <a:p>
-            <a:endParaRPr b="0" lang="en-US" sz="2800" spc="-1" strike="noStrike">
-              <a:solidFill>
-                <a:srgbClr val="000000"/>
-              </a:solidFill>
+            <a:endParaRPr b="0" lang="en-US" sz="3200" spc="-1" strike="noStrike">
               <a:latin typeface="Arial"/>
             </a:endParaRPr>
           </a:p>
@@ -3015,10 +2830,7 @@
             <a:normAutofit/>
           </a:bodyPr>
           <a:p>
-            <a:endParaRPr b="0" lang="en-US" sz="2800" spc="-1" strike="noStrike">
-              <a:solidFill>
-                <a:srgbClr val="000000"/>
-              </a:solidFill>
+            <a:endParaRPr b="0" lang="en-US" sz="3200" spc="-1" strike="noStrike">
               <a:latin typeface="Arial"/>
             </a:endParaRPr>
           </a:p>
@@ -3037,7 +2849,7 @@
         <p:spPr>
           <a:xfrm>
             <a:off x="609480" y="3682080"/>
-            <a:ext cx="10972440" cy="1896840"/>
+            <a:ext cx="10972080" cy="1896840"/>
           </a:xfrm>
           <a:prstGeom prst="rect">
             <a:avLst/>
@@ -3048,10 +2860,7 @@
             <a:normAutofit/>
           </a:bodyPr>
           <a:p>
-            <a:endParaRPr b="0" lang="en-US" sz="2800" spc="-1" strike="noStrike">
-              <a:solidFill>
-                <a:srgbClr val="000000"/>
-              </a:solidFill>
+            <a:endParaRPr b="0" lang="en-US" sz="3200" spc="-1" strike="noStrike">
               <a:latin typeface="Arial"/>
             </a:endParaRPr>
           </a:p>
@@ -3092,7 +2901,7 @@
         <p:spPr>
           <a:xfrm>
             <a:off x="1097280" y="286560"/>
-            <a:ext cx="10057680" cy="1450080"/>
+            <a:ext cx="10057320" cy="1449720"/>
           </a:xfrm>
           <a:prstGeom prst="rect">
             <a:avLst/>
@@ -3101,10 +2910,8 @@
         <p:txBody>
           <a:bodyPr lIns="0" rIns="0" tIns="0" bIns="0" anchor="ctr"/>
           <a:p>
-            <a:endParaRPr b="0" lang="en-US" sz="1800" spc="-1" strike="noStrike">
-              <a:solidFill>
-                <a:srgbClr val="000000"/>
-              </a:solidFill>
+            <a:pPr algn="ctr"/>
+            <a:endParaRPr b="0" lang="en-US" sz="4400" spc="-1" strike="noStrike">
               <a:latin typeface="Arial"/>
             </a:endParaRPr>
           </a:p>
@@ -3123,7 +2930,7 @@
         <p:spPr>
           <a:xfrm>
             <a:off x="609480" y="1604520"/>
-            <a:ext cx="10972440" cy="1896840"/>
+            <a:ext cx="10972080" cy="1896840"/>
           </a:xfrm>
           <a:prstGeom prst="rect">
             <a:avLst/>
@@ -3134,10 +2941,7 @@
             <a:normAutofit/>
           </a:bodyPr>
           <a:p>
-            <a:endParaRPr b="0" lang="en-US" sz="2800" spc="-1" strike="noStrike">
-              <a:solidFill>
-                <a:srgbClr val="000000"/>
-              </a:solidFill>
+            <a:endParaRPr b="0" lang="en-US" sz="3200" spc="-1" strike="noStrike">
               <a:latin typeface="Arial"/>
             </a:endParaRPr>
           </a:p>
@@ -3156,7 +2960,7 @@
         <p:spPr>
           <a:xfrm>
             <a:off x="609480" y="3682080"/>
-            <a:ext cx="10972440" cy="1896840"/>
+            <a:ext cx="10972080" cy="1896840"/>
           </a:xfrm>
           <a:prstGeom prst="rect">
             <a:avLst/>
@@ -3167,10 +2971,7 @@
             <a:normAutofit/>
           </a:bodyPr>
           <a:p>
-            <a:endParaRPr b="0" lang="en-US" sz="2800" spc="-1" strike="noStrike">
-              <a:solidFill>
-                <a:srgbClr val="000000"/>
-              </a:solidFill>
+            <a:endParaRPr b="0" lang="en-US" sz="3200" spc="-1" strike="noStrike">
               <a:latin typeface="Arial"/>
             </a:endParaRPr>
           </a:p>
@@ -3211,7 +3012,7 @@
         <p:spPr>
           <a:xfrm>
             <a:off x="1097280" y="286560"/>
-            <a:ext cx="10057680" cy="1450080"/>
+            <a:ext cx="10057320" cy="1449720"/>
           </a:xfrm>
           <a:prstGeom prst="rect">
             <a:avLst/>
@@ -3220,10 +3021,8 @@
         <p:txBody>
           <a:bodyPr lIns="0" rIns="0" tIns="0" bIns="0" anchor="ctr"/>
           <a:p>
-            <a:endParaRPr b="0" lang="en-US" sz="1800" spc="-1" strike="noStrike">
-              <a:solidFill>
-                <a:srgbClr val="000000"/>
-              </a:solidFill>
+            <a:pPr algn="ctr"/>
+            <a:endParaRPr b="0" lang="en-US" sz="4400" spc="-1" strike="noStrike">
               <a:latin typeface="Arial"/>
             </a:endParaRPr>
           </a:p>
@@ -3253,10 +3052,7 @@
             <a:normAutofit/>
           </a:bodyPr>
           <a:p>
-            <a:endParaRPr b="0" lang="en-US" sz="2800" spc="-1" strike="noStrike">
-              <a:solidFill>
-                <a:srgbClr val="000000"/>
-              </a:solidFill>
+            <a:endParaRPr b="0" lang="en-US" sz="3200" spc="-1" strike="noStrike">
               <a:latin typeface="Arial"/>
             </a:endParaRPr>
           </a:p>
@@ -3286,10 +3082,7 @@
             <a:normAutofit/>
           </a:bodyPr>
           <a:p>
-            <a:endParaRPr b="0" lang="en-US" sz="2800" spc="-1" strike="noStrike">
-              <a:solidFill>
-                <a:srgbClr val="000000"/>
-              </a:solidFill>
+            <a:endParaRPr b="0" lang="en-US" sz="3200" spc="-1" strike="noStrike">
               <a:latin typeface="Arial"/>
             </a:endParaRPr>
           </a:p>
@@ -3319,10 +3112,7 @@
             <a:normAutofit/>
           </a:bodyPr>
           <a:p>
-            <a:endParaRPr b="0" lang="en-US" sz="2800" spc="-1" strike="noStrike">
-              <a:solidFill>
-                <a:srgbClr val="000000"/>
-              </a:solidFill>
+            <a:endParaRPr b="0" lang="en-US" sz="3200" spc="-1" strike="noStrike">
               <a:latin typeface="Arial"/>
             </a:endParaRPr>
           </a:p>
@@ -3352,10 +3142,7 @@
             <a:normAutofit/>
           </a:bodyPr>
           <a:p>
-            <a:endParaRPr b="0" lang="en-US" sz="2800" spc="-1" strike="noStrike">
-              <a:solidFill>
-                <a:srgbClr val="000000"/>
-              </a:solidFill>
+            <a:endParaRPr b="0" lang="en-US" sz="3200" spc="-1" strike="noStrike">
               <a:latin typeface="Arial"/>
             </a:endParaRPr>
           </a:p>
@@ -3396,7 +3183,7 @@
         <p:spPr>
           <a:xfrm>
             <a:off x="1097280" y="286560"/>
-            <a:ext cx="10057680" cy="1450080"/>
+            <a:ext cx="10057320" cy="1449720"/>
           </a:xfrm>
           <a:prstGeom prst="rect">
             <a:avLst/>
@@ -3405,10 +3192,8 @@
         <p:txBody>
           <a:bodyPr lIns="0" rIns="0" tIns="0" bIns="0" anchor="ctr"/>
           <a:p>
-            <a:endParaRPr b="0" lang="en-US" sz="1800" spc="-1" strike="noStrike">
-              <a:solidFill>
-                <a:srgbClr val="000000"/>
-              </a:solidFill>
+            <a:pPr algn="ctr"/>
+            <a:endParaRPr b="0" lang="en-US" sz="4400" spc="-1" strike="noStrike">
               <a:latin typeface="Arial"/>
             </a:endParaRPr>
           </a:p>
@@ -3427,7 +3212,7 @@
         <p:spPr>
           <a:xfrm>
             <a:off x="609480" y="1604520"/>
-            <a:ext cx="3533040" cy="1896840"/>
+            <a:ext cx="3532680" cy="1896840"/>
           </a:xfrm>
           <a:prstGeom prst="rect">
             <a:avLst/>
@@ -3438,10 +3223,7 @@
             <a:normAutofit/>
           </a:bodyPr>
           <a:p>
-            <a:endParaRPr b="0" lang="en-US" sz="2800" spc="-1" strike="noStrike">
-              <a:solidFill>
-                <a:srgbClr val="000000"/>
-              </a:solidFill>
+            <a:endParaRPr b="0" lang="en-US" sz="3200" spc="-1" strike="noStrike">
               <a:latin typeface="Arial"/>
             </a:endParaRPr>
           </a:p>
@@ -3459,8 +3241,8 @@
         </p:nvSpPr>
         <p:spPr>
           <a:xfrm>
-            <a:off x="4319640" y="1604520"/>
-            <a:ext cx="3533040" cy="1896840"/>
+            <a:off x="4319280" y="1604520"/>
+            <a:ext cx="3532680" cy="1896840"/>
           </a:xfrm>
           <a:prstGeom prst="rect">
             <a:avLst/>
@@ -3471,10 +3253,7 @@
             <a:normAutofit/>
           </a:bodyPr>
           <a:p>
-            <a:endParaRPr b="0" lang="en-US" sz="2800" spc="-1" strike="noStrike">
-              <a:solidFill>
-                <a:srgbClr val="000000"/>
-              </a:solidFill>
+            <a:endParaRPr b="0" lang="en-US" sz="3200" spc="-1" strike="noStrike">
               <a:latin typeface="Arial"/>
             </a:endParaRPr>
           </a:p>
@@ -3492,8 +3271,8 @@
         </p:nvSpPr>
         <p:spPr>
           <a:xfrm>
-            <a:off x="8029800" y="1604520"/>
-            <a:ext cx="3533040" cy="1896840"/>
+            <a:off x="8028720" y="1604520"/>
+            <a:ext cx="3532680" cy="1896840"/>
           </a:xfrm>
           <a:prstGeom prst="rect">
             <a:avLst/>
@@ -3504,10 +3283,7 @@
             <a:normAutofit/>
           </a:bodyPr>
           <a:p>
-            <a:endParaRPr b="0" lang="en-US" sz="2800" spc="-1" strike="noStrike">
-              <a:solidFill>
-                <a:srgbClr val="000000"/>
-              </a:solidFill>
+            <a:endParaRPr b="0" lang="en-US" sz="3200" spc="-1" strike="noStrike">
               <a:latin typeface="Arial"/>
             </a:endParaRPr>
           </a:p>
@@ -3526,7 +3302,7 @@
         <p:spPr>
           <a:xfrm>
             <a:off x="609480" y="3682080"/>
-            <a:ext cx="3533040" cy="1896840"/>
+            <a:ext cx="3532680" cy="1896840"/>
           </a:xfrm>
           <a:prstGeom prst="rect">
             <a:avLst/>
@@ -3537,10 +3313,7 @@
             <a:normAutofit/>
           </a:bodyPr>
           <a:p>
-            <a:endParaRPr b="0" lang="en-US" sz="2800" spc="-1" strike="noStrike">
-              <a:solidFill>
-                <a:srgbClr val="000000"/>
-              </a:solidFill>
+            <a:endParaRPr b="0" lang="en-US" sz="3200" spc="-1" strike="noStrike">
               <a:latin typeface="Arial"/>
             </a:endParaRPr>
           </a:p>
@@ -3558,8 +3331,8 @@
         </p:nvSpPr>
         <p:spPr>
           <a:xfrm>
-            <a:off x="4319640" y="3682080"/>
-            <a:ext cx="3533040" cy="1896840"/>
+            <a:off x="4319280" y="3682080"/>
+            <a:ext cx="3532680" cy="1896840"/>
           </a:xfrm>
           <a:prstGeom prst="rect">
             <a:avLst/>
@@ -3570,10 +3343,7 @@
             <a:normAutofit/>
           </a:bodyPr>
           <a:p>
-            <a:endParaRPr b="0" lang="en-US" sz="2800" spc="-1" strike="noStrike">
-              <a:solidFill>
-                <a:srgbClr val="000000"/>
-              </a:solidFill>
+            <a:endParaRPr b="0" lang="en-US" sz="3200" spc="-1" strike="noStrike">
               <a:latin typeface="Arial"/>
             </a:endParaRPr>
           </a:p>
@@ -3591,8 +3361,8 @@
         </p:nvSpPr>
         <p:spPr>
           <a:xfrm>
-            <a:off x="8029800" y="3682080"/>
-            <a:ext cx="3533040" cy="1896840"/>
+            <a:off x="8028720" y="3682080"/>
+            <a:ext cx="3532680" cy="1896840"/>
           </a:xfrm>
           <a:prstGeom prst="rect">
             <a:avLst/>
@@ -3603,10 +3373,7 @@
             <a:normAutofit/>
           </a:bodyPr>
           <a:p>
-            <a:endParaRPr b="0" lang="en-US" sz="2800" spc="-1" strike="noStrike">
-              <a:solidFill>
-                <a:srgbClr val="000000"/>
-              </a:solidFill>
+            <a:endParaRPr b="0" lang="en-US" sz="3200" spc="-1" strike="noStrike">
               <a:latin typeface="Arial"/>
             </a:endParaRPr>
           </a:p>
@@ -3647,7 +3414,7 @@
         <p:spPr>
           <a:xfrm>
             <a:off x="1097280" y="286560"/>
-            <a:ext cx="10057680" cy="1450080"/>
+            <a:ext cx="10057320" cy="1449720"/>
           </a:xfrm>
           <a:prstGeom prst="rect">
             <a:avLst/>
@@ -3656,10 +3423,8 @@
         <p:txBody>
           <a:bodyPr lIns="0" rIns="0" tIns="0" bIns="0" anchor="ctr"/>
           <a:p>
-            <a:endParaRPr b="0" lang="en-US" sz="1800" spc="-1" strike="noStrike">
-              <a:solidFill>
-                <a:srgbClr val="000000"/>
-              </a:solidFill>
+            <a:pPr algn="ctr"/>
+            <a:endParaRPr b="0" lang="en-US" sz="4400" spc="-1" strike="noStrike">
               <a:latin typeface="Arial"/>
             </a:endParaRPr>
           </a:p>
@@ -3678,7 +3443,7 @@
         <p:spPr>
           <a:xfrm>
             <a:off x="609480" y="1604520"/>
-            <a:ext cx="5354280" cy="3977280"/>
+            <a:ext cx="5354280" cy="3976920"/>
           </a:xfrm>
           <a:prstGeom prst="rect">
             <a:avLst/>
@@ -3689,10 +3454,7 @@
             <a:normAutofit/>
           </a:bodyPr>
           <a:p>
-            <a:endParaRPr b="0" lang="en-US" sz="2800" spc="-1" strike="noStrike">
-              <a:solidFill>
-                <a:srgbClr val="000000"/>
-              </a:solidFill>
+            <a:endParaRPr b="0" lang="en-US" sz="3200" spc="-1" strike="noStrike">
               <a:latin typeface="Arial"/>
             </a:endParaRPr>
           </a:p>
@@ -3711,7 +3473,7 @@
         <p:spPr>
           <a:xfrm>
             <a:off x="6231960" y="1604520"/>
-            <a:ext cx="5354280" cy="3977280"/>
+            <a:ext cx="5354280" cy="3976920"/>
           </a:xfrm>
           <a:prstGeom prst="rect">
             <a:avLst/>
@@ -3722,10 +3484,7 @@
             <a:normAutofit/>
           </a:bodyPr>
           <a:p>
-            <a:endParaRPr b="0" lang="en-US" sz="2800" spc="-1" strike="noStrike">
-              <a:solidFill>
-                <a:srgbClr val="000000"/>
-              </a:solidFill>
+            <a:endParaRPr b="0" lang="en-US" sz="3200" spc="-1" strike="noStrike">
               <a:latin typeface="Arial"/>
             </a:endParaRPr>
           </a:p>
@@ -3766,7 +3525,7 @@
         <p:spPr>
           <a:xfrm>
             <a:off x="1097280" y="286560"/>
-            <a:ext cx="10057680" cy="1450080"/>
+            <a:ext cx="10057320" cy="1449720"/>
           </a:xfrm>
           <a:prstGeom prst="rect">
             <a:avLst/>
@@ -3775,10 +3534,8 @@
         <p:txBody>
           <a:bodyPr lIns="0" rIns="0" tIns="0" bIns="0" anchor="ctr"/>
           <a:p>
-            <a:endParaRPr b="0" lang="en-US" sz="1800" spc="-1" strike="noStrike">
-              <a:solidFill>
-                <a:srgbClr val="000000"/>
-              </a:solidFill>
+            <a:pPr algn="ctr"/>
+            <a:endParaRPr b="0" lang="en-US" sz="4400" spc="-1" strike="noStrike">
               <a:latin typeface="Arial"/>
             </a:endParaRPr>
           </a:p>
@@ -3819,7 +3576,7 @@
         <p:spPr>
           <a:xfrm>
             <a:off x="1097280" y="286560"/>
-            <a:ext cx="10057680" cy="6723000"/>
+            <a:ext cx="10057320" cy="6721200"/>
           </a:xfrm>
           <a:prstGeom prst="rect">
             <a:avLst/>
@@ -3870,7 +3627,7 @@
         <p:spPr>
           <a:xfrm>
             <a:off x="1097280" y="286560"/>
-            <a:ext cx="10057680" cy="1450080"/>
+            <a:ext cx="10057320" cy="1449720"/>
           </a:xfrm>
           <a:prstGeom prst="rect">
             <a:avLst/>
@@ -3879,10 +3636,8 @@
         <p:txBody>
           <a:bodyPr lIns="0" rIns="0" tIns="0" bIns="0" anchor="ctr"/>
           <a:p>
-            <a:endParaRPr b="0" lang="en-US" sz="1800" spc="-1" strike="noStrike">
-              <a:solidFill>
-                <a:srgbClr val="000000"/>
-              </a:solidFill>
+            <a:pPr algn="ctr"/>
+            <a:endParaRPr b="0" lang="en-US" sz="4400" spc="-1" strike="noStrike">
               <a:latin typeface="Arial"/>
             </a:endParaRPr>
           </a:p>
@@ -3912,10 +3667,7 @@
             <a:normAutofit/>
           </a:bodyPr>
           <a:p>
-            <a:endParaRPr b="0" lang="en-US" sz="2800" spc="-1" strike="noStrike">
-              <a:solidFill>
-                <a:srgbClr val="000000"/>
-              </a:solidFill>
+            <a:endParaRPr b="0" lang="en-US" sz="3200" spc="-1" strike="noStrike">
               <a:latin typeface="Arial"/>
             </a:endParaRPr>
           </a:p>
@@ -3934,7 +3686,7 @@
         <p:spPr>
           <a:xfrm>
             <a:off x="6231960" y="1604520"/>
-            <a:ext cx="5354280" cy="3977280"/>
+            <a:ext cx="5354280" cy="3976920"/>
           </a:xfrm>
           <a:prstGeom prst="rect">
             <a:avLst/>
@@ -3945,10 +3697,7 @@
             <a:normAutofit/>
           </a:bodyPr>
           <a:p>
-            <a:endParaRPr b="0" lang="en-US" sz="2800" spc="-1" strike="noStrike">
-              <a:solidFill>
-                <a:srgbClr val="000000"/>
-              </a:solidFill>
+            <a:endParaRPr b="0" lang="en-US" sz="3200" spc="-1" strike="noStrike">
               <a:latin typeface="Arial"/>
             </a:endParaRPr>
           </a:p>
@@ -3978,10 +3727,7 @@
             <a:normAutofit/>
           </a:bodyPr>
           <a:p>
-            <a:endParaRPr b="0" lang="en-US" sz="2800" spc="-1" strike="noStrike">
-              <a:solidFill>
-                <a:srgbClr val="000000"/>
-              </a:solidFill>
+            <a:endParaRPr b="0" lang="en-US" sz="3200" spc="-1" strike="noStrike">
               <a:latin typeface="Arial"/>
             </a:endParaRPr>
           </a:p>
@@ -4022,7 +3768,7 @@
         <p:spPr>
           <a:xfrm>
             <a:off x="1097280" y="286560"/>
-            <a:ext cx="10057680" cy="1450080"/>
+            <a:ext cx="10057320" cy="1449720"/>
           </a:xfrm>
           <a:prstGeom prst="rect">
             <a:avLst/>
@@ -4031,10 +3777,8 @@
         <p:txBody>
           <a:bodyPr lIns="0" rIns="0" tIns="0" bIns="0" anchor="ctr"/>
           <a:p>
-            <a:endParaRPr b="0" lang="en-US" sz="1800" spc="-1" strike="noStrike">
-              <a:solidFill>
-                <a:srgbClr val="000000"/>
-              </a:solidFill>
+            <a:pPr algn="ctr"/>
+            <a:endParaRPr b="0" lang="en-US" sz="4400" spc="-1" strike="noStrike">
               <a:latin typeface="Arial"/>
             </a:endParaRPr>
           </a:p>
@@ -4053,7 +3797,7 @@
         <p:spPr>
           <a:xfrm>
             <a:off x="609480" y="1604520"/>
-            <a:ext cx="5354280" cy="3977280"/>
+            <a:ext cx="5354280" cy="3976920"/>
           </a:xfrm>
           <a:prstGeom prst="rect">
             <a:avLst/>
@@ -4064,10 +3808,7 @@
             <a:normAutofit/>
           </a:bodyPr>
           <a:p>
-            <a:endParaRPr b="0" lang="en-US" sz="2800" spc="-1" strike="noStrike">
-              <a:solidFill>
-                <a:srgbClr val="000000"/>
-              </a:solidFill>
+            <a:endParaRPr b="0" lang="en-US" sz="3200" spc="-1" strike="noStrike">
               <a:latin typeface="Arial"/>
             </a:endParaRPr>
           </a:p>
@@ -4097,10 +3838,7 @@
             <a:normAutofit/>
           </a:bodyPr>
           <a:p>
-            <a:endParaRPr b="0" lang="en-US" sz="2800" spc="-1" strike="noStrike">
-              <a:solidFill>
-                <a:srgbClr val="000000"/>
-              </a:solidFill>
+            <a:endParaRPr b="0" lang="en-US" sz="3200" spc="-1" strike="noStrike">
               <a:latin typeface="Arial"/>
             </a:endParaRPr>
           </a:p>
@@ -4130,10 +3868,7 @@
             <a:normAutofit/>
           </a:bodyPr>
           <a:p>
-            <a:endParaRPr b="0" lang="en-US" sz="2800" spc="-1" strike="noStrike">
-              <a:solidFill>
-                <a:srgbClr val="000000"/>
-              </a:solidFill>
+            <a:endParaRPr b="0" lang="en-US" sz="3200" spc="-1" strike="noStrike">
               <a:latin typeface="Arial"/>
             </a:endParaRPr>
           </a:p>
@@ -4174,7 +3909,7 @@
         <p:spPr>
           <a:xfrm>
             <a:off x="1097280" y="286560"/>
-            <a:ext cx="10057680" cy="1450080"/>
+            <a:ext cx="10057320" cy="1449720"/>
           </a:xfrm>
           <a:prstGeom prst="rect">
             <a:avLst/>
@@ -4183,10 +3918,8 @@
         <p:txBody>
           <a:bodyPr lIns="0" rIns="0" tIns="0" bIns="0" anchor="ctr"/>
           <a:p>
-            <a:endParaRPr b="0" lang="en-US" sz="1800" spc="-1" strike="noStrike">
-              <a:solidFill>
-                <a:srgbClr val="000000"/>
-              </a:solidFill>
+            <a:pPr algn="ctr"/>
+            <a:endParaRPr b="0" lang="en-US" sz="4400" spc="-1" strike="noStrike">
               <a:latin typeface="Arial"/>
             </a:endParaRPr>
           </a:p>
@@ -4216,10 +3949,7 @@
             <a:normAutofit/>
           </a:bodyPr>
           <a:p>
-            <a:endParaRPr b="0" lang="en-US" sz="2800" spc="-1" strike="noStrike">
-              <a:solidFill>
-                <a:srgbClr val="000000"/>
-              </a:solidFill>
+            <a:endParaRPr b="0" lang="en-US" sz="3200" spc="-1" strike="noStrike">
               <a:latin typeface="Arial"/>
             </a:endParaRPr>
           </a:p>
@@ -4249,10 +3979,7 @@
             <a:normAutofit/>
           </a:bodyPr>
           <a:p>
-            <a:endParaRPr b="0" lang="en-US" sz="2800" spc="-1" strike="noStrike">
-              <a:solidFill>
-                <a:srgbClr val="000000"/>
-              </a:solidFill>
+            <a:endParaRPr b="0" lang="en-US" sz="3200" spc="-1" strike="noStrike">
               <a:latin typeface="Arial"/>
             </a:endParaRPr>
           </a:p>
@@ -4271,7 +3998,7 @@
         <p:spPr>
           <a:xfrm>
             <a:off x="609480" y="3682080"/>
-            <a:ext cx="10972440" cy="1896840"/>
+            <a:ext cx="10972080" cy="1896840"/>
           </a:xfrm>
           <a:prstGeom prst="rect">
             <a:avLst/>
@@ -4282,10 +4009,7 @@
             <a:normAutofit/>
           </a:bodyPr>
           <a:p>
-            <a:endParaRPr b="0" lang="en-US" sz="2800" spc="-1" strike="noStrike">
-              <a:solidFill>
-                <a:srgbClr val="000000"/>
-              </a:solidFill>
+            <a:endParaRPr b="0" lang="en-US" sz="3200" spc="-1" strike="noStrike">
               <a:latin typeface="Arial"/>
             </a:endParaRPr>
           </a:p>
@@ -4329,7 +4053,7 @@
         <p:spPr>
           <a:xfrm>
             <a:off x="0" y="6400800"/>
-            <a:ext cx="12191400" cy="456480"/>
+            <a:ext cx="12191040" cy="456120"/>
           </a:xfrm>
           <a:prstGeom prst="rect">
             <a:avLst/>
@@ -4357,7 +4081,7 @@
         <p:spPr>
           <a:xfrm>
             <a:off x="0" y="6334200"/>
-            <a:ext cx="12191400" cy="65160"/>
+            <a:ext cx="12191040" cy="64800"/>
           </a:xfrm>
           <a:prstGeom prst="rect">
             <a:avLst/>
@@ -4413,7 +4137,7 @@
         <p:spPr>
           <a:xfrm>
             <a:off x="3240" y="6400800"/>
-            <a:ext cx="12188160" cy="456480"/>
+            <a:ext cx="12187800" cy="456120"/>
           </a:xfrm>
           <a:prstGeom prst="rect">
             <a:avLst/>
@@ -4441,7 +4165,7 @@
         <p:spPr>
           <a:xfrm>
             <a:off x="0" y="6334200"/>
-            <a:ext cx="12188160" cy="63360"/>
+            <a:ext cx="12187800" cy="63000"/>
           </a:xfrm>
           <a:prstGeom prst="rect">
             <a:avLst/>
@@ -4501,7 +4225,7 @@
         <p:spPr>
           <a:xfrm>
             <a:off x="1097280" y="286560"/>
-            <a:ext cx="10057680" cy="1450080"/>
+            <a:ext cx="10057320" cy="1449720"/>
           </a:xfrm>
           <a:prstGeom prst="rect">
             <a:avLst/>
@@ -4511,18 +4235,12 @@
           <a:bodyPr lIns="0" rIns="0" tIns="0" bIns="0" anchor="ctr"/>
           <a:p>
             <a:r>
-              <a:rPr b="0" lang="en-US" sz="4400" spc="-1" strike="noStrike">
-                <a:solidFill>
-                  <a:srgbClr val="000000"/>
-                </a:solidFill>
+              <a:rPr b="0" lang="en-US" sz="1800" spc="-1" strike="noStrike">
                 <a:latin typeface="Arial"/>
               </a:rPr>
               <a:t>Click to edit the title text format</a:t>
             </a:r>
-            <a:endParaRPr b="0" lang="en-US" sz="4400" spc="-1" strike="noStrike">
-              <a:solidFill>
-                <a:srgbClr val="000000"/>
-              </a:solidFill>
+            <a:endParaRPr b="0" lang="en-US" sz="1800" spc="-1" strike="noStrike">
               <a:latin typeface="Arial"/>
             </a:endParaRPr>
           </a:p>
@@ -4541,7 +4259,7 @@
         <p:spPr>
           <a:xfrm>
             <a:off x="609480" y="1604520"/>
-            <a:ext cx="10972440" cy="3977280"/>
+            <a:ext cx="10972080" cy="3976920"/>
           </a:xfrm>
           <a:prstGeom prst="rect">
             <a:avLst/>
@@ -4564,18 +4282,12 @@
               <a:buChar char=""/>
             </a:pPr>
             <a:r>
-              <a:rPr b="0" lang="en-US" sz="2800" spc="-1" strike="noStrike">
-                <a:solidFill>
-                  <a:srgbClr val="000000"/>
-                </a:solidFill>
+              <a:rPr b="0" lang="en-US" sz="1800" spc="-1" strike="noStrike">
                 <a:latin typeface="Arial"/>
               </a:rPr>
               <a:t>Click to edit the outline text format</a:t>
             </a:r>
-            <a:endParaRPr b="0" lang="en-US" sz="2800" spc="-1" strike="noStrike">
-              <a:solidFill>
-                <a:srgbClr val="000000"/>
-              </a:solidFill>
+            <a:endParaRPr b="0" lang="en-US" sz="1800" spc="-1" strike="noStrike">
               <a:latin typeface="Arial"/>
             </a:endParaRPr>
           </a:p>
@@ -4592,18 +4304,12 @@
               <a:buChar char=""/>
             </a:pPr>
             <a:r>
-              <a:rPr b="0" lang="en-US" sz="2000" spc="-1" strike="noStrike">
-                <a:solidFill>
-                  <a:srgbClr val="000000"/>
-                </a:solidFill>
+              <a:rPr b="0" lang="en-US" sz="1800" spc="-1" strike="noStrike">
                 <a:latin typeface="Arial"/>
               </a:rPr>
               <a:t>Second Outline Level</a:t>
             </a:r>
-            <a:endParaRPr b="0" lang="en-US" sz="2000" spc="-1" strike="noStrike">
-              <a:solidFill>
-                <a:srgbClr val="000000"/>
-              </a:solidFill>
+            <a:endParaRPr b="0" lang="en-US" sz="1800" spc="-1" strike="noStrike">
               <a:latin typeface="Arial"/>
             </a:endParaRPr>
           </a:p>
@@ -4621,17 +4327,11 @@
             </a:pPr>
             <a:r>
               <a:rPr b="0" lang="en-US" sz="1800" spc="-1" strike="noStrike">
-                <a:solidFill>
-                  <a:srgbClr val="000000"/>
-                </a:solidFill>
                 <a:latin typeface="Arial"/>
               </a:rPr>
               <a:t>Third Outline Level</a:t>
             </a:r>
             <a:endParaRPr b="0" lang="en-US" sz="1800" spc="-1" strike="noStrike">
-              <a:solidFill>
-                <a:srgbClr val="000000"/>
-              </a:solidFill>
               <a:latin typeface="Arial"/>
             </a:endParaRPr>
           </a:p>
@@ -4649,17 +4349,11 @@
             </a:pPr>
             <a:r>
               <a:rPr b="0" lang="en-US" sz="1800" spc="-1" strike="noStrike">
-                <a:solidFill>
-                  <a:srgbClr val="000000"/>
-                </a:solidFill>
                 <a:latin typeface="Arial"/>
               </a:rPr>
               <a:t>Fourth Outline Level</a:t>
             </a:r>
             <a:endParaRPr b="0" lang="en-US" sz="1800" spc="-1" strike="noStrike">
-              <a:solidFill>
-                <a:srgbClr val="000000"/>
-              </a:solidFill>
               <a:latin typeface="Arial"/>
             </a:endParaRPr>
           </a:p>
@@ -4676,18 +4370,12 @@
               <a:buChar char=""/>
             </a:pPr>
             <a:r>
-              <a:rPr b="0" lang="en-US" sz="2000" spc="-1" strike="noStrike">
-                <a:solidFill>
-                  <a:srgbClr val="000000"/>
-                </a:solidFill>
+              <a:rPr b="0" lang="en-US" sz="1800" spc="-1" strike="noStrike">
                 <a:latin typeface="Arial"/>
               </a:rPr>
               <a:t>Fifth Outline Level</a:t>
             </a:r>
-            <a:endParaRPr b="0" lang="en-US" sz="2000" spc="-1" strike="noStrike">
-              <a:solidFill>
-                <a:srgbClr val="000000"/>
-              </a:solidFill>
+            <a:endParaRPr b="0" lang="en-US" sz="1800" spc="-1" strike="noStrike">
               <a:latin typeface="Arial"/>
             </a:endParaRPr>
           </a:p>
@@ -4704,18 +4392,12 @@
               <a:buChar char=""/>
             </a:pPr>
             <a:r>
-              <a:rPr b="0" lang="en-US" sz="2000" spc="-1" strike="noStrike">
-                <a:solidFill>
-                  <a:srgbClr val="000000"/>
-                </a:solidFill>
+              <a:rPr b="0" lang="en-US" sz="1800" spc="-1" strike="noStrike">
                 <a:latin typeface="Arial"/>
               </a:rPr>
               <a:t>Sixth Outline Level</a:t>
             </a:r>
-            <a:endParaRPr b="0" lang="en-US" sz="2000" spc="-1" strike="noStrike">
-              <a:solidFill>
-                <a:srgbClr val="000000"/>
-              </a:solidFill>
+            <a:endParaRPr b="0" lang="en-US" sz="1800" spc="-1" strike="noStrike">
               <a:latin typeface="Arial"/>
             </a:endParaRPr>
           </a:p>
@@ -4732,18 +4414,12 @@
               <a:buChar char=""/>
             </a:pPr>
             <a:r>
-              <a:rPr b="0" lang="en-US" sz="2000" spc="-1" strike="noStrike">
-                <a:solidFill>
-                  <a:srgbClr val="000000"/>
-                </a:solidFill>
+              <a:rPr b="0" lang="en-US" sz="1800" spc="-1" strike="noStrike">
                 <a:latin typeface="Arial"/>
               </a:rPr>
               <a:t>Seventh Outline Level</a:t>
             </a:r>
-            <a:endParaRPr b="0" lang="en-US" sz="2000" spc="-1" strike="noStrike">
-              <a:solidFill>
-                <a:srgbClr val="000000"/>
-              </a:solidFill>
+            <a:endParaRPr b="0" lang="en-US" sz="1800" spc="-1" strike="noStrike">
               <a:latin typeface="Arial"/>
             </a:endParaRPr>
           </a:p>
@@ -4802,7 +4478,7 @@
         <p:spPr>
           <a:xfrm>
             <a:off x="0" y="6400800"/>
-            <a:ext cx="12191400" cy="456480"/>
+            <a:ext cx="12191040" cy="456120"/>
           </a:xfrm>
           <a:prstGeom prst="rect">
             <a:avLst/>
@@ -4830,7 +4506,7 @@
         <p:spPr>
           <a:xfrm>
             <a:off x="0" y="6334200"/>
-            <a:ext cx="12191400" cy="65160"/>
+            <a:ext cx="12191040" cy="64800"/>
           </a:xfrm>
           <a:prstGeom prst="rect">
             <a:avLst/>
@@ -4899,19 +4575,14 @@
         <p:txBody>
           <a:bodyPr lIns="0" rIns="0" tIns="0" bIns="0" anchor="ctr"/>
           <a:p>
+            <a:pPr algn="ctr"/>
             <a:r>
-              <a:rPr b="0" lang="en-US" sz="1800" spc="-1" strike="noStrike">
-                <a:solidFill>
-                  <a:srgbClr val="000000"/>
-                </a:solidFill>
+              <a:rPr b="0" lang="en-US" sz="4400" spc="-1" strike="noStrike">
                 <a:latin typeface="Arial"/>
               </a:rPr>
               <a:t>Click to edit the title text format</a:t>
             </a:r>
-            <a:endParaRPr b="0" lang="en-US" sz="1800" spc="-1" strike="noStrike">
-              <a:solidFill>
-                <a:srgbClr val="000000"/>
-              </a:solidFill>
+            <a:endParaRPr b="0" lang="en-US" sz="4400" spc="-1" strike="noStrike">
               <a:latin typeface="Arial"/>
             </a:endParaRPr>
           </a:p>
@@ -4953,18 +4624,12 @@
               <a:buChar char=""/>
             </a:pPr>
             <a:r>
-              <a:rPr b="0" lang="en-US" sz="2800" spc="-1" strike="noStrike">
-                <a:solidFill>
-                  <a:srgbClr val="000000"/>
-                </a:solidFill>
+              <a:rPr b="0" lang="en-US" sz="3200" spc="-1" strike="noStrike">
                 <a:latin typeface="Arial"/>
               </a:rPr>
               <a:t>Click to edit the outline text format</a:t>
             </a:r>
-            <a:endParaRPr b="0" lang="en-US" sz="2800" spc="-1" strike="noStrike">
-              <a:solidFill>
-                <a:srgbClr val="000000"/>
-              </a:solidFill>
+            <a:endParaRPr b="0" lang="en-US" sz="3200" spc="-1" strike="noStrike">
               <a:latin typeface="Arial"/>
             </a:endParaRPr>
           </a:p>
@@ -4981,18 +4646,12 @@
               <a:buChar char=""/>
             </a:pPr>
             <a:r>
-              <a:rPr b="0" lang="en-US" sz="2000" spc="-1" strike="noStrike">
-                <a:solidFill>
-                  <a:srgbClr val="000000"/>
-                </a:solidFill>
+              <a:rPr b="0" lang="en-US" sz="2800" spc="-1" strike="noStrike">
                 <a:latin typeface="Arial"/>
               </a:rPr>
               <a:t>Second Outline Level</a:t>
             </a:r>
-            <a:endParaRPr b="0" lang="en-US" sz="2000" spc="-1" strike="noStrike">
-              <a:solidFill>
-                <a:srgbClr val="000000"/>
-              </a:solidFill>
+            <a:endParaRPr b="0" lang="en-US" sz="2800" spc="-1" strike="noStrike">
               <a:latin typeface="Arial"/>
             </a:endParaRPr>
           </a:p>
@@ -5009,18 +4668,12 @@
               <a:buChar char=""/>
             </a:pPr>
             <a:r>
-              <a:rPr b="0" lang="en-US" sz="1800" spc="-1" strike="noStrike">
-                <a:solidFill>
-                  <a:srgbClr val="000000"/>
-                </a:solidFill>
+              <a:rPr b="0" lang="en-US" sz="2400" spc="-1" strike="noStrike">
                 <a:latin typeface="Arial"/>
               </a:rPr>
               <a:t>Third Outline Level</a:t>
             </a:r>
-            <a:endParaRPr b="0" lang="en-US" sz="1800" spc="-1" strike="noStrike">
-              <a:solidFill>
-                <a:srgbClr val="000000"/>
-              </a:solidFill>
+            <a:endParaRPr b="0" lang="en-US" sz="2400" spc="-1" strike="noStrike">
               <a:latin typeface="Arial"/>
             </a:endParaRPr>
           </a:p>
@@ -5037,18 +4690,12 @@
               <a:buChar char=""/>
             </a:pPr>
             <a:r>
-              <a:rPr b="0" lang="en-US" sz="1800" spc="-1" strike="noStrike">
-                <a:solidFill>
-                  <a:srgbClr val="000000"/>
-                </a:solidFill>
+              <a:rPr b="0" lang="en-US" sz="2000" spc="-1" strike="noStrike">
                 <a:latin typeface="Arial"/>
               </a:rPr>
               <a:t>Fourth Outline Level</a:t>
             </a:r>
-            <a:endParaRPr b="0" lang="en-US" sz="1800" spc="-1" strike="noStrike">
-              <a:solidFill>
-                <a:srgbClr val="000000"/>
-              </a:solidFill>
+            <a:endParaRPr b="0" lang="en-US" sz="2000" spc="-1" strike="noStrike">
               <a:latin typeface="Arial"/>
             </a:endParaRPr>
           </a:p>
@@ -5066,17 +4713,11 @@
             </a:pPr>
             <a:r>
               <a:rPr b="0" lang="en-US" sz="2000" spc="-1" strike="noStrike">
-                <a:solidFill>
-                  <a:srgbClr val="000000"/>
-                </a:solidFill>
                 <a:latin typeface="Arial"/>
               </a:rPr>
               <a:t>Fifth Outline Level</a:t>
             </a:r>
             <a:endParaRPr b="0" lang="en-US" sz="2000" spc="-1" strike="noStrike">
-              <a:solidFill>
-                <a:srgbClr val="000000"/>
-              </a:solidFill>
               <a:latin typeface="Arial"/>
             </a:endParaRPr>
           </a:p>
@@ -5094,17 +4735,11 @@
             </a:pPr>
             <a:r>
               <a:rPr b="0" lang="en-US" sz="2000" spc="-1" strike="noStrike">
-                <a:solidFill>
-                  <a:srgbClr val="000000"/>
-                </a:solidFill>
                 <a:latin typeface="Arial"/>
               </a:rPr>
               <a:t>Sixth Outline Level</a:t>
             </a:r>
             <a:endParaRPr b="0" lang="en-US" sz="2000" spc="-1" strike="noStrike">
-              <a:solidFill>
-                <a:srgbClr val="000000"/>
-              </a:solidFill>
               <a:latin typeface="Arial"/>
             </a:endParaRPr>
           </a:p>
@@ -5122,17 +4757,11 @@
             </a:pPr>
             <a:r>
               <a:rPr b="0" lang="en-US" sz="2000" spc="-1" strike="noStrike">
-                <a:solidFill>
-                  <a:srgbClr val="000000"/>
-                </a:solidFill>
                 <a:latin typeface="Arial"/>
               </a:rPr>
               <a:t>Seventh Outline Level</a:t>
             </a:r>
             <a:endParaRPr b="0" lang="en-US" sz="2000" spc="-1" strike="noStrike">
-              <a:solidFill>
-                <a:srgbClr val="000000"/>
-              </a:solidFill>
               <a:latin typeface="Arial"/>
             </a:endParaRPr>
           </a:p>
@@ -5191,7 +4820,7 @@
         <p:spPr>
           <a:xfrm>
             <a:off x="0" y="6400800"/>
-            <a:ext cx="12191400" cy="456480"/>
+            <a:ext cx="12191040" cy="456120"/>
           </a:xfrm>
           <a:prstGeom prst="rect">
             <a:avLst/>
@@ -5219,7 +4848,7 @@
         <p:spPr>
           <a:xfrm>
             <a:off x="0" y="6334200"/>
-            <a:ext cx="12191400" cy="65160"/>
+            <a:ext cx="12191040" cy="64800"/>
           </a:xfrm>
           <a:prstGeom prst="rect">
             <a:avLst/>
@@ -5279,7 +4908,7 @@
         <p:spPr>
           <a:xfrm>
             <a:off x="1097280" y="286560"/>
-            <a:ext cx="10057680" cy="1450080"/>
+            <a:ext cx="10057320" cy="1449720"/>
           </a:xfrm>
           <a:prstGeom prst="rect">
             <a:avLst/>
@@ -5289,18 +4918,12 @@
           <a:bodyPr lIns="0" rIns="0" tIns="0" bIns="0" anchor="ctr"/>
           <a:p>
             <a:r>
-              <a:rPr b="0" lang="en-US" sz="4400" spc="-1" strike="noStrike">
-                <a:solidFill>
-                  <a:srgbClr val="000000"/>
-                </a:solidFill>
+              <a:rPr b="0" lang="en-US" sz="1800" spc="-1" strike="noStrike">
                 <a:latin typeface="Arial"/>
               </a:rPr>
               <a:t>Click to edit the title text format</a:t>
             </a:r>
-            <a:endParaRPr b="0" lang="en-US" sz="4400" spc="-1" strike="noStrike">
-              <a:solidFill>
-                <a:srgbClr val="000000"/>
-              </a:solidFill>
+            <a:endParaRPr b="0" lang="en-US" sz="1800" spc="-1" strike="noStrike">
               <a:latin typeface="Arial"/>
             </a:endParaRPr>
           </a:p>
@@ -5319,7 +4942,7 @@
         <p:spPr>
           <a:xfrm>
             <a:off x="609480" y="1604520"/>
-            <a:ext cx="10972440" cy="3977280"/>
+            <a:ext cx="10972080" cy="3976920"/>
           </a:xfrm>
           <a:prstGeom prst="rect">
             <a:avLst/>
@@ -5342,18 +4965,12 @@
               <a:buChar char=""/>
             </a:pPr>
             <a:r>
-              <a:rPr b="0" lang="en-US" sz="2800" spc="-1" strike="noStrike">
-                <a:solidFill>
-                  <a:srgbClr val="000000"/>
-                </a:solidFill>
+              <a:rPr b="0" lang="en-US" sz="1800" spc="-1" strike="noStrike">
                 <a:latin typeface="Arial"/>
               </a:rPr>
               <a:t>Click to edit the outline text format</a:t>
             </a:r>
-            <a:endParaRPr b="0" lang="en-US" sz="2800" spc="-1" strike="noStrike">
-              <a:solidFill>
-                <a:srgbClr val="000000"/>
-              </a:solidFill>
+            <a:endParaRPr b="0" lang="en-US" sz="1800" spc="-1" strike="noStrike">
               <a:latin typeface="Arial"/>
             </a:endParaRPr>
           </a:p>
@@ -5370,18 +4987,12 @@
               <a:buChar char=""/>
             </a:pPr>
             <a:r>
-              <a:rPr b="0" lang="en-US" sz="2000" spc="-1" strike="noStrike">
-                <a:solidFill>
-                  <a:srgbClr val="000000"/>
-                </a:solidFill>
+              <a:rPr b="0" lang="en-US" sz="1800" spc="-1" strike="noStrike">
                 <a:latin typeface="Arial"/>
               </a:rPr>
               <a:t>Second Outline Level</a:t>
             </a:r>
-            <a:endParaRPr b="0" lang="en-US" sz="2000" spc="-1" strike="noStrike">
-              <a:solidFill>
-                <a:srgbClr val="000000"/>
-              </a:solidFill>
+            <a:endParaRPr b="0" lang="en-US" sz="1800" spc="-1" strike="noStrike">
               <a:latin typeface="Arial"/>
             </a:endParaRPr>
           </a:p>
@@ -5399,17 +5010,11 @@
             </a:pPr>
             <a:r>
               <a:rPr b="0" lang="en-US" sz="1800" spc="-1" strike="noStrike">
-                <a:solidFill>
-                  <a:srgbClr val="000000"/>
-                </a:solidFill>
                 <a:latin typeface="Arial"/>
               </a:rPr>
               <a:t>Third Outline Level</a:t>
             </a:r>
             <a:endParaRPr b="0" lang="en-US" sz="1800" spc="-1" strike="noStrike">
-              <a:solidFill>
-                <a:srgbClr val="000000"/>
-              </a:solidFill>
               <a:latin typeface="Arial"/>
             </a:endParaRPr>
           </a:p>
@@ -5427,17 +5032,11 @@
             </a:pPr>
             <a:r>
               <a:rPr b="0" lang="en-US" sz="1800" spc="-1" strike="noStrike">
-                <a:solidFill>
-                  <a:srgbClr val="000000"/>
-                </a:solidFill>
                 <a:latin typeface="Arial"/>
               </a:rPr>
               <a:t>Fourth Outline Level</a:t>
             </a:r>
             <a:endParaRPr b="0" lang="en-US" sz="1800" spc="-1" strike="noStrike">
-              <a:solidFill>
-                <a:srgbClr val="000000"/>
-              </a:solidFill>
               <a:latin typeface="Arial"/>
             </a:endParaRPr>
           </a:p>
@@ -5454,18 +5053,12 @@
               <a:buChar char=""/>
             </a:pPr>
             <a:r>
-              <a:rPr b="0" lang="en-US" sz="2000" spc="-1" strike="noStrike">
-                <a:solidFill>
-                  <a:srgbClr val="000000"/>
-                </a:solidFill>
+              <a:rPr b="0" lang="en-US" sz="1800" spc="-1" strike="noStrike">
                 <a:latin typeface="Arial"/>
               </a:rPr>
               <a:t>Fifth Outline Level</a:t>
             </a:r>
-            <a:endParaRPr b="0" lang="en-US" sz="2000" spc="-1" strike="noStrike">
-              <a:solidFill>
-                <a:srgbClr val="000000"/>
-              </a:solidFill>
+            <a:endParaRPr b="0" lang="en-US" sz="1800" spc="-1" strike="noStrike">
               <a:latin typeface="Arial"/>
             </a:endParaRPr>
           </a:p>
@@ -5482,18 +5075,12 @@
               <a:buChar char=""/>
             </a:pPr>
             <a:r>
-              <a:rPr b="0" lang="en-US" sz="2000" spc="-1" strike="noStrike">
-                <a:solidFill>
-                  <a:srgbClr val="000000"/>
-                </a:solidFill>
+              <a:rPr b="0" lang="en-US" sz="1800" spc="-1" strike="noStrike">
                 <a:latin typeface="Arial"/>
               </a:rPr>
               <a:t>Sixth Outline Level</a:t>
             </a:r>
-            <a:endParaRPr b="0" lang="en-US" sz="2000" spc="-1" strike="noStrike">
-              <a:solidFill>
-                <a:srgbClr val="000000"/>
-              </a:solidFill>
+            <a:endParaRPr b="0" lang="en-US" sz="1800" spc="-1" strike="noStrike">
               <a:latin typeface="Arial"/>
             </a:endParaRPr>
           </a:p>
@@ -5510,18 +5097,12 @@
               <a:buChar char=""/>
             </a:pPr>
             <a:r>
-              <a:rPr b="0" lang="en-US" sz="2000" spc="-1" strike="noStrike">
-                <a:solidFill>
-                  <a:srgbClr val="000000"/>
-                </a:solidFill>
+              <a:rPr b="0" lang="en-US" sz="1800" spc="-1" strike="noStrike">
                 <a:latin typeface="Arial"/>
               </a:rPr>
               <a:t>Seventh Outline Level</a:t>
             </a:r>
-            <a:endParaRPr b="0" lang="en-US" sz="2000" spc="-1" strike="noStrike">
-              <a:solidFill>
-                <a:srgbClr val="000000"/>
-              </a:solidFill>
+            <a:endParaRPr b="0" lang="en-US" sz="1800" spc="-1" strike="noStrike">
               <a:latin typeface="Arial"/>
             </a:endParaRPr>
           </a:p>
@@ -5573,7 +5154,7 @@
         <p:spPr>
           <a:xfrm>
             <a:off x="1097280" y="758880"/>
-            <a:ext cx="10057680" cy="3565440"/>
+            <a:ext cx="10057320" cy="3565080"/>
           </a:xfrm>
           <a:prstGeom prst="rect">
             <a:avLst/>
@@ -5598,7 +5179,7 @@
               </a:lnSpc>
             </a:pPr>
             <a:r>
-              <a:rPr b="0" lang="en-US" sz="8000" spc="-46" strike="noStrike">
+              <a:rPr b="0" lang="en-US" sz="8000" spc="-43" strike="noStrike">
                 <a:solidFill>
                   <a:srgbClr val="262626"/>
                 </a:solidFill>
@@ -5622,7 +5203,7 @@
         <p:spPr>
           <a:xfrm>
             <a:off x="1100160" y="4455720"/>
-            <a:ext cx="10057680" cy="1142280"/>
+            <a:ext cx="10057320" cy="1141920"/>
           </a:xfrm>
           <a:prstGeom prst="rect">
             <a:avLst/>
@@ -5653,7 +5234,7 @@
               </a:spcAft>
             </a:pPr>
             <a:r>
-              <a:rPr b="0" lang="en-US" sz="2400" spc="197" strike="noStrike" cap="all">
+              <a:rPr b="0" lang="en-US" sz="2400" spc="194" strike="noStrike" cap="all">
                 <a:solidFill>
                   <a:srgbClr val="637052"/>
                 </a:solidFill>
@@ -5682,7 +5263,7 @@
         <p:spPr>
           <a:xfrm>
             <a:off x="10667880" y="274320"/>
-            <a:ext cx="1165320" cy="1261080"/>
+            <a:ext cx="1164960" cy="1260720"/>
           </a:xfrm>
           <a:prstGeom prst="rect">
             <a:avLst/>
@@ -5743,14 +5324,14 @@
       </p:grpSpPr>
       <p:sp>
         <p:nvSpPr>
-          <p:cNvPr id="152" name="TextShape 1"/>
-          <p:cNvSpPr txBox="1"/>
+          <p:cNvPr id="152" name="CustomShape 1"/>
+          <p:cNvSpPr/>
           <p:nvPr/>
         </p:nvSpPr>
         <p:spPr>
           <a:xfrm>
             <a:off x="1097280" y="286560"/>
-            <a:ext cx="10057680" cy="1450080"/>
+            <a:ext cx="10057320" cy="1449720"/>
           </a:xfrm>
           <a:prstGeom prst="rect">
             <a:avLst/>
@@ -5760,6 +5341,12 @@
             <a:noFill/>
           </a:ln>
         </p:spPr>
+        <p:style>
+          <a:lnRef idx="0"/>
+          <a:fillRef idx="0"/>
+          <a:effectRef idx="0"/>
+          <a:fontRef idx="minor"/>
+        </p:style>
         <p:txBody>
           <a:bodyPr lIns="0" rIns="0" tIns="0" bIns="0" anchor="ctr"/>
           <a:p>
@@ -5770,7 +5357,7 @@
             </a:pPr>
             <a:br/>
             <a:r>
-              <a:rPr b="0" lang="en-US" sz="4400" spc="-46" strike="noStrike">
+              <a:rPr b="0" lang="en-US" sz="4400" spc="-43" strike="noStrike">
                 <a:solidFill>
                   <a:srgbClr val="404040"/>
                 </a:solidFill>
@@ -5780,24 +5367,21 @@
               <a:t>Blakely – Sound</a:t>
             </a:r>
             <a:endParaRPr b="0" lang="en-US" sz="4400" spc="-1" strike="noStrike">
-              <a:solidFill>
-                <a:srgbClr val="000000"/>
-              </a:solidFill>
-              <a:latin typeface="Arial"/>
-            </a:endParaRPr>
-          </a:p>
-        </p:txBody>
-      </p:sp>
-      <p:sp>
-        <p:nvSpPr>
-          <p:cNvPr id="153" name="TextShape 2"/>
-          <p:cNvSpPr txBox="1"/>
+              <a:latin typeface="Arial"/>
+            </a:endParaRPr>
+          </a:p>
+        </p:txBody>
+      </p:sp>
+      <p:sp>
+        <p:nvSpPr>
+          <p:cNvPr id="153" name="CustomShape 2"/>
+          <p:cNvSpPr/>
           <p:nvPr/>
         </p:nvSpPr>
         <p:spPr>
           <a:xfrm>
             <a:off x="1097280" y="2121120"/>
-            <a:ext cx="10057680" cy="4022640"/>
+            <a:ext cx="10057320" cy="4022280"/>
           </a:xfrm>
           <a:prstGeom prst="rect">
             <a:avLst/>
@@ -5807,10 +5391,16 @@
             <a:noFill/>
           </a:ln>
         </p:spPr>
+        <p:style>
+          <a:lnRef idx="0"/>
+          <a:fillRef idx="0"/>
+          <a:effectRef idx="0"/>
+          <a:fontRef idx="minor"/>
+        </p:style>
         <p:txBody>
           <a:bodyPr lIns="0" rIns="0" tIns="0" bIns="0" anchor="ctr"/>
           <a:p>
-            <a:pPr marL="91440" indent="-90720">
+            <a:pPr marL="91440" indent="-90360">
               <a:lnSpc>
                 <a:spcPct val="90000"/>
               </a:lnSpc>
@@ -5841,7 +5431,7 @@
             </a:endParaRPr>
           </a:p>
           <a:p>
-            <a:pPr marL="91440" indent="-90720">
+            <a:pPr marL="91440" indent="-90360">
               <a:lnSpc>
                 <a:spcPct val="90000"/>
               </a:lnSpc>
@@ -5872,7 +5462,7 @@
             </a:endParaRPr>
           </a:p>
           <a:p>
-            <a:pPr marL="91440" indent="-90720">
+            <a:pPr marL="91440" indent="-90360">
               <a:lnSpc>
                 <a:spcPct val="90000"/>
               </a:lnSpc>
@@ -5903,7 +5493,7 @@
             </a:endParaRPr>
           </a:p>
           <a:p>
-            <a:pPr marL="91440" indent="-90720">
+            <a:pPr marL="91440" indent="-90360">
               <a:lnSpc>
                 <a:spcPct val="90000"/>
               </a:lnSpc>
@@ -5966,7 +5556,7 @@
             </a:endParaRPr>
           </a:p>
           <a:p>
-            <a:pPr marL="91440" indent="-90720">
+            <a:pPr marL="91440" indent="-90360">
               <a:lnSpc>
                 <a:spcPct val="90000"/>
               </a:lnSpc>
@@ -5997,7 +5587,7 @@
             </a:endParaRPr>
           </a:p>
           <a:p>
-            <a:pPr marL="91440" indent="-90720">
+            <a:pPr marL="91440" indent="-90360">
               <a:lnSpc>
                 <a:spcPct val="90000"/>
               </a:lnSpc>
@@ -6056,7 +5646,7 @@
         <p:spPr>
           <a:xfrm>
             <a:off x="10667880" y="274320"/>
-            <a:ext cx="1165320" cy="1261080"/>
+            <a:ext cx="1164960" cy="1260720"/>
           </a:xfrm>
           <a:prstGeom prst="rect">
             <a:avLst/>
@@ -6117,14 +5707,14 @@
       </p:grpSpPr>
       <p:sp>
         <p:nvSpPr>
-          <p:cNvPr id="155" name="TextShape 1"/>
-          <p:cNvSpPr txBox="1"/>
+          <p:cNvPr id="155" name="CustomShape 1"/>
+          <p:cNvSpPr/>
           <p:nvPr/>
         </p:nvSpPr>
         <p:spPr>
           <a:xfrm>
             <a:off x="1097280" y="286560"/>
-            <a:ext cx="10057680" cy="1450080"/>
+            <a:ext cx="10057320" cy="1449720"/>
           </a:xfrm>
           <a:prstGeom prst="rect">
             <a:avLst/>
@@ -6134,6 +5724,12 @@
             <a:noFill/>
           </a:ln>
         </p:spPr>
+        <p:style>
+          <a:lnRef idx="0"/>
+          <a:fillRef idx="0"/>
+          <a:effectRef idx="0"/>
+          <a:fontRef idx="minor"/>
+        </p:style>
         <p:txBody>
           <a:bodyPr lIns="0" rIns="0" tIns="0" bIns="0" anchor="ctr"/>
           <a:p>
@@ -6145,7 +5741,7 @@
             <a:br/>
             <a:br/>
             <a:r>
-              <a:rPr b="0" lang="en-US" sz="4400" spc="-46" strike="noStrike">
+              <a:rPr b="0" lang="en-US" sz="4400" spc="-43" strike="noStrike">
                 <a:solidFill>
                   <a:srgbClr val="404040"/>
                 </a:solidFill>
@@ -6156,9 +5752,6 @@
             </a:r>
             <a:br/>
             <a:endParaRPr b="0" lang="en-US" sz="4400" spc="-1" strike="noStrike">
-              <a:solidFill>
-                <a:srgbClr val="000000"/>
-              </a:solidFill>
               <a:latin typeface="Arial"/>
             </a:endParaRPr>
           </a:p>
@@ -6178,7 +5771,7 @@
         <p:spPr>
           <a:xfrm>
             <a:off x="10667880" y="274320"/>
-            <a:ext cx="1165320" cy="1261080"/>
+            <a:ext cx="1164960" cy="1260720"/>
           </a:xfrm>
           <a:prstGeom prst="rect">
             <a:avLst/>
@@ -6202,7 +5795,7 @@
         <p:spPr>
           <a:xfrm>
             <a:off x="2485080" y="1905840"/>
-            <a:ext cx="4576320" cy="4318200"/>
+            <a:ext cx="4575960" cy="4317840"/>
           </a:xfrm>
           <a:prstGeom prst="rect">
             <a:avLst/>
@@ -6270,7 +5863,7 @@
         <p:spPr>
           <a:xfrm>
             <a:off x="1097280" y="286560"/>
-            <a:ext cx="10057680" cy="1450080"/>
+            <a:ext cx="10057320" cy="1449720"/>
           </a:xfrm>
           <a:prstGeom prst="rect">
             <a:avLst/>
@@ -6296,7 +5889,7 @@
         <p:spPr>
           <a:xfrm>
             <a:off x="1097280" y="1845720"/>
-            <a:ext cx="10057680" cy="4022640"/>
+            <a:ext cx="10057320" cy="4022280"/>
           </a:xfrm>
           <a:prstGeom prst="rect">
             <a:avLst/>
@@ -6327,7 +5920,7 @@
         <p:spPr>
           <a:xfrm>
             <a:off x="10667880" y="274320"/>
-            <a:ext cx="1165320" cy="1261080"/>
+            <a:ext cx="1164960" cy="1260720"/>
           </a:xfrm>
           <a:prstGeom prst="rect">
             <a:avLst/>
@@ -6395,7 +5988,7 @@
         <p:spPr>
           <a:xfrm>
             <a:off x="1097280" y="286560"/>
-            <a:ext cx="10057680" cy="1450080"/>
+            <a:ext cx="10057320" cy="1449720"/>
           </a:xfrm>
           <a:prstGeom prst="rect">
             <a:avLst/>
@@ -6421,7 +6014,7 @@
         <p:spPr>
           <a:xfrm>
             <a:off x="1097280" y="1845720"/>
-            <a:ext cx="10057680" cy="4022640"/>
+            <a:ext cx="10057320" cy="4022280"/>
           </a:xfrm>
           <a:prstGeom prst="rect">
             <a:avLst/>
@@ -6452,7 +6045,7 @@
         <p:spPr>
           <a:xfrm>
             <a:off x="10667880" y="274320"/>
-            <a:ext cx="1165320" cy="1261080"/>
+            <a:ext cx="1164960" cy="1260720"/>
           </a:xfrm>
           <a:prstGeom prst="rect">
             <a:avLst/>
@@ -6520,7 +6113,7 @@
         <p:spPr>
           <a:xfrm>
             <a:off x="1097280" y="286560"/>
-            <a:ext cx="10057680" cy="1450080"/>
+            <a:ext cx="10057320" cy="1449720"/>
           </a:xfrm>
           <a:prstGeom prst="rect">
             <a:avLst/>
@@ -6545,7 +6138,7 @@
               </a:lnSpc>
             </a:pPr>
             <a:r>
-              <a:rPr b="0" lang="en-US" sz="4800" spc="-46" strike="noStrike">
+              <a:rPr b="0" lang="en-US" sz="4800" spc="-43" strike="noStrike">
                 <a:solidFill>
                   <a:srgbClr val="404040"/>
                 </a:solidFill>
@@ -6569,7 +6162,7 @@
         <p:spPr>
           <a:xfrm>
             <a:off x="1097280" y="1845720"/>
-            <a:ext cx="10057680" cy="4022640"/>
+            <a:ext cx="10057320" cy="4022280"/>
           </a:xfrm>
           <a:prstGeom prst="rect">
             <a:avLst/>
@@ -6590,7 +6183,7 @@
             <a:normAutofit/>
           </a:bodyPr>
           <a:p>
-            <a:pPr marL="91440" indent="-90720">
+            <a:pPr marL="91440" indent="-90360">
               <a:lnSpc>
                 <a:spcPct val="90000"/>
               </a:lnSpc>
@@ -6621,7 +6214,7 @@
             </a:endParaRPr>
           </a:p>
           <a:p>
-            <a:pPr marL="91440" indent="-90720">
+            <a:pPr marL="91440" indent="-90360">
               <a:lnSpc>
                 <a:spcPct val="90000"/>
               </a:lnSpc>
@@ -6652,7 +6245,7 @@
             </a:endParaRPr>
           </a:p>
           <a:p>
-            <a:pPr marL="91440" indent="-90720">
+            <a:pPr marL="91440" indent="-90360">
               <a:lnSpc>
                 <a:spcPct val="90000"/>
               </a:lnSpc>
@@ -6683,7 +6276,7 @@
             </a:endParaRPr>
           </a:p>
           <a:p>
-            <a:pPr marL="91440" indent="-90720">
+            <a:pPr marL="91440" indent="-90360">
               <a:lnSpc>
                 <a:spcPct val="90000"/>
               </a:lnSpc>
@@ -6746,7 +6339,7 @@
             </a:endParaRPr>
           </a:p>
           <a:p>
-            <a:pPr marL="91440" indent="-90720">
+            <a:pPr marL="91440" indent="-90360">
               <a:lnSpc>
                 <a:spcPct val="90000"/>
               </a:lnSpc>
@@ -6777,7 +6370,7 @@
             </a:endParaRPr>
           </a:p>
           <a:p>
-            <a:pPr marL="91440" indent="-90720">
+            <a:pPr marL="91440" indent="-90360">
               <a:lnSpc>
                 <a:spcPct val="90000"/>
               </a:lnSpc>
@@ -6823,7 +6416,7 @@
         <p:spPr>
           <a:xfrm>
             <a:off x="10667880" y="274320"/>
-            <a:ext cx="1165320" cy="1261080"/>
+            <a:ext cx="1164960" cy="1260720"/>
           </a:xfrm>
           <a:prstGeom prst="rect">
             <a:avLst/>
@@ -6891,7 +6484,7 @@
         <p:spPr>
           <a:xfrm>
             <a:off x="1097280" y="286560"/>
-            <a:ext cx="10057680" cy="1450080"/>
+            <a:ext cx="10057320" cy="1449720"/>
           </a:xfrm>
           <a:prstGeom prst="rect">
             <a:avLst/>
@@ -6916,7 +6509,7 @@
               </a:lnSpc>
             </a:pPr>
             <a:r>
-              <a:rPr b="0" lang="en-US" sz="4800" spc="-46" strike="noStrike">
+              <a:rPr b="0" lang="en-US" sz="4800" spc="-43" strike="noStrike">
                 <a:solidFill>
                   <a:srgbClr val="404040"/>
                 </a:solidFill>
@@ -6944,7 +6537,7 @@
         <p:spPr>
           <a:xfrm>
             <a:off x="2045520" y="1830240"/>
-            <a:ext cx="7729200" cy="4497840"/>
+            <a:ext cx="7728840" cy="4497480"/>
           </a:xfrm>
           <a:prstGeom prst="rect">
             <a:avLst/>
@@ -6968,7 +6561,7 @@
         <p:spPr>
           <a:xfrm>
             <a:off x="10667880" y="274320"/>
-            <a:ext cx="1165320" cy="1261080"/>
+            <a:ext cx="1164960" cy="1260720"/>
           </a:xfrm>
           <a:prstGeom prst="rect">
             <a:avLst/>
@@ -7036,7 +6629,7 @@
         <p:spPr>
           <a:xfrm>
             <a:off x="1097280" y="286560"/>
-            <a:ext cx="10057680" cy="1450080"/>
+            <a:ext cx="10057320" cy="1449720"/>
           </a:xfrm>
           <a:prstGeom prst="rect">
             <a:avLst/>
@@ -7067,7 +6660,7 @@
         <p:spPr>
           <a:xfrm>
             <a:off x="10667880" y="274320"/>
-            <a:ext cx="1165320" cy="1261080"/>
+            <a:ext cx="1164960" cy="1260720"/>
           </a:xfrm>
           <a:prstGeom prst="rect">
             <a:avLst/>
@@ -7135,7 +6728,7 @@
         <p:spPr>
           <a:xfrm>
             <a:off x="1097280" y="286560"/>
-            <a:ext cx="10057680" cy="1450080"/>
+            <a:ext cx="10057320" cy="1449720"/>
           </a:xfrm>
           <a:prstGeom prst="rect">
             <a:avLst/>
@@ -7166,7 +6759,7 @@
         <p:spPr>
           <a:xfrm>
             <a:off x="10667880" y="274320"/>
-            <a:ext cx="1165320" cy="1261080"/>
+            <a:ext cx="1164960" cy="1260720"/>
           </a:xfrm>
           <a:prstGeom prst="rect">
             <a:avLst/>
@@ -7234,7 +6827,7 @@
         <p:spPr>
           <a:xfrm>
             <a:off x="1097280" y="700920"/>
-            <a:ext cx="10057680" cy="1036080"/>
+            <a:ext cx="10057320" cy="1035720"/>
           </a:xfrm>
           <a:prstGeom prst="rect">
             <a:avLst/>
@@ -7260,7 +6853,7 @@
             </a:pPr>
             <a:br/>
             <a:r>
-              <a:rPr b="0" lang="en-US" sz="4800" spc="-46" strike="noStrike">
+              <a:rPr b="0" lang="en-US" sz="4800" spc="-43" strike="noStrike">
                 <a:solidFill>
                   <a:srgbClr val="404040"/>
                 </a:solidFill>
@@ -7289,7 +6882,7 @@
         <p:spPr>
           <a:xfrm>
             <a:off x="10667880" y="274320"/>
-            <a:ext cx="1165320" cy="1261080"/>
+            <a:ext cx="1164960" cy="1260720"/>
           </a:xfrm>
           <a:prstGeom prst="rect">
             <a:avLst/>
@@ -7308,7 +6901,7 @@
         <p:spPr>
           <a:xfrm>
             <a:off x="1097640" y="1846080"/>
-            <a:ext cx="10057680" cy="4022640"/>
+            <a:ext cx="10057320" cy="4022280"/>
           </a:xfrm>
           <a:prstGeom prst="rect">
             <a:avLst/>
@@ -7329,7 +6922,7 @@
             <a:normAutofit/>
           </a:bodyPr>
           <a:p>
-            <a:pPr marL="91440" indent="-90720">
+            <a:pPr marL="91440" indent="-90360">
               <a:lnSpc>
                 <a:spcPct val="90000"/>
               </a:lnSpc>
@@ -7360,7 +6953,7 @@
             </a:endParaRPr>
           </a:p>
           <a:p>
-            <a:pPr marL="91440" indent="-90720">
+            <a:pPr marL="91440" indent="-90360">
               <a:lnSpc>
                 <a:spcPct val="90000"/>
               </a:lnSpc>
@@ -7391,7 +6984,7 @@
             </a:endParaRPr>
           </a:p>
           <a:p>
-            <a:pPr marL="91440" indent="-90720">
+            <a:pPr marL="91440" indent="-90360">
               <a:lnSpc>
                 <a:spcPct val="90000"/>
               </a:lnSpc>
@@ -7422,7 +7015,7 @@
             </a:endParaRPr>
           </a:p>
           <a:p>
-            <a:pPr marL="91440" indent="-90720">
+            <a:pPr marL="91440" indent="-90360">
               <a:lnSpc>
                 <a:spcPct val="90000"/>
               </a:lnSpc>
@@ -7453,7 +7046,7 @@
             </a:endParaRPr>
           </a:p>
           <a:p>
-            <a:pPr marL="91440" indent="-90720">
+            <a:pPr marL="91440" indent="-90360">
               <a:lnSpc>
                 <a:spcPct val="90000"/>
               </a:lnSpc>
@@ -7516,7 +7109,7 @@
             </a:endParaRPr>
           </a:p>
           <a:p>
-            <a:pPr marL="91440" indent="-90720">
+            <a:pPr marL="91440" indent="-90360">
               <a:lnSpc>
                 <a:spcPct val="90000"/>
               </a:lnSpc>
@@ -7547,7 +7140,7 @@
             </a:endParaRPr>
           </a:p>
           <a:p>
-            <a:pPr marL="91440" indent="-90720">
+            <a:pPr marL="91440" indent="-90360">
               <a:lnSpc>
                 <a:spcPct val="90000"/>
               </a:lnSpc>
@@ -7637,7 +7230,7 @@
         <p:spPr>
           <a:xfrm>
             <a:off x="1097280" y="286560"/>
-            <a:ext cx="10057680" cy="1450080"/>
+            <a:ext cx="10057320" cy="1449720"/>
           </a:xfrm>
           <a:prstGeom prst="rect">
             <a:avLst/>
@@ -7668,7 +7261,7 @@
         <p:spPr>
           <a:xfrm>
             <a:off x="10667880" y="274320"/>
-            <a:ext cx="1165320" cy="1261080"/>
+            <a:ext cx="1164960" cy="1260720"/>
           </a:xfrm>
           <a:prstGeom prst="rect">
             <a:avLst/>
@@ -7687,7 +7280,7 @@
         <p:spPr>
           <a:xfrm>
             <a:off x="1097280" y="700920"/>
-            <a:ext cx="10057680" cy="1036080"/>
+            <a:ext cx="10057320" cy="1035720"/>
           </a:xfrm>
           <a:prstGeom prst="rect">
             <a:avLst/>
@@ -7713,14 +7306,14 @@
             </a:pPr>
             <a:br/>
             <a:r>
-              <a:rPr b="0" lang="en-US" sz="4800" spc="-46" strike="noStrike">
+              <a:rPr b="0" lang="en-US" sz="4800" spc="-43" strike="noStrike">
                 <a:solidFill>
                   <a:srgbClr val="404040"/>
                 </a:solidFill>
                 <a:latin typeface="Calibri Light"/>
                 <a:ea typeface="Microsoft YaHei"/>
               </a:rPr>
-              <a:t>Use case – Dmaging enemies</a:t>
+              <a:t>Use case – Damaging enemies</a:t>
             </a:r>
             <a:endParaRPr b="0" lang="en-US" sz="4800" spc="-1" strike="noStrike">
               <a:latin typeface="Arial"/>
@@ -7741,7 +7334,7 @@
         <p:spPr>
           <a:xfrm>
             <a:off x="2377440" y="1828800"/>
-            <a:ext cx="7132320" cy="4404600"/>
+            <a:ext cx="7131960" cy="4404240"/>
           </a:xfrm>
           <a:prstGeom prst="rect">
             <a:avLst/>

</xml_diff>